<commit_message>
Updated text on figures for circuit methodology document.
</commit_message>
<xml_diff>
--- a/docs/Figures/CircuitWorking.pptx
+++ b/docs/Figures/CircuitWorking.pptx
@@ -6,7 +6,7 @@
     <p:sldMasterId id="2147483672" r:id="rId2"/>
   </p:sldMasterIdLst>
   <p:notesMasterIdLst>
-    <p:notesMasterId r:id="rId12"/>
+    <p:notesMasterId r:id="rId15"/>
   </p:notesMasterIdLst>
   <p:sldIdLst>
     <p:sldId id="271" r:id="rId3"/>
@@ -18,6 +18,9 @@
     <p:sldId id="278" r:id="rId9"/>
     <p:sldId id="287" r:id="rId10"/>
     <p:sldId id="297" r:id="rId11"/>
+    <p:sldId id="299" r:id="rId12"/>
+    <p:sldId id="302" r:id="rId13"/>
+    <p:sldId id="300" r:id="rId14"/>
   </p:sldIdLst>
   <p:sldSz cx="9144000" cy="6858000" type="screen4x3"/>
   <p:notesSz cx="6996113" cy="9282113"/>
@@ -118,7 +121,7 @@
   </p:defaultTextStyle>
   <p:extLst>
     <p:ext uri="{EFAFB233-063F-42B5-8137-9DF3F51BA10A}">
-      <p15:sldGuideLst xmlns="" xmlns:p15="http://schemas.microsoft.com/office/powerpoint/2012/main">
+      <p15:sldGuideLst xmlns:p15="http://schemas.microsoft.com/office/powerpoint/2012/main">
         <p15:guide id="1" orient="horz" pos="2160">
           <p15:clr>
             <a:srgbClr val="A4A3A4"/>
@@ -217,7 +220,7 @@
           <a:p>
             <a:fld id="{7B126BB8-5932-4ACC-8CD5-328D9DA138C9}" type="datetimeFigureOut">
               <a:rPr lang="en-US" smtClean="0"/>
-              <a:t>3/6/2017</a:t>
+              <a:t>5/17/2018</a:t>
             </a:fld>
             <a:endParaRPr lang="en-US"/>
           </a:p>
@@ -281,38 +284,37 @@
           <a:p>
             <a:pPr lvl="0"/>
             <a:r>
-              <a:rPr lang="en-US" smtClean="0"/>
+              <a:rPr lang="en-US"/>
               <a:t>Click to edit Master text styles</a:t>
             </a:r>
           </a:p>
           <a:p>
             <a:pPr lvl="1"/>
             <a:r>
-              <a:rPr lang="en-US" smtClean="0"/>
+              <a:rPr lang="en-US"/>
               <a:t>Second level</a:t>
             </a:r>
           </a:p>
           <a:p>
             <a:pPr lvl="2"/>
             <a:r>
-              <a:rPr lang="en-US" smtClean="0"/>
+              <a:rPr lang="en-US"/>
               <a:t>Third level</a:t>
             </a:r>
           </a:p>
           <a:p>
             <a:pPr lvl="3"/>
             <a:r>
-              <a:rPr lang="en-US" smtClean="0"/>
+              <a:rPr lang="en-US"/>
               <a:t>Fourth level</a:t>
             </a:r>
           </a:p>
           <a:p>
             <a:pPr lvl="4"/>
             <a:r>
-              <a:rPr lang="en-US" smtClean="0"/>
+              <a:rPr lang="en-US"/>
               <a:t>Fifth level</a:t>
             </a:r>
-            <a:endParaRPr lang="en-US"/>
           </a:p>
         </p:txBody>
       </p:sp>
@@ -523,10 +525,9 @@
           <a:lstStyle/>
           <a:p>
             <a:r>
-              <a:rPr lang="en-US" smtClean="0"/>
+              <a:rPr lang="en-US"/>
               <a:t>Click to edit Master title style</a:t>
             </a:r>
-            <a:endParaRPr lang="en-US"/>
           </a:p>
         </p:txBody>
       </p:sp>
@@ -642,10 +643,9 @@
           </a:lstStyle>
           <a:p>
             <a:r>
-              <a:rPr lang="en-US" smtClean="0"/>
+              <a:rPr lang="en-US"/>
               <a:t>Click to edit Master subtitle style</a:t>
             </a:r>
-            <a:endParaRPr lang="en-US"/>
           </a:p>
         </p:txBody>
       </p:sp>
@@ -666,7 +666,7 @@
           <a:p>
             <a:fld id="{9E9AFD63-10BD-4598-9E1E-9FFECB76D2D7}" type="datetimeFigureOut">
               <a:rPr lang="en-US" smtClean="0"/>
-              <a:t>3/6/2017</a:t>
+              <a:t>5/17/2018</a:t>
             </a:fld>
             <a:endParaRPr lang="en-US"/>
           </a:p>
@@ -760,10 +760,9 @@
           <a:lstStyle/>
           <a:p>
             <a:r>
-              <a:rPr lang="en-US" smtClean="0"/>
+              <a:rPr lang="en-US"/>
               <a:t>Click to edit Master title style</a:t>
             </a:r>
-            <a:endParaRPr lang="en-US"/>
           </a:p>
         </p:txBody>
       </p:sp>
@@ -784,38 +783,37 @@
           <a:p>
             <a:pPr lvl="0"/>
             <a:r>
-              <a:rPr lang="en-US" smtClean="0"/>
+              <a:rPr lang="en-US"/>
               <a:t>Click to edit Master text styles</a:t>
             </a:r>
           </a:p>
           <a:p>
             <a:pPr lvl="1"/>
             <a:r>
-              <a:rPr lang="en-US" smtClean="0"/>
+              <a:rPr lang="en-US"/>
               <a:t>Second level</a:t>
             </a:r>
           </a:p>
           <a:p>
             <a:pPr lvl="2"/>
             <a:r>
-              <a:rPr lang="en-US" smtClean="0"/>
+              <a:rPr lang="en-US"/>
               <a:t>Third level</a:t>
             </a:r>
           </a:p>
           <a:p>
             <a:pPr lvl="3"/>
             <a:r>
-              <a:rPr lang="en-US" smtClean="0"/>
+              <a:rPr lang="en-US"/>
               <a:t>Fourth level</a:t>
             </a:r>
           </a:p>
           <a:p>
             <a:pPr lvl="4"/>
             <a:r>
-              <a:rPr lang="en-US" smtClean="0"/>
+              <a:rPr lang="en-US"/>
               <a:t>Fifth level</a:t>
             </a:r>
-            <a:endParaRPr lang="en-US"/>
           </a:p>
         </p:txBody>
       </p:sp>
@@ -836,7 +834,7 @@
           <a:p>
             <a:fld id="{9E9AFD63-10BD-4598-9E1E-9FFECB76D2D7}" type="datetimeFigureOut">
               <a:rPr lang="en-US" smtClean="0"/>
-              <a:t>3/6/2017</a:t>
+              <a:t>5/17/2018</a:t>
             </a:fld>
             <a:endParaRPr lang="en-US"/>
           </a:p>
@@ -935,10 +933,9 @@
           <a:lstStyle/>
           <a:p>
             <a:r>
-              <a:rPr lang="en-US" smtClean="0"/>
+              <a:rPr lang="en-US"/>
               <a:t>Click to edit Master title style</a:t>
             </a:r>
-            <a:endParaRPr lang="en-US"/>
           </a:p>
         </p:txBody>
       </p:sp>
@@ -964,38 +961,37 @@
           <a:p>
             <a:pPr lvl="0"/>
             <a:r>
-              <a:rPr lang="en-US" smtClean="0"/>
+              <a:rPr lang="en-US"/>
               <a:t>Click to edit Master text styles</a:t>
             </a:r>
           </a:p>
           <a:p>
             <a:pPr lvl="1"/>
             <a:r>
-              <a:rPr lang="en-US" smtClean="0"/>
+              <a:rPr lang="en-US"/>
               <a:t>Second level</a:t>
             </a:r>
           </a:p>
           <a:p>
             <a:pPr lvl="2"/>
             <a:r>
-              <a:rPr lang="en-US" smtClean="0"/>
+              <a:rPr lang="en-US"/>
               <a:t>Third level</a:t>
             </a:r>
           </a:p>
           <a:p>
             <a:pPr lvl="3"/>
             <a:r>
-              <a:rPr lang="en-US" smtClean="0"/>
+              <a:rPr lang="en-US"/>
               <a:t>Fourth level</a:t>
             </a:r>
           </a:p>
           <a:p>
             <a:pPr lvl="4"/>
             <a:r>
-              <a:rPr lang="en-US" smtClean="0"/>
+              <a:rPr lang="en-US"/>
               <a:t>Fifth level</a:t>
             </a:r>
-            <a:endParaRPr lang="en-US"/>
           </a:p>
         </p:txBody>
       </p:sp>
@@ -1016,7 +1012,7 @@
           <a:p>
             <a:fld id="{9E9AFD63-10BD-4598-9E1E-9FFECB76D2D7}" type="datetimeFigureOut">
               <a:rPr lang="en-US" smtClean="0"/>
-              <a:t>3/6/2017</a:t>
+              <a:t>5/17/2018</a:t>
             </a:fld>
             <a:endParaRPr lang="en-US"/>
           </a:p>
@@ -1211,10 +1207,9 @@
           </a:lstStyle>
           <a:p>
             <a:r>
-              <a:rPr lang="en-US" dirty="0" smtClean="0"/>
+              <a:rPr lang="en-US" dirty="0"/>
               <a:t>date</a:t>
             </a:r>
-            <a:endParaRPr lang="en-US" dirty="0"/>
           </a:p>
         </p:txBody>
       </p:sp>
@@ -1378,10 +1373,9 @@
           </a:lstStyle>
           <a:p>
             <a:r>
-              <a:rPr lang="en-US" dirty="0" smtClean="0"/>
+              <a:rPr lang="en-US" dirty="0"/>
               <a:t>Click to edit title</a:t>
             </a:r>
-            <a:endParaRPr lang="en-US" dirty="0"/>
           </a:p>
         </p:txBody>
       </p:sp>
@@ -1470,38 +1464,37 @@
           <a:p>
             <a:pPr lvl="0"/>
             <a:r>
-              <a:rPr lang="en-US" smtClean="0"/>
+              <a:rPr lang="en-US"/>
               <a:t>Click to edit Master text styles</a:t>
             </a:r>
           </a:p>
           <a:p>
             <a:pPr lvl="1"/>
             <a:r>
-              <a:rPr lang="en-US" smtClean="0"/>
+              <a:rPr lang="en-US"/>
               <a:t>Second level</a:t>
             </a:r>
           </a:p>
           <a:p>
             <a:pPr lvl="2"/>
             <a:r>
-              <a:rPr lang="en-US" smtClean="0"/>
+              <a:rPr lang="en-US"/>
               <a:t>Third level</a:t>
             </a:r>
           </a:p>
           <a:p>
             <a:pPr lvl="3"/>
             <a:r>
-              <a:rPr lang="en-US" smtClean="0"/>
+              <a:rPr lang="en-US"/>
               <a:t>Fourth level</a:t>
             </a:r>
           </a:p>
           <a:p>
             <a:pPr lvl="4"/>
             <a:r>
-              <a:rPr lang="en-US" smtClean="0"/>
+              <a:rPr lang="en-US"/>
               <a:t>Fifth level</a:t>
             </a:r>
-            <a:endParaRPr lang="en-US"/>
           </a:p>
         </p:txBody>
       </p:sp>
@@ -1531,7 +1524,7 @@
           <a:lstStyle/>
           <a:p>
             <a:r>
-              <a:rPr lang="en-US" smtClean="0"/>
+              <a:rPr lang="en-US"/>
               <a:t>Click to edit Master title style</a:t>
             </a:r>
             <a:endParaRPr lang="en-US" dirty="0"/>
@@ -1596,7 +1589,7 @@
           </a:lstStyle>
           <a:p>
             <a:r>
-              <a:rPr lang="en-US" smtClean="0"/>
+              <a:rPr lang="en-US"/>
               <a:t>Click to edit Master title style</a:t>
             </a:r>
             <a:endParaRPr lang="en-US" dirty="0"/>
@@ -1719,7 +1712,7 @@
           <a:p>
             <a:pPr lvl="0"/>
             <a:r>
-              <a:rPr lang="en-US" smtClean="0"/>
+              <a:rPr lang="en-US"/>
               <a:t>Click to edit Master text styles</a:t>
             </a:r>
           </a:p>
@@ -1808,35 +1801,35 @@
           <a:p>
             <a:pPr lvl="0"/>
             <a:r>
-              <a:rPr lang="en-US" smtClean="0"/>
+              <a:rPr lang="en-US"/>
               <a:t>Click to edit Master text styles</a:t>
             </a:r>
           </a:p>
           <a:p>
             <a:pPr lvl="1"/>
             <a:r>
-              <a:rPr lang="en-US" smtClean="0"/>
+              <a:rPr lang="en-US"/>
               <a:t>Second level</a:t>
             </a:r>
           </a:p>
           <a:p>
             <a:pPr lvl="2"/>
             <a:r>
-              <a:rPr lang="en-US" smtClean="0"/>
+              <a:rPr lang="en-US"/>
               <a:t>Third level</a:t>
             </a:r>
           </a:p>
           <a:p>
             <a:pPr lvl="3"/>
             <a:r>
-              <a:rPr lang="en-US" smtClean="0"/>
+              <a:rPr lang="en-US"/>
               <a:t>Fourth level</a:t>
             </a:r>
           </a:p>
           <a:p>
             <a:pPr lvl="4"/>
             <a:r>
-              <a:rPr lang="en-US" smtClean="0"/>
+              <a:rPr lang="en-US"/>
               <a:t>Fifth level</a:t>
             </a:r>
             <a:endParaRPr lang="en-US" dirty="0"/>
@@ -1896,38 +1889,37 @@
           <a:p>
             <a:pPr lvl="0"/>
             <a:r>
-              <a:rPr lang="en-US" smtClean="0"/>
+              <a:rPr lang="en-US"/>
               <a:t>Click to edit Master text styles</a:t>
             </a:r>
           </a:p>
           <a:p>
             <a:pPr lvl="1"/>
             <a:r>
-              <a:rPr lang="en-US" smtClean="0"/>
+              <a:rPr lang="en-US"/>
               <a:t>Second level</a:t>
             </a:r>
           </a:p>
           <a:p>
             <a:pPr lvl="2"/>
             <a:r>
-              <a:rPr lang="en-US" smtClean="0"/>
+              <a:rPr lang="en-US"/>
               <a:t>Third level</a:t>
             </a:r>
           </a:p>
           <a:p>
             <a:pPr lvl="3"/>
             <a:r>
-              <a:rPr lang="en-US" smtClean="0"/>
+              <a:rPr lang="en-US"/>
               <a:t>Fourth level</a:t>
             </a:r>
           </a:p>
           <a:p>
             <a:pPr lvl="4"/>
             <a:r>
-              <a:rPr lang="en-US" smtClean="0"/>
+              <a:rPr lang="en-US"/>
               <a:t>Fifth level</a:t>
             </a:r>
-            <a:endParaRPr lang="en-US"/>
           </a:p>
         </p:txBody>
       </p:sp>
@@ -1957,7 +1949,7 @@
           <a:lstStyle/>
           <a:p>
             <a:r>
-              <a:rPr lang="en-US" smtClean="0"/>
+              <a:rPr lang="en-US"/>
               <a:t>Click to edit Master title style</a:t>
             </a:r>
             <a:endParaRPr lang="en-US" dirty="0"/>
@@ -2058,7 +2050,7 @@
           <a:p>
             <a:pPr lvl="0"/>
             <a:r>
-              <a:rPr lang="en-US" smtClean="0"/>
+              <a:rPr lang="en-US"/>
               <a:t>Click to edit Master text styles</a:t>
             </a:r>
           </a:p>
@@ -2117,35 +2109,35 @@
           <a:p>
             <a:pPr lvl="0"/>
             <a:r>
-              <a:rPr lang="en-US" smtClean="0"/>
+              <a:rPr lang="en-US"/>
               <a:t>Click to edit Master text styles</a:t>
             </a:r>
           </a:p>
           <a:p>
             <a:pPr lvl="1"/>
             <a:r>
-              <a:rPr lang="en-US" smtClean="0"/>
+              <a:rPr lang="en-US"/>
               <a:t>Second level</a:t>
             </a:r>
           </a:p>
           <a:p>
             <a:pPr lvl="2"/>
             <a:r>
-              <a:rPr lang="en-US" smtClean="0"/>
+              <a:rPr lang="en-US"/>
               <a:t>Third level</a:t>
             </a:r>
           </a:p>
           <a:p>
             <a:pPr lvl="3"/>
             <a:r>
-              <a:rPr lang="en-US" smtClean="0"/>
+              <a:rPr lang="en-US"/>
               <a:t>Fourth level</a:t>
             </a:r>
           </a:p>
           <a:p>
             <a:pPr lvl="4"/>
             <a:r>
-              <a:rPr lang="en-US" smtClean="0"/>
+              <a:rPr lang="en-US"/>
               <a:t>Fifth level</a:t>
             </a:r>
             <a:endParaRPr lang="en-US" dirty="0"/>
@@ -2216,7 +2208,7 @@
           <a:p>
             <a:pPr lvl="0"/>
             <a:r>
-              <a:rPr lang="en-US" smtClean="0"/>
+              <a:rPr lang="en-US"/>
               <a:t>Click to edit Master text styles</a:t>
             </a:r>
           </a:p>
@@ -2275,38 +2267,37 @@
           <a:p>
             <a:pPr lvl="0"/>
             <a:r>
-              <a:rPr lang="en-US" smtClean="0"/>
+              <a:rPr lang="en-US"/>
               <a:t>Click to edit Master text styles</a:t>
             </a:r>
           </a:p>
           <a:p>
             <a:pPr lvl="1"/>
             <a:r>
-              <a:rPr lang="en-US" smtClean="0"/>
+              <a:rPr lang="en-US"/>
               <a:t>Second level</a:t>
             </a:r>
           </a:p>
           <a:p>
             <a:pPr lvl="2"/>
             <a:r>
-              <a:rPr lang="en-US" smtClean="0"/>
+              <a:rPr lang="en-US"/>
               <a:t>Third level</a:t>
             </a:r>
           </a:p>
           <a:p>
             <a:pPr lvl="3"/>
             <a:r>
-              <a:rPr lang="en-US" smtClean="0"/>
+              <a:rPr lang="en-US"/>
               <a:t>Fourth level</a:t>
             </a:r>
           </a:p>
           <a:p>
             <a:pPr lvl="4"/>
             <a:r>
-              <a:rPr lang="en-US" smtClean="0"/>
+              <a:rPr lang="en-US"/>
               <a:t>Fifth level</a:t>
             </a:r>
-            <a:endParaRPr lang="en-US"/>
           </a:p>
         </p:txBody>
       </p:sp>
@@ -2336,7 +2327,7 @@
           <a:lstStyle/>
           <a:p>
             <a:r>
-              <a:rPr lang="en-US" smtClean="0"/>
+              <a:rPr lang="en-US"/>
               <a:t>Click to edit Master title style</a:t>
             </a:r>
             <a:endParaRPr lang="en-US" dirty="0"/>
@@ -2399,7 +2390,7 @@
           <a:lstStyle/>
           <a:p>
             <a:r>
-              <a:rPr lang="en-US" smtClean="0"/>
+              <a:rPr lang="en-US"/>
               <a:t>Click to edit Master title style</a:t>
             </a:r>
             <a:endParaRPr lang="en-US" dirty="0"/>
@@ -2494,10 +2485,9 @@
           </a:lstStyle>
           <a:p>
             <a:r>
-              <a:rPr lang="en-US" smtClean="0"/>
+              <a:rPr lang="en-US"/>
               <a:t>Click to edit Master title style</a:t>
             </a:r>
-            <a:endParaRPr lang="en-US"/>
           </a:p>
         </p:txBody>
       </p:sp>
@@ -2554,35 +2544,35 @@
           <a:p>
             <a:pPr lvl="0"/>
             <a:r>
-              <a:rPr lang="en-US" smtClean="0"/>
+              <a:rPr lang="en-US"/>
               <a:t>Click to edit Master text styles</a:t>
             </a:r>
           </a:p>
           <a:p>
             <a:pPr lvl="1"/>
             <a:r>
-              <a:rPr lang="en-US" smtClean="0"/>
+              <a:rPr lang="en-US"/>
               <a:t>Second level</a:t>
             </a:r>
           </a:p>
           <a:p>
             <a:pPr lvl="2"/>
             <a:r>
-              <a:rPr lang="en-US" smtClean="0"/>
+              <a:rPr lang="en-US"/>
               <a:t>Third level</a:t>
             </a:r>
           </a:p>
           <a:p>
             <a:pPr lvl="3"/>
             <a:r>
-              <a:rPr lang="en-US" smtClean="0"/>
+              <a:rPr lang="en-US"/>
               <a:t>Fourth level</a:t>
             </a:r>
           </a:p>
           <a:p>
             <a:pPr lvl="4"/>
             <a:r>
-              <a:rPr lang="en-US" smtClean="0"/>
+              <a:rPr lang="en-US"/>
               <a:t>Fifth level</a:t>
             </a:r>
             <a:endParaRPr lang="en-US" dirty="0"/>
@@ -2651,7 +2641,7 @@
           <a:p>
             <a:pPr lvl="0"/>
             <a:r>
-              <a:rPr lang="en-US" smtClean="0"/>
+              <a:rPr lang="en-US"/>
               <a:t>Click to edit Master text styles</a:t>
             </a:r>
           </a:p>
@@ -2703,10 +2693,9 @@
           <a:lstStyle/>
           <a:p>
             <a:r>
-              <a:rPr lang="en-US" smtClean="0"/>
+              <a:rPr lang="en-US"/>
               <a:t>Click to edit Master title style</a:t>
             </a:r>
-            <a:endParaRPr lang="en-US"/>
           </a:p>
         </p:txBody>
       </p:sp>
@@ -2727,38 +2716,37 @@
           <a:p>
             <a:pPr lvl="0"/>
             <a:r>
-              <a:rPr lang="en-US" smtClean="0"/>
+              <a:rPr lang="en-US"/>
               <a:t>Click to edit Master text styles</a:t>
             </a:r>
           </a:p>
           <a:p>
             <a:pPr lvl="1"/>
             <a:r>
-              <a:rPr lang="en-US" smtClean="0"/>
+              <a:rPr lang="en-US"/>
               <a:t>Second level</a:t>
             </a:r>
           </a:p>
           <a:p>
             <a:pPr lvl="2"/>
             <a:r>
-              <a:rPr lang="en-US" smtClean="0"/>
+              <a:rPr lang="en-US"/>
               <a:t>Third level</a:t>
             </a:r>
           </a:p>
           <a:p>
             <a:pPr lvl="3"/>
             <a:r>
-              <a:rPr lang="en-US" smtClean="0"/>
+              <a:rPr lang="en-US"/>
               <a:t>Fourth level</a:t>
             </a:r>
           </a:p>
           <a:p>
             <a:pPr lvl="4"/>
             <a:r>
-              <a:rPr lang="en-US" smtClean="0"/>
+              <a:rPr lang="en-US"/>
               <a:t>Fifth level</a:t>
             </a:r>
-            <a:endParaRPr lang="en-US"/>
           </a:p>
         </p:txBody>
       </p:sp>
@@ -2779,7 +2767,7 @@
           <a:p>
             <a:fld id="{9E9AFD63-10BD-4598-9E1E-9FFECB76D2D7}" type="datetimeFigureOut">
               <a:rPr lang="en-US" smtClean="0"/>
-              <a:t>3/6/2017</a:t>
+              <a:t>5/17/2018</a:t>
             </a:fld>
             <a:endParaRPr lang="en-US"/>
           </a:p>
@@ -2885,10 +2873,9 @@
           </a:lstStyle>
           <a:p>
             <a:r>
-              <a:rPr lang="en-US" smtClean="0"/>
+              <a:rPr lang="en-US"/>
               <a:t>Click to edit Master title style</a:t>
             </a:r>
-            <a:endParaRPr lang="en-US"/>
           </a:p>
         </p:txBody>
       </p:sp>
@@ -2953,10 +2940,9 @@
           </a:lstStyle>
           <a:p>
             <a:r>
-              <a:rPr lang="en-US" smtClean="0"/>
+              <a:rPr lang="en-US"/>
               <a:t>Drag picture to placeholder or click icon to add</a:t>
             </a:r>
-            <a:endParaRPr lang="en-US"/>
           </a:p>
         </p:txBody>
       </p:sp>
@@ -3022,7 +3008,7 @@
           <a:p>
             <a:pPr lvl="0"/>
             <a:r>
-              <a:rPr lang="en-US" smtClean="0"/>
+              <a:rPr lang="en-US"/>
               <a:t>Click to edit Master text styles</a:t>
             </a:r>
           </a:p>
@@ -3083,10 +3069,9 @@
           </a:lstStyle>
           <a:p>
             <a:r>
-              <a:rPr lang="en-US" smtClean="0"/>
+              <a:rPr lang="en-US"/>
               <a:t>Click to edit Master title style</a:t>
             </a:r>
-            <a:endParaRPr lang="en-US"/>
           </a:p>
         </p:txBody>
       </p:sp>
@@ -3203,7 +3188,7 @@
           <a:p>
             <a:pPr lvl="0"/>
             <a:r>
-              <a:rPr lang="en-US" smtClean="0"/>
+              <a:rPr lang="en-US"/>
               <a:t>Click to edit Master text styles</a:t>
             </a:r>
           </a:p>
@@ -3226,7 +3211,7 @@
           <a:p>
             <a:fld id="{9E9AFD63-10BD-4598-9E1E-9FFECB76D2D7}" type="datetimeFigureOut">
               <a:rPr lang="en-US" smtClean="0"/>
-              <a:t>3/6/2017</a:t>
+              <a:t>5/17/2018</a:t>
             </a:fld>
             <a:endParaRPr lang="en-US"/>
           </a:p>
@@ -3320,10 +3305,9 @@
           <a:lstStyle/>
           <a:p>
             <a:r>
-              <a:rPr lang="en-US" smtClean="0"/>
+              <a:rPr lang="en-US"/>
               <a:t>Click to edit Master title style</a:t>
             </a:r>
-            <a:endParaRPr lang="en-US"/>
           </a:p>
         </p:txBody>
       </p:sp>
@@ -3377,38 +3361,37 @@
           <a:p>
             <a:pPr lvl="0"/>
             <a:r>
-              <a:rPr lang="en-US" smtClean="0"/>
+              <a:rPr lang="en-US"/>
               <a:t>Click to edit Master text styles</a:t>
             </a:r>
           </a:p>
           <a:p>
             <a:pPr lvl="1"/>
             <a:r>
-              <a:rPr lang="en-US" smtClean="0"/>
+              <a:rPr lang="en-US"/>
               <a:t>Second level</a:t>
             </a:r>
           </a:p>
           <a:p>
             <a:pPr lvl="2"/>
             <a:r>
-              <a:rPr lang="en-US" smtClean="0"/>
+              <a:rPr lang="en-US"/>
               <a:t>Third level</a:t>
             </a:r>
           </a:p>
           <a:p>
             <a:pPr lvl="3"/>
             <a:r>
-              <a:rPr lang="en-US" smtClean="0"/>
+              <a:rPr lang="en-US"/>
               <a:t>Fourth level</a:t>
             </a:r>
           </a:p>
           <a:p>
             <a:pPr lvl="4"/>
             <a:r>
-              <a:rPr lang="en-US" smtClean="0"/>
+              <a:rPr lang="en-US"/>
               <a:t>Fifth level</a:t>
             </a:r>
-            <a:endParaRPr lang="en-US"/>
           </a:p>
         </p:txBody>
       </p:sp>
@@ -3462,38 +3445,37 @@
           <a:p>
             <a:pPr lvl="0"/>
             <a:r>
-              <a:rPr lang="en-US" smtClean="0"/>
+              <a:rPr lang="en-US"/>
               <a:t>Click to edit Master text styles</a:t>
             </a:r>
           </a:p>
           <a:p>
             <a:pPr lvl="1"/>
             <a:r>
-              <a:rPr lang="en-US" smtClean="0"/>
+              <a:rPr lang="en-US"/>
               <a:t>Second level</a:t>
             </a:r>
           </a:p>
           <a:p>
             <a:pPr lvl="2"/>
             <a:r>
-              <a:rPr lang="en-US" smtClean="0"/>
+              <a:rPr lang="en-US"/>
               <a:t>Third level</a:t>
             </a:r>
           </a:p>
           <a:p>
             <a:pPr lvl="3"/>
             <a:r>
-              <a:rPr lang="en-US" smtClean="0"/>
+              <a:rPr lang="en-US"/>
               <a:t>Fourth level</a:t>
             </a:r>
           </a:p>
           <a:p>
             <a:pPr lvl="4"/>
             <a:r>
-              <a:rPr lang="en-US" smtClean="0"/>
+              <a:rPr lang="en-US"/>
               <a:t>Fifth level</a:t>
             </a:r>
-            <a:endParaRPr lang="en-US"/>
           </a:p>
         </p:txBody>
       </p:sp>
@@ -3514,7 +3496,7 @@
           <a:p>
             <a:fld id="{9E9AFD63-10BD-4598-9E1E-9FFECB76D2D7}" type="datetimeFigureOut">
               <a:rPr lang="en-US" smtClean="0"/>
-              <a:t>3/6/2017</a:t>
+              <a:t>5/17/2018</a:t>
             </a:fld>
             <a:endParaRPr lang="en-US"/>
           </a:p>
@@ -3612,10 +3594,9 @@
           </a:lstStyle>
           <a:p>
             <a:r>
-              <a:rPr lang="en-US" smtClean="0"/>
+              <a:rPr lang="en-US"/>
               <a:t>Click to edit Master title style</a:t>
             </a:r>
-            <a:endParaRPr lang="en-US"/>
           </a:p>
         </p:txBody>
       </p:sp>
@@ -3678,7 +3659,7 @@
           <a:p>
             <a:pPr lvl="0"/>
             <a:r>
-              <a:rPr lang="en-US" smtClean="0"/>
+              <a:rPr lang="en-US"/>
               <a:t>Click to edit Master text styles</a:t>
             </a:r>
           </a:p>
@@ -3734,38 +3715,37 @@
           <a:p>
             <a:pPr lvl="0"/>
             <a:r>
-              <a:rPr lang="en-US" smtClean="0"/>
+              <a:rPr lang="en-US"/>
               <a:t>Click to edit Master text styles</a:t>
             </a:r>
           </a:p>
           <a:p>
             <a:pPr lvl="1"/>
             <a:r>
-              <a:rPr lang="en-US" smtClean="0"/>
+              <a:rPr lang="en-US"/>
               <a:t>Second level</a:t>
             </a:r>
           </a:p>
           <a:p>
             <a:pPr lvl="2"/>
             <a:r>
-              <a:rPr lang="en-US" smtClean="0"/>
+              <a:rPr lang="en-US"/>
               <a:t>Third level</a:t>
             </a:r>
           </a:p>
           <a:p>
             <a:pPr lvl="3"/>
             <a:r>
-              <a:rPr lang="en-US" smtClean="0"/>
+              <a:rPr lang="en-US"/>
               <a:t>Fourth level</a:t>
             </a:r>
           </a:p>
           <a:p>
             <a:pPr lvl="4"/>
             <a:r>
-              <a:rPr lang="en-US" smtClean="0"/>
+              <a:rPr lang="en-US"/>
               <a:t>Fifth level</a:t>
             </a:r>
-            <a:endParaRPr lang="en-US"/>
           </a:p>
         </p:txBody>
       </p:sp>
@@ -3828,7 +3808,7 @@
           <a:p>
             <a:pPr lvl="0"/>
             <a:r>
-              <a:rPr lang="en-US" smtClean="0"/>
+              <a:rPr lang="en-US"/>
               <a:t>Click to edit Master text styles</a:t>
             </a:r>
           </a:p>
@@ -3884,38 +3864,37 @@
           <a:p>
             <a:pPr lvl="0"/>
             <a:r>
-              <a:rPr lang="en-US" smtClean="0"/>
+              <a:rPr lang="en-US"/>
               <a:t>Click to edit Master text styles</a:t>
             </a:r>
           </a:p>
           <a:p>
             <a:pPr lvl="1"/>
             <a:r>
-              <a:rPr lang="en-US" smtClean="0"/>
+              <a:rPr lang="en-US"/>
               <a:t>Second level</a:t>
             </a:r>
           </a:p>
           <a:p>
             <a:pPr lvl="2"/>
             <a:r>
-              <a:rPr lang="en-US" smtClean="0"/>
+              <a:rPr lang="en-US"/>
               <a:t>Third level</a:t>
             </a:r>
           </a:p>
           <a:p>
             <a:pPr lvl="3"/>
             <a:r>
-              <a:rPr lang="en-US" smtClean="0"/>
+              <a:rPr lang="en-US"/>
               <a:t>Fourth level</a:t>
             </a:r>
           </a:p>
           <a:p>
             <a:pPr lvl="4"/>
             <a:r>
-              <a:rPr lang="en-US" smtClean="0"/>
+              <a:rPr lang="en-US"/>
               <a:t>Fifth level</a:t>
             </a:r>
-            <a:endParaRPr lang="en-US"/>
           </a:p>
         </p:txBody>
       </p:sp>
@@ -3936,7 +3915,7 @@
           <a:p>
             <a:fld id="{9E9AFD63-10BD-4598-9E1E-9FFECB76D2D7}" type="datetimeFigureOut">
               <a:rPr lang="en-US" smtClean="0"/>
-              <a:t>3/6/2017</a:t>
+              <a:t>5/17/2018</a:t>
             </a:fld>
             <a:endParaRPr lang="en-US"/>
           </a:p>
@@ -4030,10 +4009,9 @@
           <a:lstStyle/>
           <a:p>
             <a:r>
-              <a:rPr lang="en-US" smtClean="0"/>
+              <a:rPr lang="en-US"/>
               <a:t>Click to edit Master title style</a:t>
             </a:r>
-            <a:endParaRPr lang="en-US"/>
           </a:p>
         </p:txBody>
       </p:sp>
@@ -4054,7 +4032,7 @@
           <a:p>
             <a:fld id="{9E9AFD63-10BD-4598-9E1E-9FFECB76D2D7}" type="datetimeFigureOut">
               <a:rPr lang="en-US" smtClean="0"/>
-              <a:t>3/6/2017</a:t>
+              <a:t>5/17/2018</a:t>
             </a:fld>
             <a:endParaRPr lang="en-US"/>
           </a:p>
@@ -4149,7 +4127,7 @@
           <a:p>
             <a:fld id="{9E9AFD63-10BD-4598-9E1E-9FFECB76D2D7}" type="datetimeFigureOut">
               <a:rPr lang="en-US" smtClean="0"/>
-              <a:t>3/6/2017</a:t>
+              <a:t>5/17/2018</a:t>
             </a:fld>
             <a:endParaRPr lang="en-US"/>
           </a:p>
@@ -4252,10 +4230,9 @@
           </a:lstStyle>
           <a:p>
             <a:r>
-              <a:rPr lang="en-US" smtClean="0"/>
+              <a:rPr lang="en-US"/>
               <a:t>Click to edit Master title style</a:t>
             </a:r>
-            <a:endParaRPr lang="en-US"/>
           </a:p>
         </p:txBody>
       </p:sp>
@@ -4309,38 +4286,37 @@
           <a:p>
             <a:pPr lvl="0"/>
             <a:r>
-              <a:rPr lang="en-US" smtClean="0"/>
+              <a:rPr lang="en-US"/>
               <a:t>Click to edit Master text styles</a:t>
             </a:r>
           </a:p>
           <a:p>
             <a:pPr lvl="1"/>
             <a:r>
-              <a:rPr lang="en-US" smtClean="0"/>
+              <a:rPr lang="en-US"/>
               <a:t>Second level</a:t>
             </a:r>
           </a:p>
           <a:p>
             <a:pPr lvl="2"/>
             <a:r>
-              <a:rPr lang="en-US" smtClean="0"/>
+              <a:rPr lang="en-US"/>
               <a:t>Third level</a:t>
             </a:r>
           </a:p>
           <a:p>
             <a:pPr lvl="3"/>
             <a:r>
-              <a:rPr lang="en-US" smtClean="0"/>
+              <a:rPr lang="en-US"/>
               <a:t>Fourth level</a:t>
             </a:r>
           </a:p>
           <a:p>
             <a:pPr lvl="4"/>
             <a:r>
-              <a:rPr lang="en-US" smtClean="0"/>
+              <a:rPr lang="en-US"/>
               <a:t>Fifth level</a:t>
             </a:r>
-            <a:endParaRPr lang="en-US"/>
           </a:p>
         </p:txBody>
       </p:sp>
@@ -4403,7 +4379,7 @@
           <a:p>
             <a:pPr lvl="0"/>
             <a:r>
-              <a:rPr lang="en-US" smtClean="0"/>
+              <a:rPr lang="en-US"/>
               <a:t>Click to edit Master text styles</a:t>
             </a:r>
           </a:p>
@@ -4426,7 +4402,7 @@
           <a:p>
             <a:fld id="{9E9AFD63-10BD-4598-9E1E-9FFECB76D2D7}" type="datetimeFigureOut">
               <a:rPr lang="en-US" smtClean="0"/>
-              <a:t>3/6/2017</a:t>
+              <a:t>5/17/2018</a:t>
             </a:fld>
             <a:endParaRPr lang="en-US"/>
           </a:p>
@@ -4529,10 +4505,9 @@
           </a:lstStyle>
           <a:p>
             <a:r>
-              <a:rPr lang="en-US" smtClean="0"/>
+              <a:rPr lang="en-US"/>
               <a:t>Click to edit Master title style</a:t>
             </a:r>
-            <a:endParaRPr lang="en-US"/>
           </a:p>
         </p:txBody>
       </p:sp>
@@ -4656,7 +4631,7 @@
           <a:p>
             <a:pPr lvl="0"/>
             <a:r>
-              <a:rPr lang="en-US" smtClean="0"/>
+              <a:rPr lang="en-US"/>
               <a:t>Click to edit Master text styles</a:t>
             </a:r>
           </a:p>
@@ -4679,7 +4654,7 @@
           <a:p>
             <a:fld id="{9E9AFD63-10BD-4598-9E1E-9FFECB76D2D7}" type="datetimeFigureOut">
               <a:rPr lang="en-US" smtClean="0"/>
-              <a:t>3/6/2017</a:t>
+              <a:t>5/17/2018</a:t>
             </a:fld>
             <a:endParaRPr lang="en-US"/>
           </a:p>
@@ -4788,10 +4763,9 @@
           <a:lstStyle/>
           <a:p>
             <a:r>
-              <a:rPr lang="en-US" smtClean="0"/>
+              <a:rPr lang="en-US"/>
               <a:t>Click to edit Master title style</a:t>
             </a:r>
-            <a:endParaRPr lang="en-US"/>
           </a:p>
         </p:txBody>
       </p:sp>
@@ -4822,38 +4796,37 @@
           <a:p>
             <a:pPr lvl="0"/>
             <a:r>
-              <a:rPr lang="en-US" smtClean="0"/>
+              <a:rPr lang="en-US"/>
               <a:t>Click to edit Master text styles</a:t>
             </a:r>
           </a:p>
           <a:p>
             <a:pPr lvl="1"/>
             <a:r>
-              <a:rPr lang="en-US" smtClean="0"/>
+              <a:rPr lang="en-US"/>
               <a:t>Second level</a:t>
             </a:r>
           </a:p>
           <a:p>
             <a:pPr lvl="2"/>
             <a:r>
-              <a:rPr lang="en-US" smtClean="0"/>
+              <a:rPr lang="en-US"/>
               <a:t>Third level</a:t>
             </a:r>
           </a:p>
           <a:p>
             <a:pPr lvl="3"/>
             <a:r>
-              <a:rPr lang="en-US" smtClean="0"/>
+              <a:rPr lang="en-US"/>
               <a:t>Fourth level</a:t>
             </a:r>
           </a:p>
           <a:p>
             <a:pPr lvl="4"/>
             <a:r>
-              <a:rPr lang="en-US" smtClean="0"/>
+              <a:rPr lang="en-US"/>
               <a:t>Fifth level</a:t>
             </a:r>
-            <a:endParaRPr lang="en-US"/>
           </a:p>
         </p:txBody>
       </p:sp>
@@ -4892,7 +4865,7 @@
           <a:p>
             <a:fld id="{9E9AFD63-10BD-4598-9E1E-9FFECB76D2D7}" type="datetimeFigureOut">
               <a:rPr lang="en-US" smtClean="0"/>
-              <a:t>3/6/2017</a:t>
+              <a:t>5/17/2018</a:t>
             </a:fld>
             <a:endParaRPr lang="en-US"/>
           </a:p>
@@ -5388,40 +5361,10 @@
                 <a:ea typeface="ＭＳ Ｐゴシック" pitchFamily="-106" charset="-128"/>
                 <a:cs typeface="ＭＳ Ｐゴシック" pitchFamily="-106" charset="-128"/>
               </a:rPr>
-              <a:t>Copyright </a:t>
+              <a:t>Copyright 2014. All rights reserved. Applied </a:t>
             </a:r>
             <a:r>
-              <a:rPr lang="en-US" sz="600" dirty="0" smtClean="0">
-                <a:solidFill>
-                  <a:prstClr val="black">
-                    <a:lumMod val="65000"/>
-                    <a:lumOff val="35000"/>
-                    <a:alpha val="30000"/>
-                  </a:prstClr>
-                </a:solidFill>
-                <a:latin typeface="Arial" pitchFamily="-108" charset="0"/>
-                <a:ea typeface="ＭＳ Ｐゴシック" pitchFamily="-106" charset="-128"/>
-                <a:cs typeface="ＭＳ Ｐゴシック" pitchFamily="-106" charset="-128"/>
-              </a:rPr>
-              <a:t>2014. </a:t>
-            </a:r>
-            <a:r>
-              <a:rPr lang="en-US" sz="600" dirty="0">
-                <a:solidFill>
-                  <a:prstClr val="black">
-                    <a:lumMod val="65000"/>
-                    <a:lumOff val="35000"/>
-                    <a:alpha val="30000"/>
-                  </a:prstClr>
-                </a:solidFill>
-                <a:latin typeface="Arial" pitchFamily="-108" charset="0"/>
-                <a:ea typeface="ＭＳ Ｐゴシック" pitchFamily="-106" charset="-128"/>
-                <a:cs typeface="ＭＳ Ｐゴシック" pitchFamily="-106" charset="-128"/>
-              </a:rPr>
-              <a:t>All rights reserved. Applied </a:t>
-            </a:r>
-            <a:r>
-              <a:rPr lang="en-US" sz="600" dirty="0" err="1" smtClean="0">
+              <a:rPr lang="en-US" sz="600" dirty="0" err="1">
                 <a:solidFill>
                   <a:prstClr val="black">
                     <a:lumMod val="65000"/>
@@ -5436,7 +5379,7 @@
               <a:t>ReArch</a:t>
             </a:r>
             <a:r>
-              <a:rPr lang="en-US" sz="600" dirty="0" smtClean="0">
+              <a:rPr lang="en-US" sz="600" dirty="0">
                 <a:solidFill>
                   <a:prstClr val="black">
                     <a:lumMod val="65000"/>
@@ -5448,22 +5391,7 @@
                 <a:ea typeface="ＭＳ Ｐゴシック" pitchFamily="-106" charset="-128"/>
                 <a:cs typeface="ＭＳ Ｐゴシック" pitchFamily="-106" charset="-128"/>
               </a:rPr>
-              <a:t> </a:t>
-            </a:r>
-            <a:r>
-              <a:rPr lang="en-US" sz="600" dirty="0">
-                <a:solidFill>
-                  <a:prstClr val="black">
-                    <a:lumMod val="65000"/>
-                    <a:lumOff val="35000"/>
-                    <a:alpha val="30000"/>
-                  </a:prstClr>
-                </a:solidFill>
-                <a:latin typeface="Arial" pitchFamily="-108" charset="0"/>
-                <a:ea typeface="ＭＳ Ｐゴシック" pitchFamily="-106" charset="-128"/>
-                <a:cs typeface="ＭＳ Ｐゴシック" pitchFamily="-106" charset="-128"/>
-              </a:rPr>
-              <a:t>Associates, Inc.</a:t>
+              <a:t> Associates, Inc.</a:t>
             </a:r>
           </a:p>
         </p:txBody>
@@ -5546,35 +5474,35 @@
           <a:p>
             <a:pPr lvl="0"/>
             <a:r>
-              <a:rPr lang="en-US" smtClean="0"/>
+              <a:rPr lang="en-US"/>
               <a:t>Click to edit Master text styles</a:t>
             </a:r>
           </a:p>
           <a:p>
             <a:pPr lvl="1"/>
             <a:r>
-              <a:rPr lang="en-US" smtClean="0"/>
+              <a:rPr lang="en-US"/>
               <a:t>Second level</a:t>
             </a:r>
           </a:p>
           <a:p>
             <a:pPr lvl="2"/>
             <a:r>
-              <a:rPr lang="en-US" smtClean="0"/>
+              <a:rPr lang="en-US"/>
               <a:t>Third level</a:t>
             </a:r>
           </a:p>
           <a:p>
             <a:pPr lvl="3"/>
             <a:r>
-              <a:rPr lang="en-US" smtClean="0"/>
+              <a:rPr lang="en-US"/>
               <a:t>Fourth level</a:t>
             </a:r>
           </a:p>
           <a:p>
             <a:pPr lvl="4"/>
             <a:r>
-              <a:rPr lang="en-US" smtClean="0"/>
+              <a:rPr lang="en-US"/>
               <a:t>Fifth level</a:t>
             </a:r>
             <a:endParaRPr lang="en-US" dirty="0"/>
@@ -5607,7 +5535,7 @@
           <a:lstStyle/>
           <a:p>
             <a:r>
-              <a:rPr lang="en-US" smtClean="0"/>
+              <a:rPr lang="en-US"/>
               <a:t>Click to edit Master title style</a:t>
             </a:r>
             <a:endParaRPr lang="en-US" dirty="0"/>
@@ -6178,10 +6106,9 @@
           <a:lstStyle/>
           <a:p>
             <a:r>
-              <a:rPr lang="en-US" dirty="0" smtClean="0"/>
+              <a:rPr lang="en-US" dirty="0"/>
               <a:t>ValidationComprehensive1</a:t>
             </a:r>
-            <a:endParaRPr lang="en-US" dirty="0"/>
           </a:p>
         </p:txBody>
       </p:sp>
@@ -6189,6 +6116,1810 @@
     <p:extLst>
       <p:ext uri="{BB962C8B-B14F-4D97-AF65-F5344CB8AC3E}">
         <p14:creationId xmlns:p14="http://schemas.microsoft.com/office/powerpoint/2010/main" val="1328185869"/>
+      </p:ext>
+    </p:extLst>
+  </p:cSld>
+  <p:clrMapOvr>
+    <a:masterClrMapping/>
+  </p:clrMapOvr>
+</p:sld>
+</file>
+
+<file path=ppt/slides/slide10.xml><?xml version="1.0" encoding="utf-8"?>
+<p:sld xmlns:a="http://schemas.openxmlformats.org/drawingml/2006/main" xmlns:r="http://schemas.openxmlformats.org/officeDocument/2006/relationships" xmlns:p="http://schemas.openxmlformats.org/presentationml/2006/main">
+  <p:cSld>
+    <p:spTree>
+      <p:nvGrpSpPr>
+        <p:cNvPr id="1" name=""/>
+        <p:cNvGrpSpPr/>
+        <p:nvPr/>
+      </p:nvGrpSpPr>
+      <p:grpSpPr>
+        <a:xfrm>
+          <a:off x="0" y="0"/>
+          <a:ext cx="0" cy="0"/>
+          <a:chOff x="0" y="0"/>
+          <a:chExt cx="0" cy="0"/>
+        </a:xfrm>
+      </p:grpSpPr>
+      <p:pic>
+        <p:nvPicPr>
+          <p:cNvPr id="4" name="Picture 3">
+            <a:extLst>
+              <a:ext uri="{FF2B5EF4-FFF2-40B4-BE49-F238E27FC236}">
+                <a16:creationId xmlns:a16="http://schemas.microsoft.com/office/drawing/2014/main" id="{0FAB2579-B426-4052-B0D7-695F10C2DF40}"/>
+              </a:ext>
+            </a:extLst>
+          </p:cNvPr>
+          <p:cNvPicPr>
+            <a:picLocks noChangeAspect="1"/>
+          </p:cNvPicPr>
+          <p:nvPr/>
+        </p:nvPicPr>
+        <p:blipFill>
+          <a:blip r:embed="rId2"/>
+          <a:stretch>
+            <a:fillRect/>
+          </a:stretch>
+        </p:blipFill>
+        <p:spPr>
+          <a:xfrm>
+            <a:off x="142875" y="685800"/>
+            <a:ext cx="8858250" cy="3886200"/>
+          </a:xfrm>
+          <a:prstGeom prst="rect">
+            <a:avLst/>
+          </a:prstGeom>
+        </p:spPr>
+      </p:pic>
+    </p:spTree>
+    <p:extLst>
+      <p:ext uri="{BB962C8B-B14F-4D97-AF65-F5344CB8AC3E}">
+        <p14:creationId xmlns:p14="http://schemas.microsoft.com/office/powerpoint/2010/main" val="1914890625"/>
+      </p:ext>
+    </p:extLst>
+  </p:cSld>
+  <p:clrMapOvr>
+    <a:masterClrMapping/>
+  </p:clrMapOvr>
+</p:sld>
+</file>
+
+<file path=ppt/slides/slide11.xml><?xml version="1.0" encoding="utf-8"?>
+<p:sld xmlns:a="http://schemas.openxmlformats.org/drawingml/2006/main" xmlns:r="http://schemas.openxmlformats.org/officeDocument/2006/relationships" xmlns:p="http://schemas.openxmlformats.org/presentationml/2006/main">
+  <p:cSld>
+    <p:spTree>
+      <p:nvGrpSpPr>
+        <p:cNvPr id="1" name=""/>
+        <p:cNvGrpSpPr/>
+        <p:nvPr/>
+      </p:nvGrpSpPr>
+      <p:grpSpPr>
+        <a:xfrm>
+          <a:off x="0" y="0"/>
+          <a:ext cx="0" cy="0"/>
+          <a:chOff x="0" y="0"/>
+          <a:chExt cx="0" cy="0"/>
+        </a:xfrm>
+      </p:grpSpPr>
+      <p:pic>
+        <p:nvPicPr>
+          <p:cNvPr id="3" name="Picture 2">
+            <a:extLst>
+              <a:ext uri="{FF2B5EF4-FFF2-40B4-BE49-F238E27FC236}">
+                <a16:creationId xmlns:a16="http://schemas.microsoft.com/office/drawing/2014/main" id="{E297D448-2FBE-4BE3-B5B2-AAF4BE7D5D78}"/>
+              </a:ext>
+            </a:extLst>
+          </p:cNvPr>
+          <p:cNvPicPr>
+            <a:picLocks noChangeAspect="1"/>
+          </p:cNvPicPr>
+          <p:nvPr/>
+        </p:nvPicPr>
+        <p:blipFill>
+          <a:blip r:embed="rId2">
+            <a:extLst>
+              <a:ext uri="{28A0092B-C50C-407E-A947-70E740481C1C}">
+                <a14:useLocalDpi xmlns:a14="http://schemas.microsoft.com/office/drawing/2010/main" val="0"/>
+              </a:ext>
+            </a:extLst>
+          </a:blip>
+          <a:stretch>
+            <a:fillRect/>
+          </a:stretch>
+        </p:blipFill>
+        <p:spPr>
+          <a:xfrm>
+            <a:off x="1066800" y="112960"/>
+            <a:ext cx="7165696" cy="3316040"/>
+          </a:xfrm>
+          <a:prstGeom prst="rect">
+            <a:avLst/>
+          </a:prstGeom>
+        </p:spPr>
+      </p:pic>
+      <p:pic>
+        <p:nvPicPr>
+          <p:cNvPr id="5" name="Picture 4">
+            <a:extLst>
+              <a:ext uri="{FF2B5EF4-FFF2-40B4-BE49-F238E27FC236}">
+                <a16:creationId xmlns:a16="http://schemas.microsoft.com/office/drawing/2014/main" id="{515E658A-1C1C-42FF-9551-C2B1349B9662}"/>
+              </a:ext>
+            </a:extLst>
+          </p:cNvPr>
+          <p:cNvPicPr>
+            <a:picLocks noChangeAspect="1"/>
+          </p:cNvPicPr>
+          <p:nvPr/>
+        </p:nvPicPr>
+        <p:blipFill>
+          <a:blip r:embed="rId3">
+            <a:extLst>
+              <a:ext uri="{28A0092B-C50C-407E-A947-70E740481C1C}">
+                <a14:useLocalDpi xmlns:a14="http://schemas.microsoft.com/office/drawing/2010/main" val="0"/>
+              </a:ext>
+            </a:extLst>
+          </a:blip>
+          <a:stretch>
+            <a:fillRect/>
+          </a:stretch>
+        </p:blipFill>
+        <p:spPr>
+          <a:xfrm>
+            <a:off x="990569" y="3543346"/>
+            <a:ext cx="7318158" cy="3201694"/>
+          </a:xfrm>
+          <a:prstGeom prst="rect">
+            <a:avLst/>
+          </a:prstGeom>
+        </p:spPr>
+      </p:pic>
+      <p:sp>
+        <p:nvSpPr>
+          <p:cNvPr id="6" name="TextBox 5">
+            <a:extLst>
+              <a:ext uri="{FF2B5EF4-FFF2-40B4-BE49-F238E27FC236}">
+                <a16:creationId xmlns:a16="http://schemas.microsoft.com/office/drawing/2014/main" id="{3E71C077-2695-40FF-A9AA-17B9C5F09E51}"/>
+              </a:ext>
+            </a:extLst>
+          </p:cNvPr>
+          <p:cNvSpPr txBox="1"/>
+          <p:nvPr/>
+        </p:nvSpPr>
+        <p:spPr>
+          <a:xfrm>
+            <a:off x="7150608" y="131248"/>
+            <a:ext cx="457200" cy="138499"/>
+          </a:xfrm>
+          <a:prstGeom prst="rect">
+            <a:avLst/>
+          </a:prstGeom>
+          <a:solidFill>
+            <a:schemeClr val="bg1"/>
+          </a:solidFill>
+        </p:spPr>
+        <p:txBody>
+          <a:bodyPr wrap="square" lIns="0" tIns="0" rIns="0" bIns="0" rtlCol="0">
+            <a:spAutoFit/>
+          </a:bodyPr>
+          <a:lstStyle/>
+          <a:p>
+            <a:r>
+              <a:rPr lang="en-US" sz="900" b="1" dirty="0">
+                <a:solidFill>
+                  <a:schemeClr val="tx1">
+                    <a:lumMod val="75000"/>
+                    <a:lumOff val="25000"/>
+                  </a:schemeClr>
+                </a:solidFill>
+              </a:rPr>
+              <a:t>Pulse</a:t>
+            </a:r>
+          </a:p>
+        </p:txBody>
+      </p:sp>
+      <p:sp>
+        <p:nvSpPr>
+          <p:cNvPr id="7" name="TextBox 6">
+            <a:extLst>
+              <a:ext uri="{FF2B5EF4-FFF2-40B4-BE49-F238E27FC236}">
+                <a16:creationId xmlns:a16="http://schemas.microsoft.com/office/drawing/2014/main" id="{D2618851-5104-45DC-9E16-71E539ADE347}"/>
+              </a:ext>
+            </a:extLst>
+          </p:cNvPr>
+          <p:cNvSpPr txBox="1"/>
+          <p:nvPr/>
+        </p:nvSpPr>
+        <p:spPr>
+          <a:xfrm>
+            <a:off x="7150608" y="388856"/>
+            <a:ext cx="457200" cy="138499"/>
+          </a:xfrm>
+          <a:prstGeom prst="rect">
+            <a:avLst/>
+          </a:prstGeom>
+          <a:solidFill>
+            <a:schemeClr val="bg1"/>
+          </a:solidFill>
+        </p:spPr>
+        <p:txBody>
+          <a:bodyPr wrap="square" lIns="0" tIns="0" rIns="0" bIns="0" rtlCol="0">
+            <a:spAutoFit/>
+          </a:bodyPr>
+          <a:lstStyle/>
+          <a:p>
+            <a:r>
+              <a:rPr lang="en-US" sz="900" b="1" dirty="0">
+                <a:solidFill>
+                  <a:schemeClr val="tx1">
+                    <a:lumMod val="75000"/>
+                    <a:lumOff val="25000"/>
+                  </a:schemeClr>
+                </a:solidFill>
+              </a:rPr>
+              <a:t>Pulse</a:t>
+            </a:r>
+          </a:p>
+        </p:txBody>
+      </p:sp>
+      <p:sp>
+        <p:nvSpPr>
+          <p:cNvPr id="8" name="TextBox 7">
+            <a:extLst>
+              <a:ext uri="{FF2B5EF4-FFF2-40B4-BE49-F238E27FC236}">
+                <a16:creationId xmlns:a16="http://schemas.microsoft.com/office/drawing/2014/main" id="{A0E54B99-A4F1-4FBE-A769-4561087AC21E}"/>
+              </a:ext>
+            </a:extLst>
+          </p:cNvPr>
+          <p:cNvSpPr txBox="1"/>
+          <p:nvPr/>
+        </p:nvSpPr>
+        <p:spPr>
+          <a:xfrm>
+            <a:off x="7150608" y="654707"/>
+            <a:ext cx="457200" cy="138499"/>
+          </a:xfrm>
+          <a:prstGeom prst="rect">
+            <a:avLst/>
+          </a:prstGeom>
+          <a:solidFill>
+            <a:schemeClr val="bg1"/>
+          </a:solidFill>
+        </p:spPr>
+        <p:txBody>
+          <a:bodyPr wrap="square" lIns="0" tIns="0" rIns="0" bIns="0" rtlCol="0">
+            <a:spAutoFit/>
+          </a:bodyPr>
+          <a:lstStyle/>
+          <a:p>
+            <a:r>
+              <a:rPr lang="en-US" sz="900" b="1" dirty="0">
+                <a:solidFill>
+                  <a:schemeClr val="tx1">
+                    <a:lumMod val="75000"/>
+                    <a:lumOff val="25000"/>
+                  </a:schemeClr>
+                </a:solidFill>
+              </a:rPr>
+              <a:t>Pulse</a:t>
+            </a:r>
+          </a:p>
+        </p:txBody>
+      </p:sp>
+      <p:sp>
+        <p:nvSpPr>
+          <p:cNvPr id="9" name="TextBox 8">
+            <a:extLst>
+              <a:ext uri="{FF2B5EF4-FFF2-40B4-BE49-F238E27FC236}">
+                <a16:creationId xmlns:a16="http://schemas.microsoft.com/office/drawing/2014/main" id="{62EA1354-3DE8-4AB7-BE56-75A9F8B08CE1}"/>
+              </a:ext>
+            </a:extLst>
+          </p:cNvPr>
+          <p:cNvSpPr txBox="1"/>
+          <p:nvPr/>
+        </p:nvSpPr>
+        <p:spPr>
+          <a:xfrm>
+            <a:off x="7150608" y="923926"/>
+            <a:ext cx="457200" cy="138499"/>
+          </a:xfrm>
+          <a:prstGeom prst="rect">
+            <a:avLst/>
+          </a:prstGeom>
+          <a:solidFill>
+            <a:schemeClr val="bg1"/>
+          </a:solidFill>
+        </p:spPr>
+        <p:txBody>
+          <a:bodyPr wrap="square" lIns="0" tIns="0" rIns="0" bIns="0" rtlCol="0">
+            <a:spAutoFit/>
+          </a:bodyPr>
+          <a:lstStyle/>
+          <a:p>
+            <a:r>
+              <a:rPr lang="en-US" sz="900" b="1" dirty="0">
+                <a:solidFill>
+                  <a:schemeClr val="tx1">
+                    <a:lumMod val="75000"/>
+                    <a:lumOff val="25000"/>
+                  </a:schemeClr>
+                </a:solidFill>
+              </a:rPr>
+              <a:t>Pulse</a:t>
+            </a:r>
+          </a:p>
+        </p:txBody>
+      </p:sp>
+      <p:sp>
+        <p:nvSpPr>
+          <p:cNvPr id="10" name="TextBox 9">
+            <a:extLst>
+              <a:ext uri="{FF2B5EF4-FFF2-40B4-BE49-F238E27FC236}">
+                <a16:creationId xmlns:a16="http://schemas.microsoft.com/office/drawing/2014/main" id="{90980D60-3AA8-4D92-87D3-E4DB91E2FDC1}"/>
+              </a:ext>
+            </a:extLst>
+          </p:cNvPr>
+          <p:cNvSpPr txBox="1"/>
+          <p:nvPr/>
+        </p:nvSpPr>
+        <p:spPr>
+          <a:xfrm>
+            <a:off x="7150608" y="1183619"/>
+            <a:ext cx="457200" cy="138499"/>
+          </a:xfrm>
+          <a:prstGeom prst="rect">
+            <a:avLst/>
+          </a:prstGeom>
+          <a:solidFill>
+            <a:schemeClr val="bg1"/>
+          </a:solidFill>
+        </p:spPr>
+        <p:txBody>
+          <a:bodyPr wrap="square" lIns="0" tIns="0" rIns="0" bIns="0" rtlCol="0">
+            <a:spAutoFit/>
+          </a:bodyPr>
+          <a:lstStyle/>
+          <a:p>
+            <a:r>
+              <a:rPr lang="en-US" sz="900" b="1" dirty="0">
+                <a:solidFill>
+                  <a:schemeClr val="tx1">
+                    <a:lumMod val="75000"/>
+                    <a:lumOff val="25000"/>
+                  </a:schemeClr>
+                </a:solidFill>
+              </a:rPr>
+              <a:t>Pulse</a:t>
+            </a:r>
+          </a:p>
+        </p:txBody>
+      </p:sp>
+      <p:sp>
+        <p:nvSpPr>
+          <p:cNvPr id="11" name="TextBox 10">
+            <a:extLst>
+              <a:ext uri="{FF2B5EF4-FFF2-40B4-BE49-F238E27FC236}">
+                <a16:creationId xmlns:a16="http://schemas.microsoft.com/office/drawing/2014/main" id="{DA30DD83-C537-4834-B8A4-6E518990EA28}"/>
+              </a:ext>
+            </a:extLst>
+          </p:cNvPr>
+          <p:cNvSpPr txBox="1"/>
+          <p:nvPr/>
+        </p:nvSpPr>
+        <p:spPr>
+          <a:xfrm>
+            <a:off x="7150608" y="1448896"/>
+            <a:ext cx="457200" cy="138499"/>
+          </a:xfrm>
+          <a:prstGeom prst="rect">
+            <a:avLst/>
+          </a:prstGeom>
+          <a:solidFill>
+            <a:schemeClr val="bg1"/>
+          </a:solidFill>
+        </p:spPr>
+        <p:txBody>
+          <a:bodyPr wrap="square" lIns="0" tIns="0" rIns="0" bIns="0" rtlCol="0">
+            <a:spAutoFit/>
+          </a:bodyPr>
+          <a:lstStyle/>
+          <a:p>
+            <a:r>
+              <a:rPr lang="en-US" sz="900" b="1" dirty="0">
+                <a:solidFill>
+                  <a:schemeClr val="tx1">
+                    <a:lumMod val="75000"/>
+                    <a:lumOff val="25000"/>
+                  </a:schemeClr>
+                </a:solidFill>
+              </a:rPr>
+              <a:t>Pulse</a:t>
+            </a:r>
+          </a:p>
+        </p:txBody>
+      </p:sp>
+      <p:sp>
+        <p:nvSpPr>
+          <p:cNvPr id="12" name="TextBox 11">
+            <a:extLst>
+              <a:ext uri="{FF2B5EF4-FFF2-40B4-BE49-F238E27FC236}">
+                <a16:creationId xmlns:a16="http://schemas.microsoft.com/office/drawing/2014/main" id="{A6217D8A-4B47-4963-A4B0-218ADB9DA63B}"/>
+              </a:ext>
+            </a:extLst>
+          </p:cNvPr>
+          <p:cNvSpPr txBox="1"/>
+          <p:nvPr/>
+        </p:nvSpPr>
+        <p:spPr>
+          <a:xfrm>
+            <a:off x="7150608" y="1712749"/>
+            <a:ext cx="457200" cy="138499"/>
+          </a:xfrm>
+          <a:prstGeom prst="rect">
+            <a:avLst/>
+          </a:prstGeom>
+          <a:solidFill>
+            <a:schemeClr val="bg1"/>
+          </a:solidFill>
+        </p:spPr>
+        <p:txBody>
+          <a:bodyPr wrap="square" lIns="0" tIns="0" rIns="0" bIns="0" rtlCol="0">
+            <a:spAutoFit/>
+          </a:bodyPr>
+          <a:lstStyle/>
+          <a:p>
+            <a:r>
+              <a:rPr lang="en-US" sz="900" b="1" dirty="0">
+                <a:solidFill>
+                  <a:schemeClr val="tx1">
+                    <a:lumMod val="75000"/>
+                    <a:lumOff val="25000"/>
+                  </a:schemeClr>
+                </a:solidFill>
+              </a:rPr>
+              <a:t>Pulse</a:t>
+            </a:r>
+          </a:p>
+        </p:txBody>
+      </p:sp>
+      <p:sp>
+        <p:nvSpPr>
+          <p:cNvPr id="13" name="TextBox 12">
+            <a:extLst>
+              <a:ext uri="{FF2B5EF4-FFF2-40B4-BE49-F238E27FC236}">
+                <a16:creationId xmlns:a16="http://schemas.microsoft.com/office/drawing/2014/main" id="{D725F817-E633-4288-8D20-A394CE08B556}"/>
+              </a:ext>
+            </a:extLst>
+          </p:cNvPr>
+          <p:cNvSpPr txBox="1"/>
+          <p:nvPr/>
+        </p:nvSpPr>
+        <p:spPr>
+          <a:xfrm>
+            <a:off x="7150608" y="1982020"/>
+            <a:ext cx="457200" cy="138499"/>
+          </a:xfrm>
+          <a:prstGeom prst="rect">
+            <a:avLst/>
+          </a:prstGeom>
+          <a:solidFill>
+            <a:schemeClr val="bg1"/>
+          </a:solidFill>
+        </p:spPr>
+        <p:txBody>
+          <a:bodyPr wrap="square" lIns="0" tIns="0" rIns="0" bIns="0" rtlCol="0">
+            <a:spAutoFit/>
+          </a:bodyPr>
+          <a:lstStyle/>
+          <a:p>
+            <a:r>
+              <a:rPr lang="en-US" sz="900" b="1" dirty="0">
+                <a:solidFill>
+                  <a:schemeClr val="tx1">
+                    <a:lumMod val="75000"/>
+                    <a:lumOff val="25000"/>
+                  </a:schemeClr>
+                </a:solidFill>
+              </a:rPr>
+              <a:t>Pulse</a:t>
+            </a:r>
+          </a:p>
+        </p:txBody>
+      </p:sp>
+      <p:sp>
+        <p:nvSpPr>
+          <p:cNvPr id="14" name="TextBox 13">
+            <a:extLst>
+              <a:ext uri="{FF2B5EF4-FFF2-40B4-BE49-F238E27FC236}">
+                <a16:creationId xmlns:a16="http://schemas.microsoft.com/office/drawing/2014/main" id="{30C60737-1294-415F-99DF-B868D02AA364}"/>
+              </a:ext>
+            </a:extLst>
+          </p:cNvPr>
+          <p:cNvSpPr txBox="1"/>
+          <p:nvPr/>
+        </p:nvSpPr>
+        <p:spPr>
+          <a:xfrm>
+            <a:off x="7150608" y="2245597"/>
+            <a:ext cx="457200" cy="138499"/>
+          </a:xfrm>
+          <a:prstGeom prst="rect">
+            <a:avLst/>
+          </a:prstGeom>
+          <a:solidFill>
+            <a:schemeClr val="bg1"/>
+          </a:solidFill>
+        </p:spPr>
+        <p:txBody>
+          <a:bodyPr wrap="square" lIns="0" tIns="0" rIns="0" bIns="0" rtlCol="0">
+            <a:spAutoFit/>
+          </a:bodyPr>
+          <a:lstStyle/>
+          <a:p>
+            <a:r>
+              <a:rPr lang="en-US" sz="900" b="1" dirty="0">
+                <a:solidFill>
+                  <a:schemeClr val="tx1">
+                    <a:lumMod val="75000"/>
+                    <a:lumOff val="25000"/>
+                  </a:schemeClr>
+                </a:solidFill>
+              </a:rPr>
+              <a:t>Pulse</a:t>
+            </a:r>
+          </a:p>
+        </p:txBody>
+      </p:sp>
+      <p:sp>
+        <p:nvSpPr>
+          <p:cNvPr id="15" name="TextBox 14">
+            <a:extLst>
+              <a:ext uri="{FF2B5EF4-FFF2-40B4-BE49-F238E27FC236}">
+                <a16:creationId xmlns:a16="http://schemas.microsoft.com/office/drawing/2014/main" id="{7359FE71-2451-4835-81E7-05E23323E2AF}"/>
+              </a:ext>
+            </a:extLst>
+          </p:cNvPr>
+          <p:cNvSpPr txBox="1"/>
+          <p:nvPr/>
+        </p:nvSpPr>
+        <p:spPr>
+          <a:xfrm>
+            <a:off x="7202997" y="2509234"/>
+            <a:ext cx="457200" cy="138499"/>
+          </a:xfrm>
+          <a:prstGeom prst="rect">
+            <a:avLst/>
+          </a:prstGeom>
+          <a:solidFill>
+            <a:schemeClr val="bg1"/>
+          </a:solidFill>
+        </p:spPr>
+        <p:txBody>
+          <a:bodyPr wrap="square" lIns="0" tIns="0" rIns="0" bIns="0" rtlCol="0">
+            <a:spAutoFit/>
+          </a:bodyPr>
+          <a:lstStyle/>
+          <a:p>
+            <a:r>
+              <a:rPr lang="en-US" sz="900" b="1" dirty="0">
+                <a:solidFill>
+                  <a:schemeClr val="tx1">
+                    <a:lumMod val="75000"/>
+                    <a:lumOff val="25000"/>
+                  </a:schemeClr>
+                </a:solidFill>
+              </a:rPr>
+              <a:t>Pulse</a:t>
+            </a:r>
+          </a:p>
+        </p:txBody>
+      </p:sp>
+      <p:sp>
+        <p:nvSpPr>
+          <p:cNvPr id="16" name="TextBox 15">
+            <a:extLst>
+              <a:ext uri="{FF2B5EF4-FFF2-40B4-BE49-F238E27FC236}">
+                <a16:creationId xmlns:a16="http://schemas.microsoft.com/office/drawing/2014/main" id="{A1F05409-974E-4933-9C68-E626B0DA8D61}"/>
+              </a:ext>
+            </a:extLst>
+          </p:cNvPr>
+          <p:cNvSpPr txBox="1"/>
+          <p:nvPr/>
+        </p:nvSpPr>
+        <p:spPr>
+          <a:xfrm>
+            <a:off x="7202997" y="2772207"/>
+            <a:ext cx="457200" cy="138499"/>
+          </a:xfrm>
+          <a:prstGeom prst="rect">
+            <a:avLst/>
+          </a:prstGeom>
+          <a:solidFill>
+            <a:schemeClr val="bg1"/>
+          </a:solidFill>
+        </p:spPr>
+        <p:txBody>
+          <a:bodyPr wrap="square" lIns="0" tIns="0" rIns="0" bIns="0" rtlCol="0">
+            <a:spAutoFit/>
+          </a:bodyPr>
+          <a:lstStyle/>
+          <a:p>
+            <a:r>
+              <a:rPr lang="en-US" sz="900" b="1" dirty="0">
+                <a:solidFill>
+                  <a:schemeClr val="tx1">
+                    <a:lumMod val="75000"/>
+                    <a:lumOff val="25000"/>
+                  </a:schemeClr>
+                </a:solidFill>
+              </a:rPr>
+              <a:t>Pulse</a:t>
+            </a:r>
+          </a:p>
+        </p:txBody>
+      </p:sp>
+      <p:sp>
+        <p:nvSpPr>
+          <p:cNvPr id="17" name="TextBox 16">
+            <a:extLst>
+              <a:ext uri="{FF2B5EF4-FFF2-40B4-BE49-F238E27FC236}">
+                <a16:creationId xmlns:a16="http://schemas.microsoft.com/office/drawing/2014/main" id="{65492F7A-E12E-4DDF-829F-D9AAFEBDB5CA}"/>
+              </a:ext>
+            </a:extLst>
+          </p:cNvPr>
+          <p:cNvSpPr txBox="1"/>
+          <p:nvPr/>
+        </p:nvSpPr>
+        <p:spPr>
+          <a:xfrm>
+            <a:off x="7202997" y="3043394"/>
+            <a:ext cx="457200" cy="138499"/>
+          </a:xfrm>
+          <a:prstGeom prst="rect">
+            <a:avLst/>
+          </a:prstGeom>
+          <a:solidFill>
+            <a:schemeClr val="bg1"/>
+          </a:solidFill>
+        </p:spPr>
+        <p:txBody>
+          <a:bodyPr wrap="square" lIns="0" tIns="0" rIns="0" bIns="0" rtlCol="0">
+            <a:spAutoFit/>
+          </a:bodyPr>
+          <a:lstStyle/>
+          <a:p>
+            <a:r>
+              <a:rPr lang="en-US" sz="900" b="1" dirty="0">
+                <a:solidFill>
+                  <a:schemeClr val="tx1">
+                    <a:lumMod val="75000"/>
+                    <a:lumOff val="25000"/>
+                  </a:schemeClr>
+                </a:solidFill>
+              </a:rPr>
+              <a:t>Pulse</a:t>
+            </a:r>
+          </a:p>
+        </p:txBody>
+      </p:sp>
+      <p:sp>
+        <p:nvSpPr>
+          <p:cNvPr id="18" name="TextBox 17">
+            <a:extLst>
+              <a:ext uri="{FF2B5EF4-FFF2-40B4-BE49-F238E27FC236}">
+                <a16:creationId xmlns:a16="http://schemas.microsoft.com/office/drawing/2014/main" id="{FBDC41CC-09EC-4D04-AD73-FA6F91A8ED7D}"/>
+              </a:ext>
+            </a:extLst>
+          </p:cNvPr>
+          <p:cNvSpPr txBox="1"/>
+          <p:nvPr/>
+        </p:nvSpPr>
+        <p:spPr>
+          <a:xfrm>
+            <a:off x="7278624" y="4238378"/>
+            <a:ext cx="457200" cy="138499"/>
+          </a:xfrm>
+          <a:prstGeom prst="rect">
+            <a:avLst/>
+          </a:prstGeom>
+          <a:solidFill>
+            <a:schemeClr val="bg1"/>
+          </a:solidFill>
+        </p:spPr>
+        <p:txBody>
+          <a:bodyPr wrap="square" lIns="0" tIns="0" rIns="0" bIns="0" rtlCol="0">
+            <a:spAutoFit/>
+          </a:bodyPr>
+          <a:lstStyle/>
+          <a:p>
+            <a:r>
+              <a:rPr lang="en-US" sz="900" b="1" dirty="0">
+                <a:solidFill>
+                  <a:schemeClr val="tx1">
+                    <a:lumMod val="75000"/>
+                    <a:lumOff val="25000"/>
+                  </a:schemeClr>
+                </a:solidFill>
+              </a:rPr>
+              <a:t>Pulse</a:t>
+            </a:r>
+          </a:p>
+        </p:txBody>
+      </p:sp>
+      <p:sp>
+        <p:nvSpPr>
+          <p:cNvPr id="19" name="TextBox 18">
+            <a:extLst>
+              <a:ext uri="{FF2B5EF4-FFF2-40B4-BE49-F238E27FC236}">
+                <a16:creationId xmlns:a16="http://schemas.microsoft.com/office/drawing/2014/main" id="{05EB7EF1-D13D-41C3-95E0-C223D477D324}"/>
+              </a:ext>
+            </a:extLst>
+          </p:cNvPr>
+          <p:cNvSpPr txBox="1"/>
+          <p:nvPr/>
+        </p:nvSpPr>
+        <p:spPr>
+          <a:xfrm>
+            <a:off x="7278624" y="4495986"/>
+            <a:ext cx="457200" cy="138499"/>
+          </a:xfrm>
+          <a:prstGeom prst="rect">
+            <a:avLst/>
+          </a:prstGeom>
+          <a:solidFill>
+            <a:schemeClr val="bg1"/>
+          </a:solidFill>
+        </p:spPr>
+        <p:txBody>
+          <a:bodyPr wrap="square" lIns="0" tIns="0" rIns="0" bIns="0" rtlCol="0">
+            <a:spAutoFit/>
+          </a:bodyPr>
+          <a:lstStyle/>
+          <a:p>
+            <a:r>
+              <a:rPr lang="en-US" sz="900" b="1" dirty="0">
+                <a:solidFill>
+                  <a:schemeClr val="tx1">
+                    <a:lumMod val="75000"/>
+                    <a:lumOff val="25000"/>
+                  </a:schemeClr>
+                </a:solidFill>
+              </a:rPr>
+              <a:t>Pulse</a:t>
+            </a:r>
+          </a:p>
+        </p:txBody>
+      </p:sp>
+      <p:sp>
+        <p:nvSpPr>
+          <p:cNvPr id="20" name="TextBox 19">
+            <a:extLst>
+              <a:ext uri="{FF2B5EF4-FFF2-40B4-BE49-F238E27FC236}">
+                <a16:creationId xmlns:a16="http://schemas.microsoft.com/office/drawing/2014/main" id="{301B3CAF-2AB8-4A73-BB03-339744B75F74}"/>
+              </a:ext>
+            </a:extLst>
+          </p:cNvPr>
+          <p:cNvSpPr txBox="1"/>
+          <p:nvPr/>
+        </p:nvSpPr>
+        <p:spPr>
+          <a:xfrm>
+            <a:off x="7278624" y="4761837"/>
+            <a:ext cx="457200" cy="138499"/>
+          </a:xfrm>
+          <a:prstGeom prst="rect">
+            <a:avLst/>
+          </a:prstGeom>
+          <a:solidFill>
+            <a:schemeClr val="bg1"/>
+          </a:solidFill>
+        </p:spPr>
+        <p:txBody>
+          <a:bodyPr wrap="square" lIns="0" tIns="0" rIns="0" bIns="0" rtlCol="0">
+            <a:spAutoFit/>
+          </a:bodyPr>
+          <a:lstStyle/>
+          <a:p>
+            <a:r>
+              <a:rPr lang="en-US" sz="900" b="1" dirty="0">
+                <a:solidFill>
+                  <a:schemeClr val="tx1">
+                    <a:lumMod val="75000"/>
+                    <a:lumOff val="25000"/>
+                  </a:schemeClr>
+                </a:solidFill>
+              </a:rPr>
+              <a:t>Pulse</a:t>
+            </a:r>
+          </a:p>
+        </p:txBody>
+      </p:sp>
+      <p:sp>
+        <p:nvSpPr>
+          <p:cNvPr id="21" name="TextBox 20">
+            <a:extLst>
+              <a:ext uri="{FF2B5EF4-FFF2-40B4-BE49-F238E27FC236}">
+                <a16:creationId xmlns:a16="http://schemas.microsoft.com/office/drawing/2014/main" id="{5B13948F-BACC-4B6D-A963-F469B6FE91A3}"/>
+              </a:ext>
+            </a:extLst>
+          </p:cNvPr>
+          <p:cNvSpPr txBox="1"/>
+          <p:nvPr/>
+        </p:nvSpPr>
+        <p:spPr>
+          <a:xfrm>
+            <a:off x="7278624" y="5031056"/>
+            <a:ext cx="457200" cy="138499"/>
+          </a:xfrm>
+          <a:prstGeom prst="rect">
+            <a:avLst/>
+          </a:prstGeom>
+          <a:solidFill>
+            <a:schemeClr val="bg1"/>
+          </a:solidFill>
+        </p:spPr>
+        <p:txBody>
+          <a:bodyPr wrap="square" lIns="0" tIns="0" rIns="0" bIns="0" rtlCol="0">
+            <a:spAutoFit/>
+          </a:bodyPr>
+          <a:lstStyle/>
+          <a:p>
+            <a:r>
+              <a:rPr lang="en-US" sz="900" b="1" dirty="0">
+                <a:solidFill>
+                  <a:schemeClr val="tx1">
+                    <a:lumMod val="75000"/>
+                    <a:lumOff val="25000"/>
+                  </a:schemeClr>
+                </a:solidFill>
+              </a:rPr>
+              <a:t>Pulse</a:t>
+            </a:r>
+          </a:p>
+        </p:txBody>
+      </p:sp>
+      <p:sp>
+        <p:nvSpPr>
+          <p:cNvPr id="22" name="TextBox 21">
+            <a:extLst>
+              <a:ext uri="{FF2B5EF4-FFF2-40B4-BE49-F238E27FC236}">
+                <a16:creationId xmlns:a16="http://schemas.microsoft.com/office/drawing/2014/main" id="{D1D994C2-347F-475B-A1B6-AED96124D83C}"/>
+              </a:ext>
+            </a:extLst>
+          </p:cNvPr>
+          <p:cNvSpPr txBox="1"/>
+          <p:nvPr/>
+        </p:nvSpPr>
+        <p:spPr>
+          <a:xfrm>
+            <a:off x="7278624" y="5290749"/>
+            <a:ext cx="457200" cy="138499"/>
+          </a:xfrm>
+          <a:prstGeom prst="rect">
+            <a:avLst/>
+          </a:prstGeom>
+          <a:solidFill>
+            <a:schemeClr val="bg1"/>
+          </a:solidFill>
+        </p:spPr>
+        <p:txBody>
+          <a:bodyPr wrap="square" lIns="0" tIns="0" rIns="0" bIns="0" rtlCol="0">
+            <a:spAutoFit/>
+          </a:bodyPr>
+          <a:lstStyle/>
+          <a:p>
+            <a:r>
+              <a:rPr lang="en-US" sz="900" b="1" dirty="0">
+                <a:solidFill>
+                  <a:schemeClr val="tx1">
+                    <a:lumMod val="75000"/>
+                    <a:lumOff val="25000"/>
+                  </a:schemeClr>
+                </a:solidFill>
+              </a:rPr>
+              <a:t>Pulse</a:t>
+            </a:r>
+          </a:p>
+        </p:txBody>
+      </p:sp>
+      <p:sp>
+        <p:nvSpPr>
+          <p:cNvPr id="23" name="TextBox 22">
+            <a:extLst>
+              <a:ext uri="{FF2B5EF4-FFF2-40B4-BE49-F238E27FC236}">
+                <a16:creationId xmlns:a16="http://schemas.microsoft.com/office/drawing/2014/main" id="{25D4599D-9949-4780-B916-D576EAC11B02}"/>
+              </a:ext>
+            </a:extLst>
+          </p:cNvPr>
+          <p:cNvSpPr txBox="1"/>
+          <p:nvPr/>
+        </p:nvSpPr>
+        <p:spPr>
+          <a:xfrm>
+            <a:off x="7278624" y="5556026"/>
+            <a:ext cx="457200" cy="138499"/>
+          </a:xfrm>
+          <a:prstGeom prst="rect">
+            <a:avLst/>
+          </a:prstGeom>
+          <a:solidFill>
+            <a:schemeClr val="bg1"/>
+          </a:solidFill>
+        </p:spPr>
+        <p:txBody>
+          <a:bodyPr wrap="square" lIns="0" tIns="0" rIns="0" bIns="0" rtlCol="0">
+            <a:spAutoFit/>
+          </a:bodyPr>
+          <a:lstStyle/>
+          <a:p>
+            <a:r>
+              <a:rPr lang="en-US" sz="900" b="1" dirty="0">
+                <a:solidFill>
+                  <a:schemeClr val="tx1">
+                    <a:lumMod val="75000"/>
+                    <a:lumOff val="25000"/>
+                  </a:schemeClr>
+                </a:solidFill>
+              </a:rPr>
+              <a:t>Pulse</a:t>
+            </a:r>
+          </a:p>
+        </p:txBody>
+      </p:sp>
+    </p:spTree>
+    <p:extLst>
+      <p:ext uri="{BB962C8B-B14F-4D97-AF65-F5344CB8AC3E}">
+        <p14:creationId xmlns:p14="http://schemas.microsoft.com/office/powerpoint/2010/main" val="32163525"/>
+      </p:ext>
+    </p:extLst>
+  </p:cSld>
+  <p:clrMapOvr>
+    <a:masterClrMapping/>
+  </p:clrMapOvr>
+</p:sld>
+</file>
+
+<file path=ppt/slides/slide12.xml><?xml version="1.0" encoding="utf-8"?>
+<p:sld xmlns:a="http://schemas.openxmlformats.org/drawingml/2006/main" xmlns:r="http://schemas.openxmlformats.org/officeDocument/2006/relationships" xmlns:p="http://schemas.openxmlformats.org/presentationml/2006/main">
+  <p:cSld>
+    <p:spTree>
+      <p:nvGrpSpPr>
+        <p:cNvPr id="1" name=""/>
+        <p:cNvGrpSpPr/>
+        <p:nvPr/>
+      </p:nvGrpSpPr>
+      <p:grpSpPr>
+        <a:xfrm>
+          <a:off x="0" y="0"/>
+          <a:ext cx="0" cy="0"/>
+          <a:chOff x="0" y="0"/>
+          <a:chExt cx="0" cy="0"/>
+        </a:xfrm>
+      </p:grpSpPr>
+      <p:pic>
+        <p:nvPicPr>
+          <p:cNvPr id="3" name="Picture 2">
+            <a:extLst>
+              <a:ext uri="{FF2B5EF4-FFF2-40B4-BE49-F238E27FC236}">
+                <a16:creationId xmlns:a16="http://schemas.microsoft.com/office/drawing/2014/main" id="{91FDB6B2-FAC2-4D19-983B-7C66047582C6}"/>
+              </a:ext>
+            </a:extLst>
+          </p:cNvPr>
+          <p:cNvPicPr>
+            <a:picLocks noChangeAspect="1"/>
+          </p:cNvPicPr>
+          <p:nvPr/>
+        </p:nvPicPr>
+        <p:blipFill>
+          <a:blip r:embed="rId2">
+            <a:extLst>
+              <a:ext uri="{28A0092B-C50C-407E-A947-70E740481C1C}">
+                <a14:useLocalDpi xmlns:a14="http://schemas.microsoft.com/office/drawing/2010/main" val="0"/>
+              </a:ext>
+            </a:extLst>
+          </a:blip>
+          <a:stretch>
+            <a:fillRect/>
+          </a:stretch>
+        </p:blipFill>
+        <p:spPr>
+          <a:xfrm>
+            <a:off x="911027" y="228600"/>
+            <a:ext cx="7165696" cy="3316040"/>
+          </a:xfrm>
+          <a:prstGeom prst="rect">
+            <a:avLst/>
+          </a:prstGeom>
+        </p:spPr>
+      </p:pic>
+      <p:pic>
+        <p:nvPicPr>
+          <p:cNvPr id="5" name="Picture 4">
+            <a:extLst>
+              <a:ext uri="{FF2B5EF4-FFF2-40B4-BE49-F238E27FC236}">
+                <a16:creationId xmlns:a16="http://schemas.microsoft.com/office/drawing/2014/main" id="{3270190F-0D39-452C-A497-0211FF6F21C6}"/>
+              </a:ext>
+            </a:extLst>
+          </p:cNvPr>
+          <p:cNvPicPr>
+            <a:picLocks noChangeAspect="1"/>
+          </p:cNvPicPr>
+          <p:nvPr/>
+        </p:nvPicPr>
+        <p:blipFill>
+          <a:blip r:embed="rId3">
+            <a:extLst>
+              <a:ext uri="{28A0092B-C50C-407E-A947-70E740481C1C}">
+                <a14:useLocalDpi xmlns:a14="http://schemas.microsoft.com/office/drawing/2010/main" val="0"/>
+              </a:ext>
+            </a:extLst>
+          </a:blip>
+          <a:stretch>
+            <a:fillRect/>
+          </a:stretch>
+        </p:blipFill>
+        <p:spPr>
+          <a:xfrm>
+            <a:off x="863382" y="3656306"/>
+            <a:ext cx="7260985" cy="3201694"/>
+          </a:xfrm>
+          <a:prstGeom prst="rect">
+            <a:avLst/>
+          </a:prstGeom>
+        </p:spPr>
+      </p:pic>
+      <p:sp>
+        <p:nvSpPr>
+          <p:cNvPr id="6" name="TextBox 5">
+            <a:extLst>
+              <a:ext uri="{FF2B5EF4-FFF2-40B4-BE49-F238E27FC236}">
+                <a16:creationId xmlns:a16="http://schemas.microsoft.com/office/drawing/2014/main" id="{B0134AFF-AAF9-4556-9214-50E8CDD21B04}"/>
+              </a:ext>
+            </a:extLst>
+          </p:cNvPr>
+          <p:cNvSpPr txBox="1"/>
+          <p:nvPr/>
+        </p:nvSpPr>
+        <p:spPr>
+          <a:xfrm>
+            <a:off x="6982968" y="246888"/>
+            <a:ext cx="457200" cy="138499"/>
+          </a:xfrm>
+          <a:prstGeom prst="rect">
+            <a:avLst/>
+          </a:prstGeom>
+          <a:solidFill>
+            <a:schemeClr val="bg1"/>
+          </a:solidFill>
+        </p:spPr>
+        <p:txBody>
+          <a:bodyPr wrap="square" lIns="0" tIns="0" rIns="0" bIns="0" rtlCol="0">
+            <a:spAutoFit/>
+          </a:bodyPr>
+          <a:lstStyle/>
+          <a:p>
+            <a:r>
+              <a:rPr lang="en-US" sz="900" b="1" dirty="0">
+                <a:solidFill>
+                  <a:schemeClr val="tx1">
+                    <a:lumMod val="75000"/>
+                    <a:lumOff val="25000"/>
+                  </a:schemeClr>
+                </a:solidFill>
+              </a:rPr>
+              <a:t>Pulse</a:t>
+            </a:r>
+          </a:p>
+        </p:txBody>
+      </p:sp>
+      <p:sp>
+        <p:nvSpPr>
+          <p:cNvPr id="7" name="TextBox 6">
+            <a:extLst>
+              <a:ext uri="{FF2B5EF4-FFF2-40B4-BE49-F238E27FC236}">
+                <a16:creationId xmlns:a16="http://schemas.microsoft.com/office/drawing/2014/main" id="{40D8AB15-87AF-41A9-9FF2-5833BF99B2BC}"/>
+              </a:ext>
+            </a:extLst>
+          </p:cNvPr>
+          <p:cNvSpPr txBox="1"/>
+          <p:nvPr/>
+        </p:nvSpPr>
+        <p:spPr>
+          <a:xfrm>
+            <a:off x="6982968" y="504496"/>
+            <a:ext cx="457200" cy="138499"/>
+          </a:xfrm>
+          <a:prstGeom prst="rect">
+            <a:avLst/>
+          </a:prstGeom>
+          <a:solidFill>
+            <a:schemeClr val="bg1"/>
+          </a:solidFill>
+        </p:spPr>
+        <p:txBody>
+          <a:bodyPr wrap="square" lIns="0" tIns="0" rIns="0" bIns="0" rtlCol="0">
+            <a:spAutoFit/>
+          </a:bodyPr>
+          <a:lstStyle/>
+          <a:p>
+            <a:r>
+              <a:rPr lang="en-US" sz="900" b="1" dirty="0">
+                <a:solidFill>
+                  <a:schemeClr val="tx1">
+                    <a:lumMod val="75000"/>
+                    <a:lumOff val="25000"/>
+                  </a:schemeClr>
+                </a:solidFill>
+              </a:rPr>
+              <a:t>Pulse</a:t>
+            </a:r>
+          </a:p>
+        </p:txBody>
+      </p:sp>
+      <p:sp>
+        <p:nvSpPr>
+          <p:cNvPr id="8" name="TextBox 7">
+            <a:extLst>
+              <a:ext uri="{FF2B5EF4-FFF2-40B4-BE49-F238E27FC236}">
+                <a16:creationId xmlns:a16="http://schemas.microsoft.com/office/drawing/2014/main" id="{20AAA9CE-17C5-4622-8701-74A8E111C9FC}"/>
+              </a:ext>
+            </a:extLst>
+          </p:cNvPr>
+          <p:cNvSpPr txBox="1"/>
+          <p:nvPr/>
+        </p:nvSpPr>
+        <p:spPr>
+          <a:xfrm>
+            <a:off x="6982968" y="770347"/>
+            <a:ext cx="457200" cy="138499"/>
+          </a:xfrm>
+          <a:prstGeom prst="rect">
+            <a:avLst/>
+          </a:prstGeom>
+          <a:solidFill>
+            <a:schemeClr val="bg1"/>
+          </a:solidFill>
+        </p:spPr>
+        <p:txBody>
+          <a:bodyPr wrap="square" lIns="0" tIns="0" rIns="0" bIns="0" rtlCol="0">
+            <a:spAutoFit/>
+          </a:bodyPr>
+          <a:lstStyle/>
+          <a:p>
+            <a:r>
+              <a:rPr lang="en-US" sz="900" b="1" dirty="0">
+                <a:solidFill>
+                  <a:schemeClr val="tx1">
+                    <a:lumMod val="75000"/>
+                    <a:lumOff val="25000"/>
+                  </a:schemeClr>
+                </a:solidFill>
+              </a:rPr>
+              <a:t>Pulse</a:t>
+            </a:r>
+          </a:p>
+        </p:txBody>
+      </p:sp>
+      <p:sp>
+        <p:nvSpPr>
+          <p:cNvPr id="9" name="TextBox 8">
+            <a:extLst>
+              <a:ext uri="{FF2B5EF4-FFF2-40B4-BE49-F238E27FC236}">
+                <a16:creationId xmlns:a16="http://schemas.microsoft.com/office/drawing/2014/main" id="{6B7E0DE1-F42C-4ED3-A783-69A4234996F7}"/>
+              </a:ext>
+            </a:extLst>
+          </p:cNvPr>
+          <p:cNvSpPr txBox="1"/>
+          <p:nvPr/>
+        </p:nvSpPr>
+        <p:spPr>
+          <a:xfrm>
+            <a:off x="6982968" y="1039566"/>
+            <a:ext cx="457200" cy="138499"/>
+          </a:xfrm>
+          <a:prstGeom prst="rect">
+            <a:avLst/>
+          </a:prstGeom>
+          <a:solidFill>
+            <a:schemeClr val="bg1"/>
+          </a:solidFill>
+        </p:spPr>
+        <p:txBody>
+          <a:bodyPr wrap="square" lIns="0" tIns="0" rIns="0" bIns="0" rtlCol="0">
+            <a:spAutoFit/>
+          </a:bodyPr>
+          <a:lstStyle/>
+          <a:p>
+            <a:r>
+              <a:rPr lang="en-US" sz="900" b="1" dirty="0">
+                <a:solidFill>
+                  <a:schemeClr val="tx1">
+                    <a:lumMod val="75000"/>
+                    <a:lumOff val="25000"/>
+                  </a:schemeClr>
+                </a:solidFill>
+              </a:rPr>
+              <a:t>Pulse</a:t>
+            </a:r>
+          </a:p>
+        </p:txBody>
+      </p:sp>
+      <p:sp>
+        <p:nvSpPr>
+          <p:cNvPr id="10" name="TextBox 9">
+            <a:extLst>
+              <a:ext uri="{FF2B5EF4-FFF2-40B4-BE49-F238E27FC236}">
+                <a16:creationId xmlns:a16="http://schemas.microsoft.com/office/drawing/2014/main" id="{2D86CF6A-4C0F-4026-9E84-85057E51871D}"/>
+              </a:ext>
+            </a:extLst>
+          </p:cNvPr>
+          <p:cNvSpPr txBox="1"/>
+          <p:nvPr/>
+        </p:nvSpPr>
+        <p:spPr>
+          <a:xfrm>
+            <a:off x="6982968" y="1299259"/>
+            <a:ext cx="457200" cy="138499"/>
+          </a:xfrm>
+          <a:prstGeom prst="rect">
+            <a:avLst/>
+          </a:prstGeom>
+          <a:solidFill>
+            <a:schemeClr val="bg1"/>
+          </a:solidFill>
+        </p:spPr>
+        <p:txBody>
+          <a:bodyPr wrap="square" lIns="0" tIns="0" rIns="0" bIns="0" rtlCol="0">
+            <a:spAutoFit/>
+          </a:bodyPr>
+          <a:lstStyle/>
+          <a:p>
+            <a:r>
+              <a:rPr lang="en-US" sz="900" b="1" dirty="0">
+                <a:solidFill>
+                  <a:schemeClr val="tx1">
+                    <a:lumMod val="75000"/>
+                    <a:lumOff val="25000"/>
+                  </a:schemeClr>
+                </a:solidFill>
+              </a:rPr>
+              <a:t>Pulse</a:t>
+            </a:r>
+          </a:p>
+        </p:txBody>
+      </p:sp>
+      <p:sp>
+        <p:nvSpPr>
+          <p:cNvPr id="11" name="TextBox 10">
+            <a:extLst>
+              <a:ext uri="{FF2B5EF4-FFF2-40B4-BE49-F238E27FC236}">
+                <a16:creationId xmlns:a16="http://schemas.microsoft.com/office/drawing/2014/main" id="{07B6A8A8-A803-4E95-B51A-1DC3AA0AA065}"/>
+              </a:ext>
+            </a:extLst>
+          </p:cNvPr>
+          <p:cNvSpPr txBox="1"/>
+          <p:nvPr/>
+        </p:nvSpPr>
+        <p:spPr>
+          <a:xfrm>
+            <a:off x="6982968" y="1564536"/>
+            <a:ext cx="457200" cy="138499"/>
+          </a:xfrm>
+          <a:prstGeom prst="rect">
+            <a:avLst/>
+          </a:prstGeom>
+          <a:solidFill>
+            <a:schemeClr val="bg1"/>
+          </a:solidFill>
+        </p:spPr>
+        <p:txBody>
+          <a:bodyPr wrap="square" lIns="0" tIns="0" rIns="0" bIns="0" rtlCol="0">
+            <a:spAutoFit/>
+          </a:bodyPr>
+          <a:lstStyle/>
+          <a:p>
+            <a:r>
+              <a:rPr lang="en-US" sz="900" b="1" dirty="0">
+                <a:solidFill>
+                  <a:schemeClr val="tx1">
+                    <a:lumMod val="75000"/>
+                    <a:lumOff val="25000"/>
+                  </a:schemeClr>
+                </a:solidFill>
+              </a:rPr>
+              <a:t>Pulse</a:t>
+            </a:r>
+          </a:p>
+        </p:txBody>
+      </p:sp>
+      <p:sp>
+        <p:nvSpPr>
+          <p:cNvPr id="12" name="TextBox 11">
+            <a:extLst>
+              <a:ext uri="{FF2B5EF4-FFF2-40B4-BE49-F238E27FC236}">
+                <a16:creationId xmlns:a16="http://schemas.microsoft.com/office/drawing/2014/main" id="{3D8E4736-76A9-4E7D-BAE6-A4B8872CFFDF}"/>
+              </a:ext>
+            </a:extLst>
+          </p:cNvPr>
+          <p:cNvSpPr txBox="1"/>
+          <p:nvPr/>
+        </p:nvSpPr>
+        <p:spPr>
+          <a:xfrm>
+            <a:off x="6982968" y="1828389"/>
+            <a:ext cx="457200" cy="138499"/>
+          </a:xfrm>
+          <a:prstGeom prst="rect">
+            <a:avLst/>
+          </a:prstGeom>
+          <a:solidFill>
+            <a:schemeClr val="bg1"/>
+          </a:solidFill>
+        </p:spPr>
+        <p:txBody>
+          <a:bodyPr wrap="square" lIns="0" tIns="0" rIns="0" bIns="0" rtlCol="0">
+            <a:spAutoFit/>
+          </a:bodyPr>
+          <a:lstStyle/>
+          <a:p>
+            <a:r>
+              <a:rPr lang="en-US" sz="900" b="1" dirty="0">
+                <a:solidFill>
+                  <a:schemeClr val="tx1">
+                    <a:lumMod val="75000"/>
+                    <a:lumOff val="25000"/>
+                  </a:schemeClr>
+                </a:solidFill>
+              </a:rPr>
+              <a:t>Pulse</a:t>
+            </a:r>
+          </a:p>
+        </p:txBody>
+      </p:sp>
+      <p:sp>
+        <p:nvSpPr>
+          <p:cNvPr id="13" name="TextBox 12">
+            <a:extLst>
+              <a:ext uri="{FF2B5EF4-FFF2-40B4-BE49-F238E27FC236}">
+                <a16:creationId xmlns:a16="http://schemas.microsoft.com/office/drawing/2014/main" id="{B4029F8E-2603-416D-A46A-10B252774841}"/>
+              </a:ext>
+            </a:extLst>
+          </p:cNvPr>
+          <p:cNvSpPr txBox="1"/>
+          <p:nvPr/>
+        </p:nvSpPr>
+        <p:spPr>
+          <a:xfrm>
+            <a:off x="6982968" y="2097660"/>
+            <a:ext cx="457200" cy="138499"/>
+          </a:xfrm>
+          <a:prstGeom prst="rect">
+            <a:avLst/>
+          </a:prstGeom>
+          <a:solidFill>
+            <a:schemeClr val="bg1"/>
+          </a:solidFill>
+        </p:spPr>
+        <p:txBody>
+          <a:bodyPr wrap="square" lIns="0" tIns="0" rIns="0" bIns="0" rtlCol="0">
+            <a:spAutoFit/>
+          </a:bodyPr>
+          <a:lstStyle/>
+          <a:p>
+            <a:r>
+              <a:rPr lang="en-US" sz="900" b="1" dirty="0">
+                <a:solidFill>
+                  <a:schemeClr val="tx1">
+                    <a:lumMod val="75000"/>
+                    <a:lumOff val="25000"/>
+                  </a:schemeClr>
+                </a:solidFill>
+              </a:rPr>
+              <a:t>Pulse</a:t>
+            </a:r>
+          </a:p>
+        </p:txBody>
+      </p:sp>
+      <p:sp>
+        <p:nvSpPr>
+          <p:cNvPr id="14" name="TextBox 13">
+            <a:extLst>
+              <a:ext uri="{FF2B5EF4-FFF2-40B4-BE49-F238E27FC236}">
+                <a16:creationId xmlns:a16="http://schemas.microsoft.com/office/drawing/2014/main" id="{4919CE78-A032-46C9-8924-D3682AE0325E}"/>
+              </a:ext>
+            </a:extLst>
+          </p:cNvPr>
+          <p:cNvSpPr txBox="1"/>
+          <p:nvPr/>
+        </p:nvSpPr>
+        <p:spPr>
+          <a:xfrm>
+            <a:off x="6982968" y="2361237"/>
+            <a:ext cx="457200" cy="138499"/>
+          </a:xfrm>
+          <a:prstGeom prst="rect">
+            <a:avLst/>
+          </a:prstGeom>
+          <a:solidFill>
+            <a:schemeClr val="bg1"/>
+          </a:solidFill>
+        </p:spPr>
+        <p:txBody>
+          <a:bodyPr wrap="square" lIns="0" tIns="0" rIns="0" bIns="0" rtlCol="0">
+            <a:spAutoFit/>
+          </a:bodyPr>
+          <a:lstStyle/>
+          <a:p>
+            <a:r>
+              <a:rPr lang="en-US" sz="900" b="1" dirty="0">
+                <a:solidFill>
+                  <a:schemeClr val="tx1">
+                    <a:lumMod val="75000"/>
+                    <a:lumOff val="25000"/>
+                  </a:schemeClr>
+                </a:solidFill>
+              </a:rPr>
+              <a:t>Pulse</a:t>
+            </a:r>
+          </a:p>
+        </p:txBody>
+      </p:sp>
+      <p:sp>
+        <p:nvSpPr>
+          <p:cNvPr id="15" name="TextBox 14">
+            <a:extLst>
+              <a:ext uri="{FF2B5EF4-FFF2-40B4-BE49-F238E27FC236}">
+                <a16:creationId xmlns:a16="http://schemas.microsoft.com/office/drawing/2014/main" id="{C7FADA4A-21F6-4F99-AAAD-243002B3AFE2}"/>
+              </a:ext>
+            </a:extLst>
+          </p:cNvPr>
+          <p:cNvSpPr txBox="1"/>
+          <p:nvPr/>
+        </p:nvSpPr>
+        <p:spPr>
+          <a:xfrm>
+            <a:off x="7035357" y="2624874"/>
+            <a:ext cx="457200" cy="138499"/>
+          </a:xfrm>
+          <a:prstGeom prst="rect">
+            <a:avLst/>
+          </a:prstGeom>
+          <a:solidFill>
+            <a:schemeClr val="bg1"/>
+          </a:solidFill>
+        </p:spPr>
+        <p:txBody>
+          <a:bodyPr wrap="square" lIns="0" tIns="0" rIns="0" bIns="0" rtlCol="0">
+            <a:spAutoFit/>
+          </a:bodyPr>
+          <a:lstStyle/>
+          <a:p>
+            <a:r>
+              <a:rPr lang="en-US" sz="900" b="1" dirty="0">
+                <a:solidFill>
+                  <a:schemeClr val="tx1">
+                    <a:lumMod val="75000"/>
+                    <a:lumOff val="25000"/>
+                  </a:schemeClr>
+                </a:solidFill>
+              </a:rPr>
+              <a:t>Pulse</a:t>
+            </a:r>
+          </a:p>
+        </p:txBody>
+      </p:sp>
+      <p:sp>
+        <p:nvSpPr>
+          <p:cNvPr id="16" name="TextBox 15">
+            <a:extLst>
+              <a:ext uri="{FF2B5EF4-FFF2-40B4-BE49-F238E27FC236}">
+                <a16:creationId xmlns:a16="http://schemas.microsoft.com/office/drawing/2014/main" id="{60905333-63CA-4996-B1CB-FBC13F27E191}"/>
+              </a:ext>
+            </a:extLst>
+          </p:cNvPr>
+          <p:cNvSpPr txBox="1"/>
+          <p:nvPr/>
+        </p:nvSpPr>
+        <p:spPr>
+          <a:xfrm>
+            <a:off x="7035357" y="2887847"/>
+            <a:ext cx="457200" cy="138499"/>
+          </a:xfrm>
+          <a:prstGeom prst="rect">
+            <a:avLst/>
+          </a:prstGeom>
+          <a:solidFill>
+            <a:schemeClr val="bg1"/>
+          </a:solidFill>
+        </p:spPr>
+        <p:txBody>
+          <a:bodyPr wrap="square" lIns="0" tIns="0" rIns="0" bIns="0" rtlCol="0">
+            <a:spAutoFit/>
+          </a:bodyPr>
+          <a:lstStyle/>
+          <a:p>
+            <a:r>
+              <a:rPr lang="en-US" sz="900" b="1" dirty="0">
+                <a:solidFill>
+                  <a:schemeClr val="tx1">
+                    <a:lumMod val="75000"/>
+                    <a:lumOff val="25000"/>
+                  </a:schemeClr>
+                </a:solidFill>
+              </a:rPr>
+              <a:t>Pulse</a:t>
+            </a:r>
+          </a:p>
+        </p:txBody>
+      </p:sp>
+      <p:sp>
+        <p:nvSpPr>
+          <p:cNvPr id="17" name="TextBox 16">
+            <a:extLst>
+              <a:ext uri="{FF2B5EF4-FFF2-40B4-BE49-F238E27FC236}">
+                <a16:creationId xmlns:a16="http://schemas.microsoft.com/office/drawing/2014/main" id="{BD8AACF3-0CE1-4E71-9C76-B2429DC978B6}"/>
+              </a:ext>
+            </a:extLst>
+          </p:cNvPr>
+          <p:cNvSpPr txBox="1"/>
+          <p:nvPr/>
+        </p:nvSpPr>
+        <p:spPr>
+          <a:xfrm>
+            <a:off x="7035357" y="3159034"/>
+            <a:ext cx="457200" cy="138499"/>
+          </a:xfrm>
+          <a:prstGeom prst="rect">
+            <a:avLst/>
+          </a:prstGeom>
+          <a:solidFill>
+            <a:schemeClr val="bg1"/>
+          </a:solidFill>
+        </p:spPr>
+        <p:txBody>
+          <a:bodyPr wrap="square" lIns="0" tIns="0" rIns="0" bIns="0" rtlCol="0">
+            <a:spAutoFit/>
+          </a:bodyPr>
+          <a:lstStyle/>
+          <a:p>
+            <a:r>
+              <a:rPr lang="en-US" sz="900" b="1" dirty="0">
+                <a:solidFill>
+                  <a:schemeClr val="tx1">
+                    <a:lumMod val="75000"/>
+                    <a:lumOff val="25000"/>
+                  </a:schemeClr>
+                </a:solidFill>
+              </a:rPr>
+              <a:t>Pulse</a:t>
+            </a:r>
+          </a:p>
+        </p:txBody>
+      </p:sp>
+      <p:sp>
+        <p:nvSpPr>
+          <p:cNvPr id="18" name="TextBox 17">
+            <a:extLst>
+              <a:ext uri="{FF2B5EF4-FFF2-40B4-BE49-F238E27FC236}">
+                <a16:creationId xmlns:a16="http://schemas.microsoft.com/office/drawing/2014/main" id="{F733E2B1-3877-4097-A3A4-122838FE0FC4}"/>
+              </a:ext>
+            </a:extLst>
+          </p:cNvPr>
+          <p:cNvSpPr txBox="1"/>
+          <p:nvPr/>
+        </p:nvSpPr>
+        <p:spPr>
+          <a:xfrm>
+            <a:off x="7098792" y="4493934"/>
+            <a:ext cx="457200" cy="138499"/>
+          </a:xfrm>
+          <a:prstGeom prst="rect">
+            <a:avLst/>
+          </a:prstGeom>
+          <a:solidFill>
+            <a:schemeClr val="bg1"/>
+          </a:solidFill>
+        </p:spPr>
+        <p:txBody>
+          <a:bodyPr wrap="square" lIns="0" tIns="0" rIns="0" bIns="0" rtlCol="0">
+            <a:spAutoFit/>
+          </a:bodyPr>
+          <a:lstStyle/>
+          <a:p>
+            <a:r>
+              <a:rPr lang="en-US" sz="900" b="1" dirty="0">
+                <a:solidFill>
+                  <a:schemeClr val="tx1">
+                    <a:lumMod val="75000"/>
+                    <a:lumOff val="25000"/>
+                  </a:schemeClr>
+                </a:solidFill>
+              </a:rPr>
+              <a:t>Pulse</a:t>
+            </a:r>
+          </a:p>
+        </p:txBody>
+      </p:sp>
+      <p:sp>
+        <p:nvSpPr>
+          <p:cNvPr id="19" name="TextBox 18">
+            <a:extLst>
+              <a:ext uri="{FF2B5EF4-FFF2-40B4-BE49-F238E27FC236}">
+                <a16:creationId xmlns:a16="http://schemas.microsoft.com/office/drawing/2014/main" id="{236B0E2E-363F-41F8-B1AE-FEAAAD7EE97D}"/>
+              </a:ext>
+            </a:extLst>
+          </p:cNvPr>
+          <p:cNvSpPr txBox="1"/>
+          <p:nvPr/>
+        </p:nvSpPr>
+        <p:spPr>
+          <a:xfrm>
+            <a:off x="7098792" y="4742398"/>
+            <a:ext cx="457200" cy="138499"/>
+          </a:xfrm>
+          <a:prstGeom prst="rect">
+            <a:avLst/>
+          </a:prstGeom>
+          <a:solidFill>
+            <a:schemeClr val="bg1"/>
+          </a:solidFill>
+        </p:spPr>
+        <p:txBody>
+          <a:bodyPr wrap="square" lIns="0" tIns="0" rIns="0" bIns="0" rtlCol="0">
+            <a:spAutoFit/>
+          </a:bodyPr>
+          <a:lstStyle/>
+          <a:p>
+            <a:r>
+              <a:rPr lang="en-US" sz="900" b="1" dirty="0">
+                <a:solidFill>
+                  <a:schemeClr val="tx1">
+                    <a:lumMod val="75000"/>
+                    <a:lumOff val="25000"/>
+                  </a:schemeClr>
+                </a:solidFill>
+              </a:rPr>
+              <a:t>Pulse</a:t>
+            </a:r>
+          </a:p>
+        </p:txBody>
+      </p:sp>
+      <p:sp>
+        <p:nvSpPr>
+          <p:cNvPr id="20" name="TextBox 19">
+            <a:extLst>
+              <a:ext uri="{FF2B5EF4-FFF2-40B4-BE49-F238E27FC236}">
+                <a16:creationId xmlns:a16="http://schemas.microsoft.com/office/drawing/2014/main" id="{47E2BCFD-1C23-417F-B8C9-CBF9A4484668}"/>
+              </a:ext>
+            </a:extLst>
+          </p:cNvPr>
+          <p:cNvSpPr txBox="1"/>
+          <p:nvPr/>
+        </p:nvSpPr>
+        <p:spPr>
+          <a:xfrm>
+            <a:off x="7098792" y="5008249"/>
+            <a:ext cx="457200" cy="138499"/>
+          </a:xfrm>
+          <a:prstGeom prst="rect">
+            <a:avLst/>
+          </a:prstGeom>
+          <a:solidFill>
+            <a:schemeClr val="bg1"/>
+          </a:solidFill>
+        </p:spPr>
+        <p:txBody>
+          <a:bodyPr wrap="square" lIns="0" tIns="0" rIns="0" bIns="0" rtlCol="0">
+            <a:spAutoFit/>
+          </a:bodyPr>
+          <a:lstStyle/>
+          <a:p>
+            <a:r>
+              <a:rPr lang="en-US" sz="900" b="1" dirty="0">
+                <a:solidFill>
+                  <a:schemeClr val="tx1">
+                    <a:lumMod val="75000"/>
+                    <a:lumOff val="25000"/>
+                  </a:schemeClr>
+                </a:solidFill>
+              </a:rPr>
+              <a:t>Pulse</a:t>
+            </a:r>
+          </a:p>
+        </p:txBody>
+      </p:sp>
+      <p:sp>
+        <p:nvSpPr>
+          <p:cNvPr id="21" name="TextBox 20">
+            <a:extLst>
+              <a:ext uri="{FF2B5EF4-FFF2-40B4-BE49-F238E27FC236}">
+                <a16:creationId xmlns:a16="http://schemas.microsoft.com/office/drawing/2014/main" id="{35A9EDB4-F2A6-46D8-8A51-E2FEFC153626}"/>
+              </a:ext>
+            </a:extLst>
+          </p:cNvPr>
+          <p:cNvSpPr txBox="1"/>
+          <p:nvPr/>
+        </p:nvSpPr>
+        <p:spPr>
+          <a:xfrm>
+            <a:off x="7098792" y="5277468"/>
+            <a:ext cx="457200" cy="138499"/>
+          </a:xfrm>
+          <a:prstGeom prst="rect">
+            <a:avLst/>
+          </a:prstGeom>
+          <a:solidFill>
+            <a:schemeClr val="bg1"/>
+          </a:solidFill>
+        </p:spPr>
+        <p:txBody>
+          <a:bodyPr wrap="square" lIns="0" tIns="0" rIns="0" bIns="0" rtlCol="0">
+            <a:spAutoFit/>
+          </a:bodyPr>
+          <a:lstStyle/>
+          <a:p>
+            <a:r>
+              <a:rPr lang="en-US" sz="900" b="1" dirty="0">
+                <a:solidFill>
+                  <a:schemeClr val="tx1">
+                    <a:lumMod val="75000"/>
+                    <a:lumOff val="25000"/>
+                  </a:schemeClr>
+                </a:solidFill>
+              </a:rPr>
+              <a:t>Pulse</a:t>
+            </a:r>
+          </a:p>
+        </p:txBody>
+      </p:sp>
+      <p:sp>
+        <p:nvSpPr>
+          <p:cNvPr id="22" name="TextBox 21">
+            <a:extLst>
+              <a:ext uri="{FF2B5EF4-FFF2-40B4-BE49-F238E27FC236}">
+                <a16:creationId xmlns:a16="http://schemas.microsoft.com/office/drawing/2014/main" id="{3FA75605-1991-404D-836A-7BB9947B43F0}"/>
+              </a:ext>
+            </a:extLst>
+          </p:cNvPr>
+          <p:cNvSpPr txBox="1"/>
+          <p:nvPr/>
+        </p:nvSpPr>
+        <p:spPr>
+          <a:xfrm>
+            <a:off x="7098792" y="5537161"/>
+            <a:ext cx="457200" cy="138499"/>
+          </a:xfrm>
+          <a:prstGeom prst="rect">
+            <a:avLst/>
+          </a:prstGeom>
+          <a:solidFill>
+            <a:schemeClr val="bg1"/>
+          </a:solidFill>
+        </p:spPr>
+        <p:txBody>
+          <a:bodyPr wrap="square" lIns="0" tIns="0" rIns="0" bIns="0" rtlCol="0">
+            <a:spAutoFit/>
+          </a:bodyPr>
+          <a:lstStyle/>
+          <a:p>
+            <a:r>
+              <a:rPr lang="en-US" sz="900" b="1" dirty="0">
+                <a:solidFill>
+                  <a:schemeClr val="tx1">
+                    <a:lumMod val="75000"/>
+                    <a:lumOff val="25000"/>
+                  </a:schemeClr>
+                </a:solidFill>
+              </a:rPr>
+              <a:t>Pulse</a:t>
+            </a:r>
+          </a:p>
+        </p:txBody>
+      </p:sp>
+    </p:spTree>
+    <p:extLst>
+      <p:ext uri="{BB962C8B-B14F-4D97-AF65-F5344CB8AC3E}">
+        <p14:creationId xmlns:p14="http://schemas.microsoft.com/office/powerpoint/2010/main" val="1477589741"/>
       </p:ext>
     </p:extLst>
   </p:cSld>
@@ -6314,20 +8045,12 @@
           </a:lstStyle>
           <a:p>
             <a:r>
-              <a:rPr lang="en-US" dirty="0" smtClean="0">
+              <a:rPr lang="en-US" dirty="0">
                 <a:solidFill>
                   <a:prstClr val="black"/>
                 </a:solidFill>
               </a:rPr>
-              <a:t>ValidationComprehensive</a:t>
-            </a:r>
-            <a:r>
-              <a:rPr lang="en-US" dirty="0">
-                <a:solidFill>
-                  <a:prstClr val="black"/>
-                </a:solidFill>
-              </a:rPr>
-              <a:t>2</a:t>
+              <a:t>ValidationComprehensive2</a:t>
             </a:r>
           </a:p>
         </p:txBody>
@@ -7050,34 +8773,13 @@
               <a:defRPr/>
             </a:pPr>
             <a:r>
-              <a:rPr lang="en-US" sz="1200" kern="0" dirty="0" smtClean="0">
+              <a:rPr lang="en-US" sz="1200" kern="0" dirty="0">
                 <a:solidFill>
                   <a:srgbClr val="000000"/>
                 </a:solidFill>
               </a:rPr>
-              <a:t>Modified </a:t>
+              <a:t>Modified Nodal Analysis</a:t>
             </a:r>
-            <a:r>
-              <a:rPr lang="en-US" sz="1200" kern="0" dirty="0">
-                <a:solidFill>
-                  <a:srgbClr val="000000"/>
-                </a:solidFill>
-              </a:rPr>
-              <a:t>Nodal </a:t>
-            </a:r>
-            <a:r>
-              <a:rPr lang="en-US" sz="1200" kern="0" dirty="0" smtClean="0">
-                <a:solidFill>
-                  <a:srgbClr val="000000"/>
-                </a:solidFill>
-              </a:rPr>
-              <a:t>Analysis</a:t>
-            </a:r>
-            <a:endParaRPr lang="en-US" sz="1200" kern="0" dirty="0">
-              <a:solidFill>
-                <a:srgbClr val="000000"/>
-              </a:solidFill>
-            </a:endParaRPr>
           </a:p>
         </p:txBody>
       </p:sp>
@@ -7242,15 +8944,7 @@
                   <a:srgbClr val="000000"/>
                 </a:solidFill>
               </a:rPr>
-              <a:t>Calculate </a:t>
-            </a:r>
-            <a:r>
-              <a:rPr lang="en-US" sz="1200" kern="0" dirty="0" smtClean="0">
-                <a:solidFill>
-                  <a:srgbClr val="000000"/>
-                </a:solidFill>
-              </a:rPr>
-              <a:t>Fluxes</a:t>
+              <a:t>Calculate Fluxes</a:t>
             </a:r>
           </a:p>
         </p:txBody>
@@ -7411,18 +9105,13 @@
               <a:defRPr/>
             </a:pPr>
             <a:r>
-              <a:rPr lang="en-US" sz="1200" kern="0" dirty="0" smtClean="0">
+              <a:rPr lang="en-US" sz="1200" kern="0" dirty="0">
                 <a:solidFill>
                   <a:srgbClr val="000000"/>
                 </a:solidFill>
               </a:rPr>
               <a:t>Valves Pass?</a:t>
             </a:r>
-            <a:endParaRPr lang="en-US" sz="1200" kern="0" dirty="0">
-              <a:solidFill>
-                <a:srgbClr val="000000"/>
-              </a:solidFill>
-            </a:endParaRPr>
           </a:p>
         </p:txBody>
       </p:sp>
@@ -7587,21 +9276,8 @@
                   <a:srgbClr val="000000"/>
                 </a:solidFill>
               </a:rPr>
-              <a:t>Advance </a:t>
+              <a:t>Advance Time</a:t>
             </a:r>
-            <a:r>
-              <a:rPr lang="en-US" sz="1200" kern="0" dirty="0" smtClean="0">
-                <a:solidFill>
-                  <a:srgbClr val="000000"/>
-                </a:solidFill>
-              </a:rPr>
-              <a:t>Time</a:t>
-            </a:r>
-            <a:endParaRPr lang="en-US" sz="1200" kern="0" dirty="0">
-              <a:solidFill>
-                <a:srgbClr val="000000"/>
-              </a:solidFill>
-            </a:endParaRPr>
           </a:p>
         </p:txBody>
       </p:sp>
@@ -7897,18 +9573,13 @@
               <a:defRPr/>
             </a:pPr>
             <a:r>
-              <a:rPr lang="en-US" sz="1200" kern="0" dirty="0" smtClean="0">
+              <a:rPr lang="en-US" sz="1200" kern="0" dirty="0">
                 <a:solidFill>
                   <a:srgbClr val="000000"/>
                 </a:solidFill>
               </a:rPr>
               <a:t>Modify Valve States</a:t>
             </a:r>
-            <a:endParaRPr lang="en-US" sz="1200" kern="0" dirty="0">
-              <a:solidFill>
-                <a:srgbClr val="000000"/>
-              </a:solidFill>
-            </a:endParaRPr>
           </a:p>
         </p:txBody>
       </p:sp>
@@ -8080,18 +9751,13 @@
               <a:defRPr/>
             </a:pPr>
             <a:r>
-              <a:rPr lang="en-US" sz="1200" kern="0" dirty="0" smtClean="0">
+              <a:rPr lang="en-US" sz="1200" kern="0" dirty="0">
                 <a:solidFill>
                   <a:srgbClr val="000000"/>
                 </a:solidFill>
               </a:rPr>
               <a:t>Yes</a:t>
             </a:r>
-            <a:endParaRPr lang="en-US" sz="1200" kern="0" dirty="0">
-              <a:solidFill>
-                <a:srgbClr val="000000"/>
-              </a:solidFill>
-            </a:endParaRPr>
           </a:p>
         </p:txBody>
       </p:sp>
@@ -8229,18 +9895,13 @@
               <a:defRPr/>
             </a:pPr>
             <a:r>
-              <a:rPr lang="en-US" sz="1200" kern="0" dirty="0" smtClean="0">
+              <a:rPr lang="en-US" sz="1200" kern="0" dirty="0">
                 <a:solidFill>
                   <a:srgbClr val="000000"/>
                 </a:solidFill>
               </a:rPr>
               <a:t>No</a:t>
             </a:r>
-            <a:endParaRPr lang="en-US" sz="1200" kern="0" dirty="0">
-              <a:solidFill>
-                <a:srgbClr val="000000"/>
-              </a:solidFill>
-            </a:endParaRPr>
           </a:p>
         </p:txBody>
       </p:sp>
@@ -8405,21 +10066,8 @@
                   <a:srgbClr val="000000"/>
                 </a:solidFill>
               </a:rPr>
-              <a:t>Calculate </a:t>
+              <a:t>Calculate Quantities</a:t>
             </a:r>
-            <a:r>
-              <a:rPr lang="en-US" sz="1200" kern="0" dirty="0" smtClean="0">
-                <a:solidFill>
-                  <a:srgbClr val="000000"/>
-                </a:solidFill>
-              </a:rPr>
-              <a:t>Quantities</a:t>
-            </a:r>
-            <a:endParaRPr lang="en-US" sz="1200" kern="0" dirty="0">
-              <a:solidFill>
-                <a:srgbClr val="000000"/>
-              </a:solidFill>
-            </a:endParaRPr>
           </a:p>
         </p:txBody>
       </p:sp>
@@ -8543,18 +10191,13 @@
               <a:defRPr/>
             </a:pPr>
             <a:r>
-              <a:rPr lang="en-US" sz="1200" b="1" kern="0" dirty="0" smtClean="0">
+              <a:rPr lang="en-US" sz="1200" b="1" kern="0" dirty="0">
                 <a:solidFill>
                   <a:sysClr val="windowText" lastClr="000000"/>
                 </a:solidFill>
               </a:rPr>
               <a:t>Process</a:t>
             </a:r>
-            <a:endParaRPr lang="en-US" sz="1200" b="1" kern="0" dirty="0">
-              <a:solidFill>
-                <a:sysClr val="windowText" lastClr="000000"/>
-              </a:solidFill>
-            </a:endParaRPr>
           </a:p>
         </p:txBody>
       </p:sp>
@@ -8678,18 +10321,13 @@
               <a:defRPr/>
             </a:pPr>
             <a:r>
-              <a:rPr lang="en-US" sz="1200" b="1" kern="0" dirty="0" smtClean="0">
+              <a:rPr lang="en-US" sz="1200" b="1" kern="0" dirty="0">
                 <a:solidFill>
                   <a:sysClr val="windowText" lastClr="000000"/>
                 </a:solidFill>
               </a:rPr>
               <a:t>Preprocess</a:t>
             </a:r>
-            <a:endParaRPr lang="en-US" sz="1200" b="1" kern="0" dirty="0">
-              <a:solidFill>
-                <a:sysClr val="windowText" lastClr="000000"/>
-              </a:solidFill>
-            </a:endParaRPr>
           </a:p>
         </p:txBody>
       </p:sp>
@@ -8813,18 +10451,13 @@
               <a:defRPr/>
             </a:pPr>
             <a:r>
-              <a:rPr lang="en-US" sz="1200" b="1" kern="0" dirty="0" smtClean="0">
+              <a:rPr lang="en-US" sz="1200" b="1" kern="0" dirty="0">
                 <a:solidFill>
                   <a:sysClr val="windowText" lastClr="000000"/>
                 </a:solidFill>
               </a:rPr>
               <a:t>Postprocess</a:t>
             </a:r>
-            <a:endParaRPr lang="en-US" sz="1200" b="1" kern="0" dirty="0">
-              <a:solidFill>
-                <a:sysClr val="windowText" lastClr="000000"/>
-              </a:solidFill>
-            </a:endParaRPr>
           </a:p>
         </p:txBody>
       </p:sp>
@@ -8985,12 +10618,48 @@
                     <a:tableStyleId>{5940675A-B579-460E-94D1-54222C63F5DA}</a:tableStyleId>
                   </a:tblPr>
                   <a:tblGrid>
-                    <a:gridCol w="1337484"/>
-                    <a:gridCol w="1105469"/>
-                    <a:gridCol w="1037229"/>
-                    <a:gridCol w="1119117"/>
-                    <a:gridCol w="1323833"/>
-                    <a:gridCol w="2374710"/>
+                    <a:gridCol w="1337484">
+                      <a:extLst>
+                        <a:ext uri="{9D8B030D-6E8A-4147-A177-3AD203B41FA5}">
+                          <a16:colId xmlns:a16="http://schemas.microsoft.com/office/drawing/2014/main" val="20000"/>
+                        </a:ext>
+                      </a:extLst>
+                    </a:gridCol>
+                    <a:gridCol w="1105469">
+                      <a:extLst>
+                        <a:ext uri="{9D8B030D-6E8A-4147-A177-3AD203B41FA5}">
+                          <a16:colId xmlns:a16="http://schemas.microsoft.com/office/drawing/2014/main" val="20001"/>
+                        </a:ext>
+                      </a:extLst>
+                    </a:gridCol>
+                    <a:gridCol w="1037229">
+                      <a:extLst>
+                        <a:ext uri="{9D8B030D-6E8A-4147-A177-3AD203B41FA5}">
+                          <a16:colId xmlns:a16="http://schemas.microsoft.com/office/drawing/2014/main" val="20002"/>
+                        </a:ext>
+                      </a:extLst>
+                    </a:gridCol>
+                    <a:gridCol w="1119117">
+                      <a:extLst>
+                        <a:ext uri="{9D8B030D-6E8A-4147-A177-3AD203B41FA5}">
+                          <a16:colId xmlns:a16="http://schemas.microsoft.com/office/drawing/2014/main" val="20003"/>
+                        </a:ext>
+                      </a:extLst>
+                    </a:gridCol>
+                    <a:gridCol w="1323833">
+                      <a:extLst>
+                        <a:ext uri="{9D8B030D-6E8A-4147-A177-3AD203B41FA5}">
+                          <a16:colId xmlns:a16="http://schemas.microsoft.com/office/drawing/2014/main" val="20004"/>
+                        </a:ext>
+                      </a:extLst>
+                    </a:gridCol>
+                    <a:gridCol w="2374710">
+                      <a:extLst>
+                        <a:ext uri="{9D8B030D-6E8A-4147-A177-3AD203B41FA5}">
+                          <a16:colId xmlns:a16="http://schemas.microsoft.com/office/drawing/2014/main" val="20005"/>
+                        </a:ext>
+                      </a:extLst>
+                    </a:gridCol>
                   </a:tblGrid>
                   <a:tr h="502920">
                     <a:tc>
@@ -9000,10 +10669,9 @@
                         <a:p>
                           <a:pPr algn="ctr"/>
                           <a:r>
-                            <a:rPr lang="en-US" b="1" dirty="0" smtClean="0"/>
+                            <a:rPr lang="en-US" b="1" dirty="0"/>
                             <a:t>Element</a:t>
                           </a:r>
-                          <a:endParaRPr lang="en-US" b="1" dirty="0"/>
                         </a:p>
                       </a:txBody>
                       <a:tcPr anchor="ctr">
@@ -9021,11 +10689,11 @@
                         <a:p>
                           <a:pPr algn="ctr"/>
                           <a:r>
-                            <a:rPr lang="en-US" b="1" dirty="0" smtClean="0"/>
+                            <a:rPr lang="en-US" b="1" dirty="0"/>
                             <a:t>Circuit</a:t>
                           </a:r>
                           <a:r>
-                            <a:rPr lang="en-US" b="1" baseline="0" dirty="0" smtClean="0"/>
+                            <a:rPr lang="en-US" b="1" baseline="0" dirty="0"/>
                             <a:t> Analogy</a:t>
                           </a:r>
                           <a:endParaRPr lang="en-US" b="1" dirty="0"/>
@@ -9056,10 +10724,9 @@
                         <a:p>
                           <a:pPr algn="ctr"/>
                           <a:r>
-                            <a:rPr lang="en-US" b="1" dirty="0" smtClean="0"/>
+                            <a:rPr lang="en-US" b="1" dirty="0"/>
                             <a:t>Pipe Analogy</a:t>
                           </a:r>
-                          <a:endParaRPr lang="en-US" b="1" dirty="0"/>
                         </a:p>
                       </a:txBody>
                       <a:tcPr anchor="ctr">
@@ -9092,7 +10759,7 @@
                             <a:tabLst/>
                             <a:defRPr/>
                           </a:pPr>
-                          <a:endParaRPr lang="en-US" dirty="0" smtClean="0"/>
+                          <a:endParaRPr lang="en-US" dirty="0"/>
                         </a:p>
                       </a:txBody>
                       <a:tcPr/>
@@ -9120,7 +10787,7 @@
                             <a:defRPr/>
                           </a:pPr>
                           <a:r>
-                            <a:rPr lang="en-US" b="1" dirty="0" smtClean="0"/>
+                            <a:rPr lang="en-US" b="1" dirty="0"/>
                             <a:t>Flow Equation</a:t>
                           </a:r>
                         </a:p>
@@ -9133,6 +10800,11 @@
                         </a:solidFill>
                       </a:tcPr>
                     </a:tc>
+                    <a:extLst>
+                      <a:ext uri="{0D108BD9-81ED-4DB2-BD59-A6C34878D82A}">
+                        <a16:rowId xmlns:a16="http://schemas.microsoft.com/office/drawing/2014/main" val="10000"/>
+                      </a:ext>
+                    </a:extLst>
                   </a:tr>
                   <a:tr h="502920">
                     <a:tc>
@@ -9158,7 +10830,7 @@
                             <a:defRPr/>
                           </a:pPr>
                           <a:r>
-                            <a:rPr lang="en-US" dirty="0" smtClean="0"/>
+                            <a:rPr lang="en-US" dirty="0"/>
                             <a:t>Node</a:t>
                           </a:r>
                         </a:p>
@@ -9172,10 +10844,9 @@
                         <a:p>
                           <a:pPr algn="ctr"/>
                           <a:r>
-                            <a:rPr lang="en-US" dirty="0" smtClean="0"/>
+                            <a:rPr lang="en-US" dirty="0"/>
                             <a:t>Junction</a:t>
                           </a:r>
-                          <a:endParaRPr lang="en-US" dirty="0"/>
                         </a:p>
                       </a:txBody>
                       <a:tcPr anchor="ctr"/>
@@ -9198,10 +10869,9 @@
                         <a:p>
                           <a:pPr algn="ctr"/>
                           <a:r>
-                            <a:rPr lang="en-US" dirty="0" smtClean="0"/>
+                            <a:rPr lang="en-US" dirty="0"/>
                             <a:t>Junction</a:t>
                           </a:r>
-                          <a:endParaRPr lang="en-US" dirty="0"/>
                         </a:p>
                       </a:txBody>
                       <a:tcPr anchor="ctr"/>
@@ -9224,11 +10894,11 @@
                         <a:p>
                           <a:pPr algn="ctr"/>
                           <a:r>
-                            <a:rPr lang="en-US" dirty="0" smtClean="0"/>
+                            <a:rPr lang="en-US" dirty="0"/>
                             <a:t>Total</a:t>
                           </a:r>
                           <a:r>
-                            <a:rPr lang="en-US" baseline="0" dirty="0" smtClean="0"/>
+                            <a:rPr lang="en-US" baseline="0" dirty="0"/>
                             <a:t> Flow = 0</a:t>
                           </a:r>
                           <a:endParaRPr lang="en-US" dirty="0"/>
@@ -9236,6 +10906,11 @@
                       </a:txBody>
                       <a:tcPr anchor="ctr"/>
                     </a:tc>
+                    <a:extLst>
+                      <a:ext uri="{0D108BD9-81ED-4DB2-BD59-A6C34878D82A}">
+                        <a16:rowId xmlns:a16="http://schemas.microsoft.com/office/drawing/2014/main" val="10001"/>
+                      </a:ext>
+                    </a:extLst>
                   </a:tr>
                   <a:tr h="502920">
                     <a:tc>
@@ -9245,10 +10920,9 @@
                         <a:p>
                           <a:pPr algn="ctr"/>
                           <a:r>
-                            <a:rPr lang="en-US" dirty="0" smtClean="0"/>
+                            <a:rPr lang="en-US" dirty="0"/>
                             <a:t>Path</a:t>
                           </a:r>
-                          <a:endParaRPr lang="en-US" dirty="0"/>
                         </a:p>
                       </a:txBody>
                       <a:tcPr anchor="ctr"/>
@@ -9260,10 +10934,9 @@
                         <a:p>
                           <a:pPr algn="ctr"/>
                           <a:r>
-                            <a:rPr lang="en-US" dirty="0" smtClean="0"/>
+                            <a:rPr lang="en-US" dirty="0"/>
                             <a:t>Wire</a:t>
                           </a:r>
-                          <a:endParaRPr lang="en-US" dirty="0"/>
                         </a:p>
                       </a:txBody>
                       <a:tcPr anchor="ctr"/>
@@ -9286,10 +10959,9 @@
                         <a:p>
                           <a:pPr algn="ctr"/>
                           <a:r>
-                            <a:rPr lang="en-US" dirty="0" smtClean="0"/>
+                            <a:rPr lang="en-US" dirty="0"/>
                             <a:t>Rigid Pipe</a:t>
                           </a:r>
-                          <a:endParaRPr lang="en-US" dirty="0"/>
                         </a:p>
                       </a:txBody>
                       <a:tcPr anchor="ctr"/>
@@ -9312,14 +10984,18 @@
                         <a:p>
                           <a:pPr algn="ctr"/>
                           <a:r>
-                            <a:rPr lang="en-US" dirty="0" smtClean="0"/>
+                            <a:rPr lang="en-US" dirty="0"/>
                             <a:t>Solve Directly</a:t>
                           </a:r>
-                          <a:endParaRPr lang="en-US" dirty="0"/>
                         </a:p>
                       </a:txBody>
                       <a:tcPr anchor="ctr"/>
                     </a:tc>
+                    <a:extLst>
+                      <a:ext uri="{0D108BD9-81ED-4DB2-BD59-A6C34878D82A}">
+                        <a16:rowId xmlns:a16="http://schemas.microsoft.com/office/drawing/2014/main" val="10002"/>
+                      </a:ext>
+                    </a:extLst>
                   </a:tr>
                   <a:tr h="502920">
                     <a:tc>
@@ -9329,10 +11005,9 @@
                         <a:p>
                           <a:pPr algn="ctr"/>
                           <a:r>
-                            <a:rPr lang="en-US" dirty="0" smtClean="0"/>
+                            <a:rPr lang="en-US" dirty="0"/>
                             <a:t>Resistance</a:t>
                           </a:r>
-                          <a:endParaRPr lang="en-US" dirty="0"/>
                         </a:p>
                       </a:txBody>
                       <a:tcPr anchor="ctr"/>
@@ -9344,10 +11019,9 @@
                         <a:p>
                           <a:pPr algn="ctr"/>
                           <a:r>
-                            <a:rPr lang="en-US" dirty="0" smtClean="0"/>
+                            <a:rPr lang="en-US" dirty="0"/>
                             <a:t>Resistor</a:t>
                           </a:r>
-                          <a:endParaRPr lang="en-US" dirty="0"/>
                         </a:p>
                       </a:txBody>
                       <a:tcPr anchor="ctr"/>
@@ -9370,10 +11044,9 @@
                         <a:p>
                           <a:pPr algn="ctr"/>
                           <a:r>
-                            <a:rPr lang="en-US" dirty="0" smtClean="0"/>
+                            <a:rPr lang="en-US" dirty="0"/>
                             <a:t>Aperture</a:t>
                           </a:r>
-                          <a:endParaRPr lang="en-US" dirty="0"/>
                         </a:p>
                       </a:txBody>
                       <a:tcPr anchor="ctr"/>
@@ -9450,11 +11123,16 @@
                               </m:oMath>
                             </m:oMathPara>
                           </a14:m>
-                          <a:endParaRPr lang="en-US" dirty="0" smtClean="0"/>
+                          <a:endParaRPr lang="en-US" dirty="0"/>
                         </a:p>
                       </a:txBody>
                       <a:tcPr anchor="ctr"/>
                     </a:tc>
+                    <a:extLst>
+                      <a:ext uri="{0D108BD9-81ED-4DB2-BD59-A6C34878D82A}">
+                        <a16:rowId xmlns:a16="http://schemas.microsoft.com/office/drawing/2014/main" val="10003"/>
+                      </a:ext>
+                    </a:extLst>
                   </a:tr>
                   <a:tr h="502920">
                     <a:tc>
@@ -9464,10 +11142,9 @@
                         <a:p>
                           <a:pPr algn="ctr"/>
                           <a:r>
-                            <a:rPr lang="en-US" dirty="0" smtClean="0"/>
+                            <a:rPr lang="en-US" dirty="0"/>
                             <a:t>Compliance</a:t>
                           </a:r>
-                          <a:endParaRPr lang="en-US" dirty="0"/>
                         </a:p>
                       </a:txBody>
                       <a:tcPr anchor="ctr"/>
@@ -9479,10 +11156,9 @@
                         <a:p>
                           <a:pPr algn="ctr"/>
                           <a:r>
-                            <a:rPr lang="en-US" dirty="0" smtClean="0"/>
+                            <a:rPr lang="en-US" dirty="0"/>
                             <a:t>Capacitor</a:t>
                           </a:r>
-                          <a:endParaRPr lang="en-US" dirty="0"/>
                         </a:p>
                       </a:txBody>
                       <a:tcPr anchor="ctr"/>
@@ -9505,7 +11181,7 @@
                         <a:p>
                           <a:pPr algn="ctr"/>
                           <a:r>
-                            <a:rPr lang="en-US" dirty="0" err="1" smtClean="0"/>
+                            <a:rPr lang="en-US" dirty="0" err="1"/>
                             <a:t>Diaphram</a:t>
                           </a:r>
                           <a:endParaRPr lang="en-US" dirty="0"/>
@@ -9546,7 +11222,7 @@
                                   <m:dPr>
                                     <m:ctrlPr>
                                       <a:rPr lang="en-US" b="0" i="1" smtClean="0">
-                                        <a:latin typeface="Cambria Math"/>
+                                        <a:latin typeface="Cambria Math" panose="02040503050406030204" pitchFamily="18" charset="0"/>
                                       </a:rPr>
                                     </m:ctrlPr>
                                   </m:dPr>
@@ -9575,7 +11251,7 @@
                                   <m:fPr>
                                     <m:ctrlPr>
                                       <a:rPr lang="en-US" b="0" i="1" smtClean="0">
-                                        <a:latin typeface="Cambria Math"/>
+                                        <a:latin typeface="Cambria Math" panose="02040503050406030204" pitchFamily="18" charset="0"/>
                                       </a:rPr>
                                     </m:ctrlPr>
                                   </m:fPr>
@@ -9622,6 +11298,11 @@
                       </a:txBody>
                       <a:tcPr anchor="ctr"/>
                     </a:tc>
+                    <a:extLst>
+                      <a:ext uri="{0D108BD9-81ED-4DB2-BD59-A6C34878D82A}">
+                        <a16:rowId xmlns:a16="http://schemas.microsoft.com/office/drawing/2014/main" val="10004"/>
+                      </a:ext>
+                    </a:extLst>
                   </a:tr>
                   <a:tr h="502920">
                     <a:tc>
@@ -9631,7 +11312,7 @@
                         <a:p>
                           <a:pPr algn="ctr"/>
                           <a:r>
-                            <a:rPr lang="en-US" dirty="0" err="1" smtClean="0"/>
+                            <a:rPr lang="en-US" dirty="0" err="1"/>
                             <a:t>Inertance</a:t>
                           </a:r>
                           <a:endParaRPr lang="en-US" dirty="0"/>
@@ -9646,10 +11327,9 @@
                         <a:p>
                           <a:pPr algn="ctr"/>
                           <a:r>
-                            <a:rPr lang="en-US" dirty="0" smtClean="0"/>
+                            <a:rPr lang="en-US" dirty="0"/>
                             <a:t>Inductor</a:t>
                           </a:r>
-                          <a:endParaRPr lang="en-US" dirty="0"/>
                         </a:p>
                       </a:txBody>
                       <a:tcPr anchor="ctr"/>
@@ -9672,10 +11352,9 @@
                         <a:p>
                           <a:pPr algn="ctr"/>
                           <a:r>
-                            <a:rPr lang="en-US" dirty="0" smtClean="0"/>
+                            <a:rPr lang="en-US" dirty="0"/>
                             <a:t>Heavy Paddle</a:t>
                           </a:r>
-                          <a:endParaRPr lang="en-US" dirty="0"/>
                         </a:p>
                       </a:txBody>
                       <a:tcPr anchor="ctr"/>
@@ -9735,7 +11414,7 @@
                                   <m:fPr>
                                     <m:ctrlPr>
                                       <a:rPr lang="en-US" b="0" i="1" smtClean="0">
-                                        <a:latin typeface="Cambria Math"/>
+                                        <a:latin typeface="Cambria Math" panose="02040503050406030204" pitchFamily="18" charset="0"/>
                                       </a:rPr>
                                     </m:ctrlPr>
                                   </m:fPr>
@@ -9760,7 +11439,7 @@
                                   <m:naryPr>
                                     <m:ctrlPr>
                                       <a:rPr lang="en-US" b="0" i="1" smtClean="0">
-                                        <a:latin typeface="Cambria Math"/>
+                                        <a:latin typeface="Cambria Math" panose="02040503050406030204" pitchFamily="18" charset="0"/>
                                       </a:rPr>
                                     </m:ctrlPr>
                                   </m:naryPr>
@@ -9769,7 +11448,7 @@
                                       <m:sSubPr>
                                         <m:ctrlPr>
                                           <a:rPr lang="en-US" b="0" i="1" smtClean="0">
-                                            <a:latin typeface="Cambria Math"/>
+                                            <a:latin typeface="Cambria Math" panose="02040503050406030204" pitchFamily="18" charset="0"/>
                                           </a:rPr>
                                         </m:ctrlPr>
                                       </m:sSubPr>
@@ -9842,7 +11521,7 @@
                                   <m:sSubPr>
                                     <m:ctrlPr>
                                       <a:rPr lang="en-US" b="0" i="1" smtClean="0">
-                                        <a:latin typeface="Cambria Math"/>
+                                        <a:latin typeface="Cambria Math" panose="02040503050406030204" pitchFamily="18" charset="0"/>
                                       </a:rPr>
                                     </m:ctrlPr>
                                   </m:sSubPr>
@@ -9872,11 +11551,16 @@
                               </m:oMath>
                             </m:oMathPara>
                           </a14:m>
-                          <a:endParaRPr lang="en-US" dirty="0" smtClean="0"/>
+                          <a:endParaRPr lang="en-US" dirty="0"/>
                         </a:p>
                       </a:txBody>
                       <a:tcPr anchor="ctr"/>
                     </a:tc>
+                    <a:extLst>
+                      <a:ext uri="{0D108BD9-81ED-4DB2-BD59-A6C34878D82A}">
+                        <a16:rowId xmlns:a16="http://schemas.microsoft.com/office/drawing/2014/main" val="10005"/>
+                      </a:ext>
+                    </a:extLst>
                   </a:tr>
                   <a:tr h="502920">
                     <a:tc>
@@ -9886,10 +11570,9 @@
                         <a:p>
                           <a:pPr algn="ctr"/>
                           <a:r>
-                            <a:rPr lang="en-US" dirty="0" smtClean="0"/>
+                            <a:rPr lang="en-US" dirty="0"/>
                             <a:t>Switch</a:t>
                           </a:r>
-                          <a:endParaRPr lang="en-US" dirty="0"/>
                         </a:p>
                       </a:txBody>
                       <a:tcPr anchor="ctr"/>
@@ -9901,10 +11584,9 @@
                         <a:p>
                           <a:pPr algn="ctr"/>
                           <a:r>
-                            <a:rPr lang="en-US" dirty="0" smtClean="0"/>
+                            <a:rPr lang="en-US" dirty="0"/>
                             <a:t>Switch</a:t>
                           </a:r>
-                          <a:endParaRPr lang="en-US" dirty="0"/>
                         </a:p>
                       </a:txBody>
                       <a:tcPr anchor="ctr"/>
@@ -9927,11 +11609,11 @@
                         <a:p>
                           <a:pPr algn="ctr"/>
                           <a:r>
-                            <a:rPr lang="en-US" dirty="0" smtClean="0"/>
+                            <a:rPr lang="en-US" dirty="0"/>
                             <a:t>Gate</a:t>
                           </a:r>
                           <a:r>
-                            <a:rPr lang="en-US" baseline="0" dirty="0" smtClean="0"/>
+                            <a:rPr lang="en-US" baseline="0" dirty="0"/>
                             <a:t> Valve</a:t>
                           </a:r>
                           <a:endParaRPr lang="en-US" dirty="0"/>
@@ -9957,14 +11639,18 @@
                         <a:p>
                           <a:pPr algn="ctr"/>
                           <a:r>
-                            <a:rPr lang="en-US" dirty="0" smtClean="0"/>
+                            <a:rPr lang="en-US" dirty="0"/>
                             <a:t>Solve Directly</a:t>
                           </a:r>
-                          <a:endParaRPr lang="en-US" dirty="0"/>
                         </a:p>
                       </a:txBody>
                       <a:tcPr anchor="ctr"/>
                     </a:tc>
+                    <a:extLst>
+                      <a:ext uri="{0D108BD9-81ED-4DB2-BD59-A6C34878D82A}">
+                        <a16:rowId xmlns:a16="http://schemas.microsoft.com/office/drawing/2014/main" val="10006"/>
+                      </a:ext>
+                    </a:extLst>
                   </a:tr>
                   <a:tr h="502920">
                     <a:tc>
@@ -9974,10 +11660,9 @@
                         <a:p>
                           <a:pPr algn="ctr"/>
                           <a:r>
-                            <a:rPr lang="en-US" dirty="0" smtClean="0"/>
+                            <a:rPr lang="en-US" dirty="0"/>
                             <a:t>Valve</a:t>
                           </a:r>
-                          <a:endParaRPr lang="en-US" dirty="0"/>
                         </a:p>
                       </a:txBody>
                       <a:tcPr anchor="ctr"/>
@@ -9989,10 +11674,9 @@
                         <a:p>
                           <a:pPr algn="ctr"/>
                           <a:r>
-                            <a:rPr lang="en-US" dirty="0" smtClean="0"/>
+                            <a:rPr lang="en-US" dirty="0"/>
                             <a:t>Diode</a:t>
                           </a:r>
-                          <a:endParaRPr lang="en-US" dirty="0"/>
                         </a:p>
                       </a:txBody>
                       <a:tcPr anchor="ctr"/>
@@ -10015,10 +11699,9 @@
                         <a:p>
                           <a:pPr algn="ctr"/>
                           <a:r>
-                            <a:rPr lang="en-US" dirty="0" smtClean="0"/>
+                            <a:rPr lang="en-US" dirty="0"/>
                             <a:t>Check Valve</a:t>
                           </a:r>
-                          <a:endParaRPr lang="en-US" dirty="0"/>
                         </a:p>
                       </a:txBody>
                       <a:tcPr anchor="ctr"/>
@@ -10041,14 +11724,18 @@
                         <a:p>
                           <a:pPr algn="ctr"/>
                           <a:r>
-                            <a:rPr lang="en-US" dirty="0" smtClean="0"/>
+                            <a:rPr lang="en-US" dirty="0"/>
                             <a:t>Solve Directly</a:t>
                           </a:r>
-                          <a:endParaRPr lang="en-US" dirty="0"/>
                         </a:p>
                       </a:txBody>
                       <a:tcPr anchor="ctr"/>
                     </a:tc>
+                    <a:extLst>
+                      <a:ext uri="{0D108BD9-81ED-4DB2-BD59-A6C34878D82A}">
+                        <a16:rowId xmlns:a16="http://schemas.microsoft.com/office/drawing/2014/main" val="10007"/>
+                      </a:ext>
+                    </a:extLst>
                   </a:tr>
                   <a:tr h="502920">
                     <a:tc>
@@ -10058,10 +11745,9 @@
                         <a:p>
                           <a:pPr algn="ctr"/>
                           <a:r>
-                            <a:rPr lang="en-US" dirty="0" smtClean="0"/>
+                            <a:rPr lang="en-US" dirty="0"/>
                             <a:t>Pressure Source</a:t>
                           </a:r>
-                          <a:endParaRPr lang="en-US" dirty="0"/>
                         </a:p>
                       </a:txBody>
                       <a:tcPr anchor="ctr"/>
@@ -10073,10 +11759,9 @@
                         <a:p>
                           <a:pPr algn="ctr"/>
                           <a:r>
-                            <a:rPr lang="en-US" dirty="0" smtClean="0"/>
+                            <a:rPr lang="en-US" dirty="0"/>
                             <a:t>Voltage Source</a:t>
                           </a:r>
-                          <a:endParaRPr lang="en-US" dirty="0"/>
                         </a:p>
                       </a:txBody>
                       <a:tcPr anchor="ctr"/>
@@ -10099,10 +11784,9 @@
                         <a:p>
                           <a:pPr algn="ctr"/>
                           <a:r>
-                            <a:rPr lang="en-US" dirty="0" smtClean="0"/>
+                            <a:rPr lang="en-US" dirty="0"/>
                             <a:t>Pump</a:t>
                           </a:r>
-                          <a:endParaRPr lang="en-US" dirty="0"/>
                         </a:p>
                       </a:txBody>
                       <a:tcPr anchor="ctr"/>
@@ -10125,14 +11809,18 @@
                         <a:p>
                           <a:pPr algn="ctr"/>
                           <a:r>
-                            <a:rPr lang="en-US" dirty="0" smtClean="0"/>
+                            <a:rPr lang="en-US" dirty="0"/>
                             <a:t>Solve Directly</a:t>
                           </a:r>
-                          <a:endParaRPr lang="en-US" dirty="0"/>
                         </a:p>
                       </a:txBody>
                       <a:tcPr anchor="ctr"/>
                     </a:tc>
+                    <a:extLst>
+                      <a:ext uri="{0D108BD9-81ED-4DB2-BD59-A6C34878D82A}">
+                        <a16:rowId xmlns:a16="http://schemas.microsoft.com/office/drawing/2014/main" val="10008"/>
+                      </a:ext>
+                    </a:extLst>
                   </a:tr>
                   <a:tr h="502920">
                     <a:tc>
@@ -10142,10 +11830,9 @@
                         <a:p>
                           <a:pPr algn="ctr"/>
                           <a:r>
-                            <a:rPr lang="en-US" dirty="0" smtClean="0"/>
+                            <a:rPr lang="en-US" dirty="0"/>
                             <a:t>Flow Source</a:t>
                           </a:r>
-                          <a:endParaRPr lang="en-US" dirty="0"/>
                         </a:p>
                       </a:txBody>
                       <a:tcPr anchor="ctr"/>
@@ -10157,10 +11844,9 @@
                         <a:p>
                           <a:pPr algn="ctr"/>
                           <a:r>
-                            <a:rPr lang="en-US" dirty="0" smtClean="0"/>
+                            <a:rPr lang="en-US" dirty="0"/>
                             <a:t>Current Source</a:t>
                           </a:r>
-                          <a:endParaRPr lang="en-US" dirty="0"/>
                         </a:p>
                       </a:txBody>
                       <a:tcPr anchor="ctr"/>
@@ -10247,11 +11933,16 @@
                               </m:oMath>
                             </m:oMathPara>
                           </a14:m>
-                          <a:endParaRPr lang="en-US" dirty="0" smtClean="0"/>
+                          <a:endParaRPr lang="en-US" dirty="0"/>
                         </a:p>
                       </a:txBody>
                       <a:tcPr anchor="ctr"/>
                     </a:tc>
+                    <a:extLst>
+                      <a:ext uri="{0D108BD9-81ED-4DB2-BD59-A6C34878D82A}">
+                        <a16:rowId xmlns:a16="http://schemas.microsoft.com/office/drawing/2014/main" val="10009"/>
+                      </a:ext>
+                    </a:extLst>
                   </a:tr>
                 </a:tbl>
               </a:graphicData>
@@ -14261,7 +15952,7 @@
                               <a:solidFill>
                                 <a:prstClr val="black"/>
                               </a:solidFill>
-                              <a:latin typeface="Cambria Math"/>
+                              <a:latin typeface="Cambria Math" panose="02040503050406030204" pitchFamily="18" charset="0"/>
                             </a:rPr>
                           </m:ctrlPr>
                         </m:naryPr>
@@ -14355,7 +16046,7 @@
                               <a:solidFill>
                                 <a:prstClr val="black"/>
                               </a:solidFill>
-                              <a:latin typeface="Cambria Math"/>
+                              <a:latin typeface="Cambria Math" panose="02040503050406030204" pitchFamily="18" charset="0"/>
                               <a:ea typeface="Cambria Math"/>
                             </a:rPr>
                           </m:ctrlPr>
@@ -14402,7 +16093,7 @@
                               <a:solidFill>
                                 <a:prstClr val="black"/>
                               </a:solidFill>
-                              <a:latin typeface="Cambria Math"/>
+                              <a:latin typeface="Cambria Math" panose="02040503050406030204" pitchFamily="18" charset="0"/>
                               <a:ea typeface="Cambria Math"/>
                             </a:rPr>
                           </m:ctrlPr>
@@ -14415,7 +16106,7 @@
                                   <a:solidFill>
                                     <a:prstClr val="black"/>
                                   </a:solidFill>
-                                  <a:latin typeface="Cambria Math"/>
+                                  <a:latin typeface="Cambria Math" panose="02040503050406030204" pitchFamily="18" charset="0"/>
                                   <a:ea typeface="Cambria Math"/>
                                 </a:rPr>
                               </m:ctrlPr>
@@ -14438,7 +16129,7 @@
                                       <a:solidFill>
                                         <a:prstClr val="black"/>
                                       </a:solidFill>
-                                      <a:latin typeface="Cambria Math"/>
+                                      <a:latin typeface="Cambria Math" panose="02040503050406030204" pitchFamily="18" charset="0"/>
                                       <a:ea typeface="Cambria Math"/>
                                     </a:rPr>
                                   </m:ctrlPr>
@@ -14629,7 +16320,7 @@
                               <a:solidFill>
                                 <a:prstClr val="black"/>
                               </a:solidFill>
-                              <a:latin typeface="Cambria Math"/>
+                              <a:latin typeface="Cambria Math" panose="02040503050406030204" pitchFamily="18" charset="0"/>
                             </a:rPr>
                           </m:ctrlPr>
                         </m:sSupPr>
@@ -14663,7 +16354,7 @@
                               <a:solidFill>
                                 <a:prstClr val="black"/>
                               </a:solidFill>
-                              <a:latin typeface="Cambria Math"/>
+                              <a:latin typeface="Cambria Math" panose="02040503050406030204" pitchFamily="18" charset="0"/>
                             </a:rPr>
                           </m:ctrlPr>
                         </m:sSupPr>
@@ -14806,7 +16497,7 @@
                               <a:solidFill>
                                 <a:prstClr val="black"/>
                               </a:solidFill>
-                              <a:latin typeface="Cambria Math"/>
+                              <a:latin typeface="Cambria Math" panose="02040503050406030204" pitchFamily="18" charset="0"/>
                             </a:rPr>
                           </m:ctrlPr>
                         </m:naryPr>
@@ -14818,7 +16509,7 @@
                                   <a:solidFill>
                                     <a:prstClr val="black"/>
                                   </a:solidFill>
-                                  <a:latin typeface="Cambria Math"/>
+                                  <a:latin typeface="Cambria Math" panose="02040503050406030204" pitchFamily="18" charset="0"/>
                                 </a:rPr>
                               </m:ctrlPr>
                             </m:sSubPr>
@@ -14901,7 +16592,7 @@
                                   <a:solidFill>
                                     <a:prstClr val="black"/>
                                   </a:solidFill>
-                                  <a:latin typeface="Cambria Math"/>
+                                  <a:latin typeface="Cambria Math" panose="02040503050406030204" pitchFamily="18" charset="0"/>
                                 </a:rPr>
                               </m:ctrlPr>
                             </m:sSubPr>
@@ -15005,7 +16696,7 @@
               <a:lstStyle/>
               <a:p>
                 <a:r>
-                  <a:rPr lang="en-US" dirty="0" smtClean="0">
+                  <a:rPr lang="en-US" dirty="0">
                     <a:solidFill>
                       <a:prstClr val="black"/>
                     </a:solidFill>
@@ -15021,7 +16712,7 @@
                             <a:solidFill>
                               <a:prstClr val="black"/>
                             </a:solidFill>
-                            <a:latin typeface="Cambria Math"/>
+                            <a:latin typeface="Cambria Math" panose="02040503050406030204" pitchFamily="18" charset="0"/>
                           </a:rPr>
                         </m:ctrlPr>
                       </m:dPr>
@@ -16343,7 +18034,7 @@
           <a:lstStyle/>
           <a:p>
             <a:r>
-              <a:rPr lang="en-US" b="1" dirty="0" smtClean="0">
+              <a:rPr lang="en-US" b="1" dirty="0">
                 <a:solidFill>
                   <a:prstClr val="black"/>
                 </a:solidFill>
@@ -16354,7 +18045,7 @@
           <a:p>
             <a:pPr indent="457200"/>
             <a:r>
-              <a:rPr lang="en-US" dirty="0" smtClean="0">
+              <a:rPr lang="en-US" dirty="0">
                 <a:solidFill>
                   <a:prstClr val="black"/>
                 </a:solidFill>
@@ -16365,7 +18056,7 @@
           <a:p>
             <a:pPr indent="457200"/>
             <a:r>
-              <a:rPr lang="en-US" dirty="0" smtClean="0">
+              <a:rPr lang="en-US" dirty="0">
                 <a:solidFill>
                   <a:prstClr val="black"/>
                 </a:solidFill>
@@ -16376,18 +18067,13 @@
           <a:p>
             <a:pPr indent="457200"/>
             <a:r>
-              <a:rPr lang="en-US" dirty="0" smtClean="0">
+              <a:rPr lang="en-US" dirty="0">
                 <a:solidFill>
                   <a:prstClr val="black"/>
                 </a:solidFill>
               </a:rPr>
               <a:t>Element</a:t>
             </a:r>
-            <a:endParaRPr lang="en-US" dirty="0">
-              <a:solidFill>
-                <a:prstClr val="black"/>
-              </a:solidFill>
-            </a:endParaRPr>
           </a:p>
         </p:txBody>
       </p:sp>

</xml_diff>

<commit_message>
Updated circuit analogy table.
</commit_message>
<xml_diff>
--- a/docs/Figures/CircuitWorking.pptx
+++ b/docs/Figures/CircuitWorking.pptx
@@ -220,7 +220,7 @@
           <a:p>
             <a:fld id="{7B126BB8-5932-4ACC-8CD5-328D9DA138C9}" type="datetimeFigureOut">
               <a:rPr lang="en-US" smtClean="0"/>
-              <a:t>5/17/2018</a:t>
+              <a:t>8/10/2022</a:t>
             </a:fld>
             <a:endParaRPr lang="en-US"/>
           </a:p>
@@ -666,7 +666,7 @@
           <a:p>
             <a:fld id="{9E9AFD63-10BD-4598-9E1E-9FFECB76D2D7}" type="datetimeFigureOut">
               <a:rPr lang="en-US" smtClean="0"/>
-              <a:t>5/17/2018</a:t>
+              <a:t>8/10/2022</a:t>
             </a:fld>
             <a:endParaRPr lang="en-US"/>
           </a:p>
@@ -834,7 +834,7 @@
           <a:p>
             <a:fld id="{9E9AFD63-10BD-4598-9E1E-9FFECB76D2D7}" type="datetimeFigureOut">
               <a:rPr lang="en-US" smtClean="0"/>
-              <a:t>5/17/2018</a:t>
+              <a:t>8/10/2022</a:t>
             </a:fld>
             <a:endParaRPr lang="en-US"/>
           </a:p>
@@ -1012,7 +1012,7 @@
           <a:p>
             <a:fld id="{9E9AFD63-10BD-4598-9E1E-9FFECB76D2D7}" type="datetimeFigureOut">
               <a:rPr lang="en-US" smtClean="0"/>
-              <a:t>5/17/2018</a:t>
+              <a:t>8/10/2022</a:t>
             </a:fld>
             <a:endParaRPr lang="en-US"/>
           </a:p>
@@ -2767,7 +2767,7 @@
           <a:p>
             <a:fld id="{9E9AFD63-10BD-4598-9E1E-9FFECB76D2D7}" type="datetimeFigureOut">
               <a:rPr lang="en-US" smtClean="0"/>
-              <a:t>5/17/2018</a:t>
+              <a:t>8/10/2022</a:t>
             </a:fld>
             <a:endParaRPr lang="en-US"/>
           </a:p>
@@ -3211,7 +3211,7 @@
           <a:p>
             <a:fld id="{9E9AFD63-10BD-4598-9E1E-9FFECB76D2D7}" type="datetimeFigureOut">
               <a:rPr lang="en-US" smtClean="0"/>
-              <a:t>5/17/2018</a:t>
+              <a:t>8/10/2022</a:t>
             </a:fld>
             <a:endParaRPr lang="en-US"/>
           </a:p>
@@ -3496,7 +3496,7 @@
           <a:p>
             <a:fld id="{9E9AFD63-10BD-4598-9E1E-9FFECB76D2D7}" type="datetimeFigureOut">
               <a:rPr lang="en-US" smtClean="0"/>
-              <a:t>5/17/2018</a:t>
+              <a:t>8/10/2022</a:t>
             </a:fld>
             <a:endParaRPr lang="en-US"/>
           </a:p>
@@ -3915,7 +3915,7 @@
           <a:p>
             <a:fld id="{9E9AFD63-10BD-4598-9E1E-9FFECB76D2D7}" type="datetimeFigureOut">
               <a:rPr lang="en-US" smtClean="0"/>
-              <a:t>5/17/2018</a:t>
+              <a:t>8/10/2022</a:t>
             </a:fld>
             <a:endParaRPr lang="en-US"/>
           </a:p>
@@ -4032,7 +4032,7 @@
           <a:p>
             <a:fld id="{9E9AFD63-10BD-4598-9E1E-9FFECB76D2D7}" type="datetimeFigureOut">
               <a:rPr lang="en-US" smtClean="0"/>
-              <a:t>5/17/2018</a:t>
+              <a:t>8/10/2022</a:t>
             </a:fld>
             <a:endParaRPr lang="en-US"/>
           </a:p>
@@ -4127,7 +4127,7 @@
           <a:p>
             <a:fld id="{9E9AFD63-10BD-4598-9E1E-9FFECB76D2D7}" type="datetimeFigureOut">
               <a:rPr lang="en-US" smtClean="0"/>
-              <a:t>5/17/2018</a:t>
+              <a:t>8/10/2022</a:t>
             </a:fld>
             <a:endParaRPr lang="en-US"/>
           </a:p>
@@ -4402,7 +4402,7 @@
           <a:p>
             <a:fld id="{9E9AFD63-10BD-4598-9E1E-9FFECB76D2D7}" type="datetimeFigureOut">
               <a:rPr lang="en-US" smtClean="0"/>
-              <a:t>5/17/2018</a:t>
+              <a:t>8/10/2022</a:t>
             </a:fld>
             <a:endParaRPr lang="en-US"/>
           </a:p>
@@ -4654,7 +4654,7 @@
           <a:p>
             <a:fld id="{9E9AFD63-10BD-4598-9E1E-9FFECB76D2D7}" type="datetimeFigureOut">
               <a:rPr lang="en-US" smtClean="0"/>
-              <a:t>5/17/2018</a:t>
+              <a:t>8/10/2022</a:t>
             </a:fld>
             <a:endParaRPr lang="en-US"/>
           </a:p>
@@ -4865,7 +4865,7 @@
           <a:p>
             <a:fld id="{9E9AFD63-10BD-4598-9E1E-9FFECB76D2D7}" type="datetimeFigureOut">
               <a:rPr lang="en-US" smtClean="0"/>
-              <a:t>5/17/2018</a:t>
+              <a:t>8/10/2022</a:t>
             </a:fld>
             <a:endParaRPr lang="en-US"/>
           </a:p>
@@ -6144,10 +6144,10 @@
       </p:grpSpPr>
       <p:pic>
         <p:nvPicPr>
-          <p:cNvPr id="4" name="Picture 3">
+          <p:cNvPr id="3" name="Picture 2">
             <a:extLst>
               <a:ext uri="{FF2B5EF4-FFF2-40B4-BE49-F238E27FC236}">
-                <a16:creationId xmlns:a16="http://schemas.microsoft.com/office/drawing/2014/main" id="{0FAB2579-B426-4052-B0D7-695F10C2DF40}"/>
+                <a16:creationId xmlns:a16="http://schemas.microsoft.com/office/drawing/2014/main" id="{558D5147-BFB0-9EB7-A59C-99858F156607}"/>
               </a:ext>
             </a:extLst>
           </p:cNvPr>
@@ -6164,8 +6164,8 @@
         </p:blipFill>
         <p:spPr>
           <a:xfrm>
-            <a:off x="142875" y="685800"/>
-            <a:ext cx="8858250" cy="3886200"/>
+            <a:off x="0" y="1410924"/>
+            <a:ext cx="9144000" cy="4036151"/>
           </a:xfrm>
           <a:prstGeom prst="rect">
             <a:avLst/>

</xml_diff>

<commit_message>
Added black boxes to circuit methodology.
</commit_message>
<xml_diff>
--- a/docs/Figures/CircuitWorking.pptx
+++ b/docs/Figures/CircuitWorking.pptx
@@ -6,7 +6,7 @@
     <p:sldMasterId id="2147483672" r:id="rId2"/>
   </p:sldMasterIdLst>
   <p:notesMasterIdLst>
-    <p:notesMasterId r:id="rId15"/>
+    <p:notesMasterId r:id="rId16"/>
   </p:notesMasterIdLst>
   <p:sldIdLst>
     <p:sldId id="271" r:id="rId3"/>
@@ -21,6 +21,7 @@
     <p:sldId id="299" r:id="rId12"/>
     <p:sldId id="302" r:id="rId13"/>
     <p:sldId id="300" r:id="rId14"/>
+    <p:sldId id="303" r:id="rId15"/>
   </p:sldIdLst>
   <p:sldSz cx="9144000" cy="6858000" type="screen4x3"/>
   <p:notesSz cx="6996113" cy="9282113"/>
@@ -220,7 +221,7 @@
           <a:p>
             <a:fld id="{7B126BB8-5932-4ACC-8CD5-328D9DA138C9}" type="datetimeFigureOut">
               <a:rPr lang="en-US" smtClean="0"/>
-              <a:t>8/10/2022</a:t>
+              <a:t>12/29/2022</a:t>
             </a:fld>
             <a:endParaRPr lang="en-US"/>
           </a:p>
@@ -666,7 +667,7 @@
           <a:p>
             <a:fld id="{9E9AFD63-10BD-4598-9E1E-9FFECB76D2D7}" type="datetimeFigureOut">
               <a:rPr lang="en-US" smtClean="0"/>
-              <a:t>8/10/2022</a:t>
+              <a:t>12/29/2022</a:t>
             </a:fld>
             <a:endParaRPr lang="en-US"/>
           </a:p>
@@ -834,7 +835,7 @@
           <a:p>
             <a:fld id="{9E9AFD63-10BD-4598-9E1E-9FFECB76D2D7}" type="datetimeFigureOut">
               <a:rPr lang="en-US" smtClean="0"/>
-              <a:t>8/10/2022</a:t>
+              <a:t>12/29/2022</a:t>
             </a:fld>
             <a:endParaRPr lang="en-US"/>
           </a:p>
@@ -1012,7 +1013,7 @@
           <a:p>
             <a:fld id="{9E9AFD63-10BD-4598-9E1E-9FFECB76D2D7}" type="datetimeFigureOut">
               <a:rPr lang="en-US" smtClean="0"/>
-              <a:t>8/10/2022</a:t>
+              <a:t>12/29/2022</a:t>
             </a:fld>
             <a:endParaRPr lang="en-US"/>
           </a:p>
@@ -2767,7 +2768,7 @@
           <a:p>
             <a:fld id="{9E9AFD63-10BD-4598-9E1E-9FFECB76D2D7}" type="datetimeFigureOut">
               <a:rPr lang="en-US" smtClean="0"/>
-              <a:t>8/10/2022</a:t>
+              <a:t>12/29/2022</a:t>
             </a:fld>
             <a:endParaRPr lang="en-US"/>
           </a:p>
@@ -3211,7 +3212,7 @@
           <a:p>
             <a:fld id="{9E9AFD63-10BD-4598-9E1E-9FFECB76D2D7}" type="datetimeFigureOut">
               <a:rPr lang="en-US" smtClean="0"/>
-              <a:t>8/10/2022</a:t>
+              <a:t>12/29/2022</a:t>
             </a:fld>
             <a:endParaRPr lang="en-US"/>
           </a:p>
@@ -3496,7 +3497,7 @@
           <a:p>
             <a:fld id="{9E9AFD63-10BD-4598-9E1E-9FFECB76D2D7}" type="datetimeFigureOut">
               <a:rPr lang="en-US" smtClean="0"/>
-              <a:t>8/10/2022</a:t>
+              <a:t>12/29/2022</a:t>
             </a:fld>
             <a:endParaRPr lang="en-US"/>
           </a:p>
@@ -3915,7 +3916,7 @@
           <a:p>
             <a:fld id="{9E9AFD63-10BD-4598-9E1E-9FFECB76D2D7}" type="datetimeFigureOut">
               <a:rPr lang="en-US" smtClean="0"/>
-              <a:t>8/10/2022</a:t>
+              <a:t>12/29/2022</a:t>
             </a:fld>
             <a:endParaRPr lang="en-US"/>
           </a:p>
@@ -4032,7 +4033,7 @@
           <a:p>
             <a:fld id="{9E9AFD63-10BD-4598-9E1E-9FFECB76D2D7}" type="datetimeFigureOut">
               <a:rPr lang="en-US" smtClean="0"/>
-              <a:t>8/10/2022</a:t>
+              <a:t>12/29/2022</a:t>
             </a:fld>
             <a:endParaRPr lang="en-US"/>
           </a:p>
@@ -4127,7 +4128,7 @@
           <a:p>
             <a:fld id="{9E9AFD63-10BD-4598-9E1E-9FFECB76D2D7}" type="datetimeFigureOut">
               <a:rPr lang="en-US" smtClean="0"/>
-              <a:t>8/10/2022</a:t>
+              <a:t>12/29/2022</a:t>
             </a:fld>
             <a:endParaRPr lang="en-US"/>
           </a:p>
@@ -4402,7 +4403,7 @@
           <a:p>
             <a:fld id="{9E9AFD63-10BD-4598-9E1E-9FFECB76D2D7}" type="datetimeFigureOut">
               <a:rPr lang="en-US" smtClean="0"/>
-              <a:t>8/10/2022</a:t>
+              <a:t>12/29/2022</a:t>
             </a:fld>
             <a:endParaRPr lang="en-US"/>
           </a:p>
@@ -4654,7 +4655,7 @@
           <a:p>
             <a:fld id="{9E9AFD63-10BD-4598-9E1E-9FFECB76D2D7}" type="datetimeFigureOut">
               <a:rPr lang="en-US" smtClean="0"/>
-              <a:t>8/10/2022</a:t>
+              <a:t>12/29/2022</a:t>
             </a:fld>
             <a:endParaRPr lang="en-US"/>
           </a:p>
@@ -4865,7 +4866,7 @@
           <a:p>
             <a:fld id="{9E9AFD63-10BD-4598-9E1E-9FFECB76D2D7}" type="datetimeFigureOut">
               <a:rPr lang="en-US" smtClean="0"/>
-              <a:t>8/10/2022</a:t>
+              <a:t>12/29/2022</a:t>
             </a:fld>
             <a:endParaRPr lang="en-US"/>
           </a:p>
@@ -7920,6 +7921,869 @@
     <p:extLst>
       <p:ext uri="{BB962C8B-B14F-4D97-AF65-F5344CB8AC3E}">
         <p14:creationId xmlns:p14="http://schemas.microsoft.com/office/powerpoint/2010/main" val="1477589741"/>
+      </p:ext>
+    </p:extLst>
+  </p:cSld>
+  <p:clrMapOvr>
+    <a:masterClrMapping/>
+  </p:clrMapOvr>
+</p:sld>
+</file>
+
+<file path=ppt/slides/slide13.xml><?xml version="1.0" encoding="utf-8"?>
+<p:sld xmlns:a="http://schemas.openxmlformats.org/drawingml/2006/main" xmlns:r="http://schemas.openxmlformats.org/officeDocument/2006/relationships" xmlns:p="http://schemas.openxmlformats.org/presentationml/2006/main">
+  <p:cSld>
+    <p:spTree>
+      <p:nvGrpSpPr>
+        <p:cNvPr id="1" name=""/>
+        <p:cNvGrpSpPr/>
+        <p:nvPr/>
+      </p:nvGrpSpPr>
+      <p:grpSpPr>
+        <a:xfrm>
+          <a:off x="0" y="0"/>
+          <a:ext cx="0" cy="0"/>
+          <a:chOff x="0" y="0"/>
+          <a:chExt cx="0" cy="0"/>
+        </a:xfrm>
+      </p:grpSpPr>
+      <p:sp>
+        <p:nvSpPr>
+          <p:cNvPr id="2" name="Rectangle 1">
+            <a:extLst>
+              <a:ext uri="{FF2B5EF4-FFF2-40B4-BE49-F238E27FC236}">
+                <a16:creationId xmlns:a16="http://schemas.microsoft.com/office/drawing/2014/main" id="{26E85C06-1EDA-FA7C-AB42-F039451BFBFB}"/>
+              </a:ext>
+            </a:extLst>
+          </p:cNvPr>
+          <p:cNvSpPr/>
+          <p:nvPr/>
+        </p:nvSpPr>
+        <p:spPr>
+          <a:xfrm>
+            <a:off x="2798517" y="3276080"/>
+            <a:ext cx="3657600" cy="1873773"/>
+          </a:xfrm>
+          <a:prstGeom prst="rect">
+            <a:avLst/>
+          </a:prstGeom>
+          <a:noFill/>
+          <a:ln>
+            <a:solidFill>
+              <a:srgbClr val="0070C0"/>
+            </a:solidFill>
+            <a:prstDash val="dash"/>
+          </a:ln>
+        </p:spPr>
+        <p:style>
+          <a:lnRef idx="2">
+            <a:schemeClr val="accent1">
+              <a:shade val="50000"/>
+            </a:schemeClr>
+          </a:lnRef>
+          <a:fillRef idx="1">
+            <a:schemeClr val="accent1"/>
+          </a:fillRef>
+          <a:effectRef idx="0">
+            <a:schemeClr val="accent1"/>
+          </a:effectRef>
+          <a:fontRef idx="minor">
+            <a:schemeClr val="lt1"/>
+          </a:fontRef>
+        </p:style>
+        <p:txBody>
+          <a:bodyPr rtlCol="0" anchor="t"/>
+          <a:lstStyle/>
+          <a:p>
+            <a:pPr algn="ctr"/>
+            <a:r>
+              <a:rPr lang="en-US" dirty="0">
+                <a:solidFill>
+                  <a:srgbClr val="0070C0"/>
+                </a:solidFill>
+              </a:rPr>
+              <a:t>Black Box Boundary</a:t>
+            </a:r>
+          </a:p>
+        </p:txBody>
+      </p:sp>
+      <p:sp>
+        <p:nvSpPr>
+          <p:cNvPr id="3" name="Oval 2">
+            <a:extLst>
+              <a:ext uri="{FF2B5EF4-FFF2-40B4-BE49-F238E27FC236}">
+                <a16:creationId xmlns:a16="http://schemas.microsoft.com/office/drawing/2014/main" id="{4C3AA7AF-DFD2-4113-0796-1A3207950246}"/>
+              </a:ext>
+            </a:extLst>
+          </p:cNvPr>
+          <p:cNvSpPr/>
+          <p:nvPr/>
+        </p:nvSpPr>
+        <p:spPr>
+          <a:xfrm>
+            <a:off x="4480560" y="4218155"/>
+            <a:ext cx="182880" cy="182880"/>
+          </a:xfrm>
+          <a:prstGeom prst="ellipse">
+            <a:avLst/>
+          </a:prstGeom>
+          <a:solidFill>
+            <a:schemeClr val="tx1"/>
+          </a:solidFill>
+          <a:ln>
+            <a:noFill/>
+          </a:ln>
+        </p:spPr>
+        <p:style>
+          <a:lnRef idx="2">
+            <a:schemeClr val="accent1">
+              <a:shade val="50000"/>
+            </a:schemeClr>
+          </a:lnRef>
+          <a:fillRef idx="1">
+            <a:schemeClr val="accent1"/>
+          </a:fillRef>
+          <a:effectRef idx="0">
+            <a:schemeClr val="accent1"/>
+          </a:effectRef>
+          <a:fontRef idx="minor">
+            <a:schemeClr val="lt1"/>
+          </a:fontRef>
+        </p:style>
+        <p:txBody>
+          <a:bodyPr rtlCol="0" anchor="ctr"/>
+          <a:lstStyle/>
+          <a:p>
+            <a:pPr algn="ctr"/>
+            <a:endParaRPr lang="en-US"/>
+          </a:p>
+        </p:txBody>
+      </p:sp>
+      <p:sp>
+        <p:nvSpPr>
+          <p:cNvPr id="6" name="TextBox 5">
+            <a:extLst>
+              <a:ext uri="{FF2B5EF4-FFF2-40B4-BE49-F238E27FC236}">
+                <a16:creationId xmlns:a16="http://schemas.microsoft.com/office/drawing/2014/main" id="{A84563B5-549C-3D80-ABF6-20FE3687EF49}"/>
+              </a:ext>
+            </a:extLst>
+          </p:cNvPr>
+          <p:cNvSpPr txBox="1"/>
+          <p:nvPr/>
+        </p:nvSpPr>
+        <p:spPr>
+          <a:xfrm>
+            <a:off x="867912" y="3945908"/>
+            <a:ext cx="1852145" cy="646331"/>
+          </a:xfrm>
+          <a:prstGeom prst="rect">
+            <a:avLst/>
+          </a:prstGeom>
+          <a:noFill/>
+        </p:spPr>
+        <p:txBody>
+          <a:bodyPr wrap="square" rtlCol="0">
+            <a:spAutoFit/>
+          </a:bodyPr>
+          <a:lstStyle/>
+          <a:p>
+            <a:pPr algn="r"/>
+            <a:r>
+              <a:rPr lang="en-US" dirty="0"/>
+              <a:t>Source Node/Potential</a:t>
+            </a:r>
+          </a:p>
+        </p:txBody>
+      </p:sp>
+      <p:sp>
+        <p:nvSpPr>
+          <p:cNvPr id="7" name="TextBox 6">
+            <a:extLst>
+              <a:ext uri="{FF2B5EF4-FFF2-40B4-BE49-F238E27FC236}">
+                <a16:creationId xmlns:a16="http://schemas.microsoft.com/office/drawing/2014/main" id="{A8FD2AA2-9857-B6C7-1C09-CA699E49453A}"/>
+              </a:ext>
+            </a:extLst>
+          </p:cNvPr>
+          <p:cNvSpPr txBox="1"/>
+          <p:nvPr/>
+        </p:nvSpPr>
+        <p:spPr>
+          <a:xfrm>
+            <a:off x="6528894" y="3981240"/>
+            <a:ext cx="1644671" cy="646331"/>
+          </a:xfrm>
+          <a:prstGeom prst="rect">
+            <a:avLst/>
+          </a:prstGeom>
+          <a:noFill/>
+        </p:spPr>
+        <p:txBody>
+          <a:bodyPr wrap="square" rtlCol="0">
+            <a:spAutoFit/>
+          </a:bodyPr>
+          <a:lstStyle/>
+          <a:p>
+            <a:r>
+              <a:rPr lang="en-US" dirty="0"/>
+              <a:t>Target Node/Potential</a:t>
+            </a:r>
+          </a:p>
+        </p:txBody>
+      </p:sp>
+      <p:sp>
+        <p:nvSpPr>
+          <p:cNvPr id="8" name="TextBox 7">
+            <a:extLst>
+              <a:ext uri="{FF2B5EF4-FFF2-40B4-BE49-F238E27FC236}">
+                <a16:creationId xmlns:a16="http://schemas.microsoft.com/office/drawing/2014/main" id="{63924092-4790-C620-87C2-10A6EACAE369}"/>
+              </a:ext>
+            </a:extLst>
+          </p:cNvPr>
+          <p:cNvSpPr txBox="1"/>
+          <p:nvPr/>
+        </p:nvSpPr>
+        <p:spPr>
+          <a:xfrm>
+            <a:off x="3200399" y="4360950"/>
+            <a:ext cx="2743202" cy="646331"/>
+          </a:xfrm>
+          <a:prstGeom prst="rect">
+            <a:avLst/>
+          </a:prstGeom>
+          <a:noFill/>
+        </p:spPr>
+        <p:txBody>
+          <a:bodyPr wrap="square" rtlCol="0">
+            <a:spAutoFit/>
+          </a:bodyPr>
+          <a:lstStyle/>
+          <a:p>
+            <a:pPr algn="ctr"/>
+            <a:r>
+              <a:rPr lang="en-US" dirty="0"/>
+              <a:t>Middle (Internal) Node/Potential/Quantity</a:t>
+            </a:r>
+          </a:p>
+        </p:txBody>
+      </p:sp>
+      <p:sp>
+        <p:nvSpPr>
+          <p:cNvPr id="9" name="TextBox 8">
+            <a:extLst>
+              <a:ext uri="{FF2B5EF4-FFF2-40B4-BE49-F238E27FC236}">
+                <a16:creationId xmlns:a16="http://schemas.microsoft.com/office/drawing/2014/main" id="{6D449E48-A6EA-C500-F99A-EB90C451D945}"/>
+              </a:ext>
+            </a:extLst>
+          </p:cNvPr>
+          <p:cNvSpPr txBox="1"/>
+          <p:nvPr/>
+        </p:nvSpPr>
+        <p:spPr>
+          <a:xfrm>
+            <a:off x="4641260" y="3935074"/>
+            <a:ext cx="1708225" cy="369332"/>
+          </a:xfrm>
+          <a:prstGeom prst="rect">
+            <a:avLst/>
+          </a:prstGeom>
+          <a:noFill/>
+        </p:spPr>
+        <p:txBody>
+          <a:bodyPr wrap="none" rtlCol="0">
+            <a:spAutoFit/>
+          </a:bodyPr>
+          <a:lstStyle/>
+          <a:p>
+            <a:pPr algn="ctr"/>
+            <a:r>
+              <a:rPr lang="en-US" dirty="0">
+                <a:solidFill>
+                  <a:srgbClr val="C00000"/>
+                </a:solidFill>
+              </a:rPr>
+              <a:t>Target Path/Flux</a:t>
+            </a:r>
+          </a:p>
+        </p:txBody>
+      </p:sp>
+      <p:sp>
+        <p:nvSpPr>
+          <p:cNvPr id="10" name="TextBox 9">
+            <a:extLst>
+              <a:ext uri="{FF2B5EF4-FFF2-40B4-BE49-F238E27FC236}">
+                <a16:creationId xmlns:a16="http://schemas.microsoft.com/office/drawing/2014/main" id="{A438C12F-56FD-5C11-D4DB-82828A20CF0E}"/>
+              </a:ext>
+            </a:extLst>
+          </p:cNvPr>
+          <p:cNvSpPr txBox="1"/>
+          <p:nvPr/>
+        </p:nvSpPr>
+        <p:spPr>
+          <a:xfrm>
+            <a:off x="2767028" y="3935074"/>
+            <a:ext cx="1767600" cy="369332"/>
+          </a:xfrm>
+          <a:prstGeom prst="rect">
+            <a:avLst/>
+          </a:prstGeom>
+          <a:noFill/>
+        </p:spPr>
+        <p:txBody>
+          <a:bodyPr wrap="none" rtlCol="0">
+            <a:spAutoFit/>
+          </a:bodyPr>
+          <a:lstStyle/>
+          <a:p>
+            <a:pPr algn="ctr"/>
+            <a:r>
+              <a:rPr lang="en-US" dirty="0">
+                <a:solidFill>
+                  <a:srgbClr val="C00000"/>
+                </a:solidFill>
+              </a:rPr>
+              <a:t>Source Path/Flux</a:t>
+            </a:r>
+          </a:p>
+        </p:txBody>
+      </p:sp>
+      <p:sp>
+        <p:nvSpPr>
+          <p:cNvPr id="15" name="Oval 14">
+            <a:extLst>
+              <a:ext uri="{FF2B5EF4-FFF2-40B4-BE49-F238E27FC236}">
+                <a16:creationId xmlns:a16="http://schemas.microsoft.com/office/drawing/2014/main" id="{8D01013D-9826-F75C-9FFA-0B4150205C6E}"/>
+              </a:ext>
+            </a:extLst>
+          </p:cNvPr>
+          <p:cNvSpPr/>
+          <p:nvPr/>
+        </p:nvSpPr>
+        <p:spPr>
+          <a:xfrm>
+            <a:off x="6364677" y="4212966"/>
+            <a:ext cx="182880" cy="182880"/>
+          </a:xfrm>
+          <a:prstGeom prst="ellipse">
+            <a:avLst/>
+          </a:prstGeom>
+          <a:solidFill>
+            <a:schemeClr val="tx1"/>
+          </a:solidFill>
+          <a:ln>
+            <a:noFill/>
+          </a:ln>
+        </p:spPr>
+        <p:style>
+          <a:lnRef idx="2">
+            <a:schemeClr val="accent1">
+              <a:shade val="50000"/>
+            </a:schemeClr>
+          </a:lnRef>
+          <a:fillRef idx="1">
+            <a:schemeClr val="accent1"/>
+          </a:fillRef>
+          <a:effectRef idx="0">
+            <a:schemeClr val="accent1"/>
+          </a:effectRef>
+          <a:fontRef idx="minor">
+            <a:schemeClr val="lt1"/>
+          </a:fontRef>
+        </p:style>
+        <p:txBody>
+          <a:bodyPr rtlCol="0" anchor="ctr"/>
+          <a:lstStyle/>
+          <a:p>
+            <a:pPr algn="ctr"/>
+            <a:endParaRPr lang="en-US"/>
+          </a:p>
+        </p:txBody>
+      </p:sp>
+      <p:sp>
+        <p:nvSpPr>
+          <p:cNvPr id="16" name="Oval 15">
+            <a:extLst>
+              <a:ext uri="{FF2B5EF4-FFF2-40B4-BE49-F238E27FC236}">
+                <a16:creationId xmlns:a16="http://schemas.microsoft.com/office/drawing/2014/main" id="{EBA66817-7464-E9A3-D0D7-E25972DDE764}"/>
+              </a:ext>
+            </a:extLst>
+          </p:cNvPr>
+          <p:cNvSpPr/>
+          <p:nvPr/>
+        </p:nvSpPr>
+        <p:spPr>
+          <a:xfrm>
+            <a:off x="2707077" y="4217320"/>
+            <a:ext cx="182880" cy="182880"/>
+          </a:xfrm>
+          <a:prstGeom prst="ellipse">
+            <a:avLst/>
+          </a:prstGeom>
+          <a:solidFill>
+            <a:schemeClr val="tx1"/>
+          </a:solidFill>
+          <a:ln>
+            <a:noFill/>
+          </a:ln>
+        </p:spPr>
+        <p:style>
+          <a:lnRef idx="2">
+            <a:schemeClr val="accent1">
+              <a:shade val="50000"/>
+            </a:schemeClr>
+          </a:lnRef>
+          <a:fillRef idx="1">
+            <a:schemeClr val="accent1"/>
+          </a:fillRef>
+          <a:effectRef idx="0">
+            <a:schemeClr val="accent1"/>
+          </a:effectRef>
+          <a:fontRef idx="minor">
+            <a:schemeClr val="lt1"/>
+          </a:fontRef>
+        </p:style>
+        <p:txBody>
+          <a:bodyPr rtlCol="0" anchor="ctr"/>
+          <a:lstStyle/>
+          <a:p>
+            <a:pPr algn="ctr"/>
+            <a:endParaRPr lang="en-US"/>
+          </a:p>
+        </p:txBody>
+      </p:sp>
+      <p:cxnSp>
+        <p:nvCxnSpPr>
+          <p:cNvPr id="19" name="Straight Arrow Connector 18">
+            <a:extLst>
+              <a:ext uri="{FF2B5EF4-FFF2-40B4-BE49-F238E27FC236}">
+                <a16:creationId xmlns:a16="http://schemas.microsoft.com/office/drawing/2014/main" id="{5A71A2B5-1334-AF8F-3894-6D53BCDBECC2}"/>
+              </a:ext>
+            </a:extLst>
+          </p:cNvPr>
+          <p:cNvCxnSpPr>
+            <a:cxnSpLocks/>
+            <a:stCxn id="3" idx="6"/>
+            <a:endCxn id="15" idx="2"/>
+          </p:cNvCxnSpPr>
+          <p:nvPr/>
+        </p:nvCxnSpPr>
+        <p:spPr>
+          <a:xfrm flipV="1">
+            <a:off x="4663440" y="4304406"/>
+            <a:ext cx="1701237" cy="5189"/>
+          </a:xfrm>
+          <a:prstGeom prst="straightConnector1">
+            <a:avLst/>
+          </a:prstGeom>
+          <a:ln w="25400">
+            <a:solidFill>
+              <a:srgbClr val="C00000"/>
+            </a:solidFill>
+            <a:tailEnd type="arrow" w="lg" len="lg"/>
+          </a:ln>
+        </p:spPr>
+        <p:style>
+          <a:lnRef idx="1">
+            <a:schemeClr val="accent1"/>
+          </a:lnRef>
+          <a:fillRef idx="0">
+            <a:schemeClr val="accent1"/>
+          </a:fillRef>
+          <a:effectRef idx="0">
+            <a:schemeClr val="accent1"/>
+          </a:effectRef>
+          <a:fontRef idx="minor">
+            <a:schemeClr val="tx1"/>
+          </a:fontRef>
+        </p:style>
+      </p:cxnSp>
+      <p:cxnSp>
+        <p:nvCxnSpPr>
+          <p:cNvPr id="22" name="Straight Arrow Connector 21">
+            <a:extLst>
+              <a:ext uri="{FF2B5EF4-FFF2-40B4-BE49-F238E27FC236}">
+                <a16:creationId xmlns:a16="http://schemas.microsoft.com/office/drawing/2014/main" id="{82015ED0-2D25-53FD-44D6-C44C4923AFF1}"/>
+              </a:ext>
+            </a:extLst>
+          </p:cNvPr>
+          <p:cNvCxnSpPr>
+            <a:cxnSpLocks/>
+            <a:stCxn id="16" idx="6"/>
+            <a:endCxn id="3" idx="2"/>
+          </p:cNvCxnSpPr>
+          <p:nvPr/>
+        </p:nvCxnSpPr>
+        <p:spPr>
+          <a:xfrm>
+            <a:off x="2889957" y="4308760"/>
+            <a:ext cx="1590603" cy="835"/>
+          </a:xfrm>
+          <a:prstGeom prst="straightConnector1">
+            <a:avLst/>
+          </a:prstGeom>
+          <a:ln w="25400">
+            <a:solidFill>
+              <a:srgbClr val="C00000"/>
+            </a:solidFill>
+            <a:tailEnd type="arrow" w="lg" len="lg"/>
+          </a:ln>
+        </p:spPr>
+        <p:style>
+          <a:lnRef idx="1">
+            <a:schemeClr val="accent1"/>
+          </a:lnRef>
+          <a:fillRef idx="0">
+            <a:schemeClr val="accent1"/>
+          </a:fillRef>
+          <a:effectRef idx="0">
+            <a:schemeClr val="accent1"/>
+          </a:effectRef>
+          <a:fontRef idx="minor">
+            <a:schemeClr val="tx1"/>
+          </a:fontRef>
+        </p:style>
+      </p:cxnSp>
+      <p:sp>
+        <p:nvSpPr>
+          <p:cNvPr id="37" name="TextBox 36">
+            <a:extLst>
+              <a:ext uri="{FF2B5EF4-FFF2-40B4-BE49-F238E27FC236}">
+                <a16:creationId xmlns:a16="http://schemas.microsoft.com/office/drawing/2014/main" id="{9B84598A-71E8-6469-C82C-2C68BA1C5EAC}"/>
+              </a:ext>
+            </a:extLst>
+          </p:cNvPr>
+          <p:cNvSpPr txBox="1"/>
+          <p:nvPr/>
+        </p:nvSpPr>
+        <p:spPr>
+          <a:xfrm>
+            <a:off x="1600200" y="1635548"/>
+            <a:ext cx="1119857" cy="646331"/>
+          </a:xfrm>
+          <a:prstGeom prst="rect">
+            <a:avLst/>
+          </a:prstGeom>
+          <a:noFill/>
+        </p:spPr>
+        <p:txBody>
+          <a:bodyPr wrap="square" rtlCol="0">
+            <a:spAutoFit/>
+          </a:bodyPr>
+          <a:lstStyle/>
+          <a:p>
+            <a:pPr algn="r"/>
+            <a:r>
+              <a:rPr lang="en-US" dirty="0"/>
+              <a:t>Source Node</a:t>
+            </a:r>
+          </a:p>
+        </p:txBody>
+      </p:sp>
+      <p:sp>
+        <p:nvSpPr>
+          <p:cNvPr id="38" name="TextBox 37">
+            <a:extLst>
+              <a:ext uri="{FF2B5EF4-FFF2-40B4-BE49-F238E27FC236}">
+                <a16:creationId xmlns:a16="http://schemas.microsoft.com/office/drawing/2014/main" id="{13419F0A-D37F-D531-BAA8-A6CA1C0F4879}"/>
+              </a:ext>
+            </a:extLst>
+          </p:cNvPr>
+          <p:cNvSpPr txBox="1"/>
+          <p:nvPr/>
+        </p:nvSpPr>
+        <p:spPr>
+          <a:xfrm>
+            <a:off x="6528895" y="1635548"/>
+            <a:ext cx="1091106" cy="646331"/>
+          </a:xfrm>
+          <a:prstGeom prst="rect">
+            <a:avLst/>
+          </a:prstGeom>
+          <a:noFill/>
+        </p:spPr>
+        <p:txBody>
+          <a:bodyPr wrap="square" rtlCol="0">
+            <a:spAutoFit/>
+          </a:bodyPr>
+          <a:lstStyle/>
+          <a:p>
+            <a:r>
+              <a:rPr lang="en-US" dirty="0"/>
+              <a:t>Target Node</a:t>
+            </a:r>
+          </a:p>
+        </p:txBody>
+      </p:sp>
+      <p:sp>
+        <p:nvSpPr>
+          <p:cNvPr id="39" name="Oval 38">
+            <a:extLst>
+              <a:ext uri="{FF2B5EF4-FFF2-40B4-BE49-F238E27FC236}">
+                <a16:creationId xmlns:a16="http://schemas.microsoft.com/office/drawing/2014/main" id="{07E4B018-8A0B-00E1-6BFC-FA4B0941026D}"/>
+              </a:ext>
+            </a:extLst>
+          </p:cNvPr>
+          <p:cNvSpPr/>
+          <p:nvPr/>
+        </p:nvSpPr>
+        <p:spPr>
+          <a:xfrm>
+            <a:off x="6364677" y="1867273"/>
+            <a:ext cx="182880" cy="182880"/>
+          </a:xfrm>
+          <a:prstGeom prst="ellipse">
+            <a:avLst/>
+          </a:prstGeom>
+          <a:solidFill>
+            <a:schemeClr val="tx1"/>
+          </a:solidFill>
+          <a:ln>
+            <a:noFill/>
+          </a:ln>
+        </p:spPr>
+        <p:style>
+          <a:lnRef idx="2">
+            <a:schemeClr val="accent1">
+              <a:shade val="50000"/>
+            </a:schemeClr>
+          </a:lnRef>
+          <a:fillRef idx="1">
+            <a:schemeClr val="accent1"/>
+          </a:fillRef>
+          <a:effectRef idx="0">
+            <a:schemeClr val="accent1"/>
+          </a:effectRef>
+          <a:fontRef idx="minor">
+            <a:schemeClr val="lt1"/>
+          </a:fontRef>
+        </p:style>
+        <p:txBody>
+          <a:bodyPr rtlCol="0" anchor="ctr"/>
+          <a:lstStyle/>
+          <a:p>
+            <a:pPr algn="ctr"/>
+            <a:endParaRPr lang="en-US"/>
+          </a:p>
+        </p:txBody>
+      </p:sp>
+      <p:sp>
+        <p:nvSpPr>
+          <p:cNvPr id="40" name="Oval 39">
+            <a:extLst>
+              <a:ext uri="{FF2B5EF4-FFF2-40B4-BE49-F238E27FC236}">
+                <a16:creationId xmlns:a16="http://schemas.microsoft.com/office/drawing/2014/main" id="{4E935592-0382-A920-CEC8-71E4323F2E8D}"/>
+              </a:ext>
+            </a:extLst>
+          </p:cNvPr>
+          <p:cNvSpPr/>
+          <p:nvPr/>
+        </p:nvSpPr>
+        <p:spPr>
+          <a:xfrm>
+            <a:off x="2707077" y="1867273"/>
+            <a:ext cx="182880" cy="182880"/>
+          </a:xfrm>
+          <a:prstGeom prst="ellipse">
+            <a:avLst/>
+          </a:prstGeom>
+          <a:solidFill>
+            <a:schemeClr val="tx1"/>
+          </a:solidFill>
+          <a:ln>
+            <a:noFill/>
+          </a:ln>
+        </p:spPr>
+        <p:style>
+          <a:lnRef idx="2">
+            <a:schemeClr val="accent1">
+              <a:shade val="50000"/>
+            </a:schemeClr>
+          </a:lnRef>
+          <a:fillRef idx="1">
+            <a:schemeClr val="accent1"/>
+          </a:fillRef>
+          <a:effectRef idx="0">
+            <a:schemeClr val="accent1"/>
+          </a:effectRef>
+          <a:fontRef idx="minor">
+            <a:schemeClr val="lt1"/>
+          </a:fontRef>
+        </p:style>
+        <p:txBody>
+          <a:bodyPr rtlCol="0" anchor="ctr"/>
+          <a:lstStyle/>
+          <a:p>
+            <a:pPr algn="ctr"/>
+            <a:endParaRPr lang="en-US"/>
+          </a:p>
+        </p:txBody>
+      </p:sp>
+      <p:cxnSp>
+        <p:nvCxnSpPr>
+          <p:cNvPr id="41" name="Straight Arrow Connector 40">
+            <a:extLst>
+              <a:ext uri="{FF2B5EF4-FFF2-40B4-BE49-F238E27FC236}">
+                <a16:creationId xmlns:a16="http://schemas.microsoft.com/office/drawing/2014/main" id="{AF6CBDF1-3CCB-6AA2-7300-7B70DBB9D155}"/>
+              </a:ext>
+            </a:extLst>
+          </p:cNvPr>
+          <p:cNvCxnSpPr>
+            <a:cxnSpLocks/>
+            <a:endCxn id="39" idx="2"/>
+          </p:cNvCxnSpPr>
+          <p:nvPr/>
+        </p:nvCxnSpPr>
+        <p:spPr>
+          <a:xfrm>
+            <a:off x="2889957" y="1957878"/>
+            <a:ext cx="3474720" cy="835"/>
+          </a:xfrm>
+          <a:prstGeom prst="straightConnector1">
+            <a:avLst/>
+          </a:prstGeom>
+          <a:ln w="25400">
+            <a:solidFill>
+              <a:schemeClr val="tx1"/>
+            </a:solidFill>
+            <a:tailEnd type="none" w="lg" len="lg"/>
+          </a:ln>
+        </p:spPr>
+        <p:style>
+          <a:lnRef idx="1">
+            <a:schemeClr val="accent1"/>
+          </a:lnRef>
+          <a:fillRef idx="0">
+            <a:schemeClr val="accent1"/>
+          </a:fillRef>
+          <a:effectRef idx="0">
+            <a:schemeClr val="accent1"/>
+          </a:effectRef>
+          <a:fontRef idx="minor">
+            <a:schemeClr val="tx1"/>
+          </a:fontRef>
+        </p:style>
+      </p:cxnSp>
+      <p:sp>
+        <p:nvSpPr>
+          <p:cNvPr id="34" name="Rectangle 33">
+            <a:extLst>
+              <a:ext uri="{FF2B5EF4-FFF2-40B4-BE49-F238E27FC236}">
+                <a16:creationId xmlns:a16="http://schemas.microsoft.com/office/drawing/2014/main" id="{9574BD36-307D-4D39-1024-104D830D0DD5}"/>
+              </a:ext>
+            </a:extLst>
+          </p:cNvPr>
+          <p:cNvSpPr/>
+          <p:nvPr/>
+        </p:nvSpPr>
+        <p:spPr>
+          <a:xfrm>
+            <a:off x="3382309" y="1532670"/>
+            <a:ext cx="2485091" cy="852088"/>
+          </a:xfrm>
+          <a:prstGeom prst="rect">
+            <a:avLst/>
+          </a:prstGeom>
+          <a:solidFill>
+            <a:schemeClr val="tx1"/>
+          </a:solidFill>
+          <a:ln>
+            <a:noFill/>
+            <a:prstDash val="dash"/>
+          </a:ln>
+        </p:spPr>
+        <p:style>
+          <a:lnRef idx="2">
+            <a:schemeClr val="accent1">
+              <a:shade val="50000"/>
+            </a:schemeClr>
+          </a:lnRef>
+          <a:fillRef idx="1">
+            <a:schemeClr val="accent1"/>
+          </a:fillRef>
+          <a:effectRef idx="0">
+            <a:schemeClr val="accent1"/>
+          </a:effectRef>
+          <a:fontRef idx="minor">
+            <a:schemeClr val="lt1"/>
+          </a:fontRef>
+        </p:style>
+        <p:txBody>
+          <a:bodyPr rtlCol="0" anchor="ctr"/>
+          <a:lstStyle/>
+          <a:p>
+            <a:pPr algn="ctr"/>
+            <a:r>
+              <a:rPr lang="en-US" dirty="0">
+                <a:solidFill>
+                  <a:schemeClr val="bg1"/>
+                </a:solidFill>
+              </a:rPr>
+              <a:t>Black Box Element</a:t>
+            </a:r>
+          </a:p>
+        </p:txBody>
+      </p:sp>
+      <p:sp>
+        <p:nvSpPr>
+          <p:cNvPr id="43" name="Arrow: Down 42">
+            <a:extLst>
+              <a:ext uri="{FF2B5EF4-FFF2-40B4-BE49-F238E27FC236}">
+                <a16:creationId xmlns:a16="http://schemas.microsoft.com/office/drawing/2014/main" id="{62F794F8-1E5B-DD99-31DF-EAA287B3CF2F}"/>
+              </a:ext>
+            </a:extLst>
+          </p:cNvPr>
+          <p:cNvSpPr/>
+          <p:nvPr/>
+        </p:nvSpPr>
+        <p:spPr>
+          <a:xfrm>
+            <a:off x="4381500" y="2601819"/>
+            <a:ext cx="381000" cy="457200"/>
+          </a:xfrm>
+          <a:prstGeom prst="downArrow">
+            <a:avLst/>
+          </a:prstGeom>
+          <a:solidFill>
+            <a:schemeClr val="bg1">
+              <a:lumMod val="75000"/>
+            </a:schemeClr>
+          </a:solidFill>
+          <a:ln>
+            <a:solidFill>
+              <a:schemeClr val="bg1">
+                <a:lumMod val="50000"/>
+              </a:schemeClr>
+            </a:solidFill>
+          </a:ln>
+        </p:spPr>
+        <p:style>
+          <a:lnRef idx="2">
+            <a:schemeClr val="accent1">
+              <a:shade val="50000"/>
+            </a:schemeClr>
+          </a:lnRef>
+          <a:fillRef idx="1">
+            <a:schemeClr val="accent1"/>
+          </a:fillRef>
+          <a:effectRef idx="0">
+            <a:schemeClr val="accent1"/>
+          </a:effectRef>
+          <a:fontRef idx="minor">
+            <a:schemeClr val="lt1"/>
+          </a:fontRef>
+        </p:style>
+        <p:txBody>
+          <a:bodyPr rtlCol="0" anchor="ctr"/>
+          <a:lstStyle/>
+          <a:p>
+            <a:pPr algn="ctr"/>
+            <a:endParaRPr lang="en-US"/>
+          </a:p>
+        </p:txBody>
+      </p:sp>
+    </p:spTree>
+    <p:extLst>
+      <p:ext uri="{BB962C8B-B14F-4D97-AF65-F5344CB8AC3E}">
+        <p14:creationId xmlns:p14="http://schemas.microsoft.com/office/powerpoint/2010/main" val="3530938150"/>
       </p:ext>
     </p:extLst>
   </p:cSld>

</xml_diff>

<commit_message>
Fixed flow equation table in circuit methodology.
</commit_message>
<xml_diff>
--- a/docs/Figures/CircuitWorking.pptx
+++ b/docs/Figures/CircuitWorking.pptx
@@ -224,7 +224,7 @@
           <a:p>
             <a:fld id="{7B126BB8-5932-4ACC-8CD5-328D9DA138C9}" type="datetimeFigureOut">
               <a:rPr lang="en-US" smtClean="0"/>
-              <a:t>2/8/2023</a:t>
+              <a:t>3/20/2023</a:t>
             </a:fld>
             <a:endParaRPr lang="en-US"/>
           </a:p>
@@ -670,7 +670,7 @@
           <a:p>
             <a:fld id="{9E9AFD63-10BD-4598-9E1E-9FFECB76D2D7}" type="datetimeFigureOut">
               <a:rPr lang="en-US" smtClean="0"/>
-              <a:t>2/8/2023</a:t>
+              <a:t>3/20/2023</a:t>
             </a:fld>
             <a:endParaRPr lang="en-US"/>
           </a:p>
@@ -838,7 +838,7 @@
           <a:p>
             <a:fld id="{9E9AFD63-10BD-4598-9E1E-9FFECB76D2D7}" type="datetimeFigureOut">
               <a:rPr lang="en-US" smtClean="0"/>
-              <a:t>2/8/2023</a:t>
+              <a:t>3/20/2023</a:t>
             </a:fld>
             <a:endParaRPr lang="en-US"/>
           </a:p>
@@ -1016,7 +1016,7 @@
           <a:p>
             <a:fld id="{9E9AFD63-10BD-4598-9E1E-9FFECB76D2D7}" type="datetimeFigureOut">
               <a:rPr lang="en-US" smtClean="0"/>
-              <a:t>2/8/2023</a:t>
+              <a:t>3/20/2023</a:t>
             </a:fld>
             <a:endParaRPr lang="en-US"/>
           </a:p>
@@ -2771,7 +2771,7 @@
           <a:p>
             <a:fld id="{9E9AFD63-10BD-4598-9E1E-9FFECB76D2D7}" type="datetimeFigureOut">
               <a:rPr lang="en-US" smtClean="0"/>
-              <a:t>2/8/2023</a:t>
+              <a:t>3/20/2023</a:t>
             </a:fld>
             <a:endParaRPr lang="en-US"/>
           </a:p>
@@ -3215,7 +3215,7 @@
           <a:p>
             <a:fld id="{9E9AFD63-10BD-4598-9E1E-9FFECB76D2D7}" type="datetimeFigureOut">
               <a:rPr lang="en-US" smtClean="0"/>
-              <a:t>2/8/2023</a:t>
+              <a:t>3/20/2023</a:t>
             </a:fld>
             <a:endParaRPr lang="en-US"/>
           </a:p>
@@ -3500,7 +3500,7 @@
           <a:p>
             <a:fld id="{9E9AFD63-10BD-4598-9E1E-9FFECB76D2D7}" type="datetimeFigureOut">
               <a:rPr lang="en-US" smtClean="0"/>
-              <a:t>2/8/2023</a:t>
+              <a:t>3/20/2023</a:t>
             </a:fld>
             <a:endParaRPr lang="en-US"/>
           </a:p>
@@ -3919,7 +3919,7 @@
           <a:p>
             <a:fld id="{9E9AFD63-10BD-4598-9E1E-9FFECB76D2D7}" type="datetimeFigureOut">
               <a:rPr lang="en-US" smtClean="0"/>
-              <a:t>2/8/2023</a:t>
+              <a:t>3/20/2023</a:t>
             </a:fld>
             <a:endParaRPr lang="en-US"/>
           </a:p>
@@ -4036,7 +4036,7 @@
           <a:p>
             <a:fld id="{9E9AFD63-10BD-4598-9E1E-9FFECB76D2D7}" type="datetimeFigureOut">
               <a:rPr lang="en-US" smtClean="0"/>
-              <a:t>2/8/2023</a:t>
+              <a:t>3/20/2023</a:t>
             </a:fld>
             <a:endParaRPr lang="en-US"/>
           </a:p>
@@ -4131,7 +4131,7 @@
           <a:p>
             <a:fld id="{9E9AFD63-10BD-4598-9E1E-9FFECB76D2D7}" type="datetimeFigureOut">
               <a:rPr lang="en-US" smtClean="0"/>
-              <a:t>2/8/2023</a:t>
+              <a:t>3/20/2023</a:t>
             </a:fld>
             <a:endParaRPr lang="en-US"/>
           </a:p>
@@ -4406,7 +4406,7 @@
           <a:p>
             <a:fld id="{9E9AFD63-10BD-4598-9E1E-9FFECB76D2D7}" type="datetimeFigureOut">
               <a:rPr lang="en-US" smtClean="0"/>
-              <a:t>2/8/2023</a:t>
+              <a:t>3/20/2023</a:t>
             </a:fld>
             <a:endParaRPr lang="en-US"/>
           </a:p>
@@ -4658,7 +4658,7 @@
           <a:p>
             <a:fld id="{9E9AFD63-10BD-4598-9E1E-9FFECB76D2D7}" type="datetimeFigureOut">
               <a:rPr lang="en-US" smtClean="0"/>
-              <a:t>2/8/2023</a:t>
+              <a:t>3/20/2023</a:t>
             </a:fld>
             <a:endParaRPr lang="en-US"/>
           </a:p>
@@ -4869,7 +4869,7 @@
           <a:p>
             <a:fld id="{9E9AFD63-10BD-4598-9E1E-9FFECB76D2D7}" type="datetimeFigureOut">
               <a:rPr lang="en-US" smtClean="0"/>
-              <a:t>2/8/2023</a:t>
+              <a:t>3/20/2023</a:t>
             </a:fld>
             <a:endParaRPr lang="en-US"/>
           </a:p>
@@ -10366,10 +10366,10 @@
       </p:grpSpPr>
       <p:pic>
         <p:nvPicPr>
-          <p:cNvPr id="2" name="Picture 1">
+          <p:cNvPr id="3" name="Picture 2">
             <a:extLst>
               <a:ext uri="{FF2B5EF4-FFF2-40B4-BE49-F238E27FC236}">
-                <a16:creationId xmlns:a16="http://schemas.microsoft.com/office/drawing/2014/main" id="{59A0EA65-C22A-7DA3-7711-C31ACB64C1C3}"/>
+                <a16:creationId xmlns:a16="http://schemas.microsoft.com/office/drawing/2014/main" id="{604C889F-3696-E98C-D233-B22A90B6C195}"/>
               </a:ext>
             </a:extLst>
           </p:cNvPr>
@@ -10386,8 +10386,8 @@
         </p:blipFill>
         <p:spPr>
           <a:xfrm>
-            <a:off x="2624133" y="1222311"/>
-            <a:ext cx="4229690" cy="4222546"/>
+            <a:off x="1828800" y="623496"/>
+            <a:ext cx="5649113" cy="5611008"/>
           </a:xfrm>
           <a:prstGeom prst="rect">
             <a:avLst/>

</xml_diff>